<commit_message>
Verbesserungen Tag 3-2 Docker
</commit_message>
<xml_diff>
--- a/slides/Tag-3_2-Docker.pptx
+++ b/slides/Tag-3_2-Docker.pptx
@@ -6,10 +6,10 @@
     <p:sldMasterId id="2147483649" r:id="rId2"/>
   </p:sldMasterIdLst>
   <p:notesMasterIdLst>
-    <p:notesMasterId r:id="rId36"/>
+    <p:notesMasterId r:id="rId37"/>
   </p:notesMasterIdLst>
   <p:handoutMasterIdLst>
-    <p:handoutMasterId r:id="rId37"/>
+    <p:handoutMasterId r:id="rId38"/>
   </p:handoutMasterIdLst>
   <p:sldIdLst>
     <p:sldId id="289" r:id="rId3"/>
@@ -19,32 +19,33 @@
     <p:sldId id="311" r:id="rId7"/>
     <p:sldId id="312" r:id="rId8"/>
     <p:sldId id="313" r:id="rId9"/>
-    <p:sldId id="293" r:id="rId10"/>
-    <p:sldId id="296" r:id="rId11"/>
-    <p:sldId id="310" r:id="rId12"/>
-    <p:sldId id="298" r:id="rId13"/>
-    <p:sldId id="299" r:id="rId14"/>
-    <p:sldId id="319" r:id="rId15"/>
-    <p:sldId id="322" r:id="rId16"/>
-    <p:sldId id="323" r:id="rId17"/>
-    <p:sldId id="326" r:id="rId18"/>
-    <p:sldId id="325" r:id="rId19"/>
-    <p:sldId id="327" r:id="rId20"/>
-    <p:sldId id="328" r:id="rId21"/>
-    <p:sldId id="321" r:id="rId22"/>
-    <p:sldId id="320" r:id="rId23"/>
-    <p:sldId id="300" r:id="rId24"/>
-    <p:sldId id="301" r:id="rId25"/>
-    <p:sldId id="314" r:id="rId26"/>
-    <p:sldId id="316" r:id="rId27"/>
-    <p:sldId id="317" r:id="rId28"/>
-    <p:sldId id="318" r:id="rId29"/>
-    <p:sldId id="329" r:id="rId30"/>
-    <p:sldId id="303" r:id="rId31"/>
-    <p:sldId id="305" r:id="rId32"/>
-    <p:sldId id="306" r:id="rId33"/>
-    <p:sldId id="307" r:id="rId34"/>
-    <p:sldId id="304" r:id="rId35"/>
+    <p:sldId id="330" r:id="rId10"/>
+    <p:sldId id="293" r:id="rId11"/>
+    <p:sldId id="296" r:id="rId12"/>
+    <p:sldId id="310" r:id="rId13"/>
+    <p:sldId id="298" r:id="rId14"/>
+    <p:sldId id="299" r:id="rId15"/>
+    <p:sldId id="319" r:id="rId16"/>
+    <p:sldId id="322" r:id="rId17"/>
+    <p:sldId id="323" r:id="rId18"/>
+    <p:sldId id="326" r:id="rId19"/>
+    <p:sldId id="325" r:id="rId20"/>
+    <p:sldId id="327" r:id="rId21"/>
+    <p:sldId id="328" r:id="rId22"/>
+    <p:sldId id="321" r:id="rId23"/>
+    <p:sldId id="320" r:id="rId24"/>
+    <p:sldId id="300" r:id="rId25"/>
+    <p:sldId id="301" r:id="rId26"/>
+    <p:sldId id="314" r:id="rId27"/>
+    <p:sldId id="316" r:id="rId28"/>
+    <p:sldId id="317" r:id="rId29"/>
+    <p:sldId id="318" r:id="rId30"/>
+    <p:sldId id="329" r:id="rId31"/>
+    <p:sldId id="303" r:id="rId32"/>
+    <p:sldId id="305" r:id="rId33"/>
+    <p:sldId id="306" r:id="rId34"/>
+    <p:sldId id="307" r:id="rId35"/>
+    <p:sldId id="304" r:id="rId36"/>
   </p:sldIdLst>
   <p:sldSz cx="9144000" cy="6858000" type="screen4x3"/>
   <p:notesSz cx="6784975" cy="9921875"/>
@@ -1037,6 +1038,677 @@
 </p:notes>
 </file>
 
+<file path=ppt/notesSlides/notesSlide10.xml><?xml version="1.0" encoding="utf-8"?>
+<p:notes xmlns:a="http://schemas.openxmlformats.org/drawingml/2006/main" xmlns:r="http://schemas.openxmlformats.org/officeDocument/2006/relationships" xmlns:p="http://schemas.openxmlformats.org/presentationml/2006/main">
+  <p:cSld>
+    <p:spTree>
+      <p:nvGrpSpPr>
+        <p:cNvPr id="1" name=""/>
+        <p:cNvGrpSpPr/>
+        <p:nvPr/>
+      </p:nvGrpSpPr>
+      <p:grpSpPr>
+        <a:xfrm>
+          <a:off x="0" y="0"/>
+          <a:ext cx="0" cy="0"/>
+          <a:chOff x="0" y="0"/>
+          <a:chExt cx="0" cy="0"/>
+        </a:xfrm>
+      </p:grpSpPr>
+      <p:sp>
+        <p:nvSpPr>
+          <p:cNvPr id="2" name="Folienbildplatzhalter 1"/>
+          <p:cNvSpPr>
+            <a:spLocks noGrp="1" noRot="1" noChangeAspect="1"/>
+          </p:cNvSpPr>
+          <p:nvPr>
+            <p:ph type="sldImg"/>
+          </p:nvPr>
+        </p:nvSpPr>
+        <p:spPr/>
+      </p:sp>
+      <p:sp>
+        <p:nvSpPr>
+          <p:cNvPr id="3" name="Notizenplatzhalter 2"/>
+          <p:cNvSpPr>
+            <a:spLocks noGrp="1"/>
+          </p:cNvSpPr>
+          <p:nvPr>
+            <p:ph type="body" idx="1"/>
+          </p:nvPr>
+        </p:nvSpPr>
+        <p:spPr/>
+        <p:txBody>
+          <a:bodyPr/>
+          <a:lstStyle/>
+          <a:p>
+            <a:endParaRPr lang="de-DE" dirty="0"/>
+          </a:p>
+        </p:txBody>
+      </p:sp>
+      <p:sp>
+        <p:nvSpPr>
+          <p:cNvPr id="4" name="Foliennummernplatzhalter 3"/>
+          <p:cNvSpPr>
+            <a:spLocks noGrp="1"/>
+          </p:cNvSpPr>
+          <p:nvPr>
+            <p:ph type="sldNum" sz="quarter" idx="5"/>
+          </p:nvPr>
+        </p:nvSpPr>
+        <p:spPr/>
+        <p:txBody>
+          <a:bodyPr/>
+          <a:lstStyle/>
+          <a:p>
+            <a:fld id="{18182567-388C-4D33-8B7B-A651F195F118}" type="slidenum">
+              <a:rPr lang="de-DE" altLang="de-DE" smtClean="0"/>
+              <a:pPr/>
+              <a:t>22</a:t>
+            </a:fld>
+            <a:endParaRPr lang="de-DE" altLang="de-DE"/>
+          </a:p>
+        </p:txBody>
+      </p:sp>
+    </p:spTree>
+    <p:extLst>
+      <p:ext uri="{BB962C8B-B14F-4D97-AF65-F5344CB8AC3E}">
+        <p14:creationId xmlns:p14="http://schemas.microsoft.com/office/powerpoint/2010/main" val="1608299900"/>
+      </p:ext>
+    </p:extLst>
+  </p:cSld>
+  <p:clrMapOvr>
+    <a:masterClrMapping/>
+  </p:clrMapOvr>
+</p:notes>
+</file>
+
+<file path=ppt/notesSlides/notesSlide11.xml><?xml version="1.0" encoding="utf-8"?>
+<p:notes xmlns:a="http://schemas.openxmlformats.org/drawingml/2006/main" xmlns:r="http://schemas.openxmlformats.org/officeDocument/2006/relationships" xmlns:p="http://schemas.openxmlformats.org/presentationml/2006/main">
+  <p:cSld>
+    <p:spTree>
+      <p:nvGrpSpPr>
+        <p:cNvPr id="1" name=""/>
+        <p:cNvGrpSpPr/>
+        <p:nvPr/>
+      </p:nvGrpSpPr>
+      <p:grpSpPr>
+        <a:xfrm>
+          <a:off x="0" y="0"/>
+          <a:ext cx="0" cy="0"/>
+          <a:chOff x="0" y="0"/>
+          <a:chExt cx="0" cy="0"/>
+        </a:xfrm>
+      </p:grpSpPr>
+      <p:sp>
+        <p:nvSpPr>
+          <p:cNvPr id="2" name="Folienbildplatzhalter 1"/>
+          <p:cNvSpPr>
+            <a:spLocks noGrp="1" noRot="1" noChangeAspect="1"/>
+          </p:cNvSpPr>
+          <p:nvPr>
+            <p:ph type="sldImg"/>
+          </p:nvPr>
+        </p:nvSpPr>
+        <p:spPr/>
+      </p:sp>
+      <p:sp>
+        <p:nvSpPr>
+          <p:cNvPr id="3" name="Notizenplatzhalter 2"/>
+          <p:cNvSpPr>
+            <a:spLocks noGrp="1"/>
+          </p:cNvSpPr>
+          <p:nvPr>
+            <p:ph type="body" idx="1"/>
+          </p:nvPr>
+        </p:nvSpPr>
+        <p:spPr/>
+        <p:txBody>
+          <a:bodyPr/>
+          <a:lstStyle/>
+          <a:p>
+            <a:r>
+              <a:rPr lang="de-DE" dirty="0" err="1"/>
+              <a:t>run</a:t>
+            </a:r>
+            <a:r>
+              <a:rPr lang="de-DE" dirty="0"/>
+              <a:t> erstellt und startet Container direkt</a:t>
+            </a:r>
+          </a:p>
+          <a:p>
+            <a:r>
+              <a:rPr lang="de-DE" dirty="0" err="1"/>
+              <a:t>create</a:t>
+            </a:r>
+            <a:r>
+              <a:rPr lang="de-DE" dirty="0"/>
+              <a:t> erstellt nur den Container</a:t>
+            </a:r>
+          </a:p>
+        </p:txBody>
+      </p:sp>
+      <p:sp>
+        <p:nvSpPr>
+          <p:cNvPr id="4" name="Foliennummernplatzhalter 3"/>
+          <p:cNvSpPr>
+            <a:spLocks noGrp="1"/>
+          </p:cNvSpPr>
+          <p:nvPr>
+            <p:ph type="sldNum" sz="quarter" idx="5"/>
+          </p:nvPr>
+        </p:nvSpPr>
+        <p:spPr/>
+        <p:txBody>
+          <a:bodyPr/>
+          <a:lstStyle/>
+          <a:p>
+            <a:fld id="{18182567-388C-4D33-8B7B-A651F195F118}" type="slidenum">
+              <a:rPr lang="de-DE" altLang="de-DE" smtClean="0"/>
+              <a:pPr/>
+              <a:t>24</a:t>
+            </a:fld>
+            <a:endParaRPr lang="de-DE" altLang="de-DE"/>
+          </a:p>
+        </p:txBody>
+      </p:sp>
+    </p:spTree>
+    <p:extLst>
+      <p:ext uri="{BB962C8B-B14F-4D97-AF65-F5344CB8AC3E}">
+        <p14:creationId xmlns:p14="http://schemas.microsoft.com/office/powerpoint/2010/main" val="1608987838"/>
+      </p:ext>
+    </p:extLst>
+  </p:cSld>
+  <p:clrMapOvr>
+    <a:masterClrMapping/>
+  </p:clrMapOvr>
+</p:notes>
+</file>
+
+<file path=ppt/notesSlides/notesSlide12.xml><?xml version="1.0" encoding="utf-8"?>
+<p:notes xmlns:a="http://schemas.openxmlformats.org/drawingml/2006/main" xmlns:r="http://schemas.openxmlformats.org/officeDocument/2006/relationships" xmlns:p="http://schemas.openxmlformats.org/presentationml/2006/main">
+  <p:cSld>
+    <p:spTree>
+      <p:nvGrpSpPr>
+        <p:cNvPr id="1" name=""/>
+        <p:cNvGrpSpPr/>
+        <p:nvPr/>
+      </p:nvGrpSpPr>
+      <p:grpSpPr>
+        <a:xfrm>
+          <a:off x="0" y="0"/>
+          <a:ext cx="0" cy="0"/>
+          <a:chOff x="0" y="0"/>
+          <a:chExt cx="0" cy="0"/>
+        </a:xfrm>
+      </p:grpSpPr>
+      <p:sp>
+        <p:nvSpPr>
+          <p:cNvPr id="2" name="Folienbildplatzhalter 1"/>
+          <p:cNvSpPr>
+            <a:spLocks noGrp="1" noRot="1" noChangeAspect="1"/>
+          </p:cNvSpPr>
+          <p:nvPr>
+            <p:ph type="sldImg"/>
+          </p:nvPr>
+        </p:nvSpPr>
+        <p:spPr/>
+      </p:sp>
+      <p:sp>
+        <p:nvSpPr>
+          <p:cNvPr id="3" name="Notizenplatzhalter 2"/>
+          <p:cNvSpPr>
+            <a:spLocks noGrp="1"/>
+          </p:cNvSpPr>
+          <p:nvPr>
+            <p:ph type="body" idx="1"/>
+          </p:nvPr>
+        </p:nvSpPr>
+        <p:spPr/>
+        <p:txBody>
+          <a:bodyPr/>
+          <a:lstStyle/>
+          <a:p>
+            <a:endParaRPr lang="de-DE" dirty="0"/>
+          </a:p>
+        </p:txBody>
+      </p:sp>
+      <p:sp>
+        <p:nvSpPr>
+          <p:cNvPr id="4" name="Foliennummernplatzhalter 3"/>
+          <p:cNvSpPr>
+            <a:spLocks noGrp="1"/>
+          </p:cNvSpPr>
+          <p:nvPr>
+            <p:ph type="sldNum" sz="quarter" idx="5"/>
+          </p:nvPr>
+        </p:nvSpPr>
+        <p:spPr/>
+        <p:txBody>
+          <a:bodyPr/>
+          <a:lstStyle/>
+          <a:p>
+            <a:fld id="{18182567-388C-4D33-8B7B-A651F195F118}" type="slidenum">
+              <a:rPr lang="de-DE" altLang="de-DE" smtClean="0"/>
+              <a:pPr/>
+              <a:t>25</a:t>
+            </a:fld>
+            <a:endParaRPr lang="de-DE" altLang="de-DE"/>
+          </a:p>
+        </p:txBody>
+      </p:sp>
+    </p:spTree>
+    <p:extLst>
+      <p:ext uri="{BB962C8B-B14F-4D97-AF65-F5344CB8AC3E}">
+        <p14:creationId xmlns:p14="http://schemas.microsoft.com/office/powerpoint/2010/main" val="2331032350"/>
+      </p:ext>
+    </p:extLst>
+  </p:cSld>
+  <p:clrMapOvr>
+    <a:masterClrMapping/>
+  </p:clrMapOvr>
+</p:notes>
+</file>
+
+<file path=ppt/notesSlides/notesSlide13.xml><?xml version="1.0" encoding="utf-8"?>
+<p:notes xmlns:a="http://schemas.openxmlformats.org/drawingml/2006/main" xmlns:r="http://schemas.openxmlformats.org/officeDocument/2006/relationships" xmlns:p="http://schemas.openxmlformats.org/presentationml/2006/main">
+  <p:cSld>
+    <p:spTree>
+      <p:nvGrpSpPr>
+        <p:cNvPr id="1" name=""/>
+        <p:cNvGrpSpPr/>
+        <p:nvPr/>
+      </p:nvGrpSpPr>
+      <p:grpSpPr>
+        <a:xfrm>
+          <a:off x="0" y="0"/>
+          <a:ext cx="0" cy="0"/>
+          <a:chOff x="0" y="0"/>
+          <a:chExt cx="0" cy="0"/>
+        </a:xfrm>
+      </p:grpSpPr>
+      <p:sp>
+        <p:nvSpPr>
+          <p:cNvPr id="2" name="Folienbildplatzhalter 1"/>
+          <p:cNvSpPr>
+            <a:spLocks noGrp="1" noRot="1" noChangeAspect="1"/>
+          </p:cNvSpPr>
+          <p:nvPr>
+            <p:ph type="sldImg"/>
+          </p:nvPr>
+        </p:nvSpPr>
+        <p:spPr/>
+      </p:sp>
+      <p:sp>
+        <p:nvSpPr>
+          <p:cNvPr id="3" name="Notizenplatzhalter 2"/>
+          <p:cNvSpPr>
+            <a:spLocks noGrp="1"/>
+          </p:cNvSpPr>
+          <p:nvPr>
+            <p:ph type="body" idx="1"/>
+          </p:nvPr>
+        </p:nvSpPr>
+        <p:spPr/>
+        <p:txBody>
+          <a:bodyPr/>
+          <a:lstStyle/>
+          <a:p>
+            <a:r>
+              <a:rPr lang="de-DE" dirty="0"/>
+              <a:t>SIGTERM Gibt dem Programm Möglichkeit zu reagieren und sich selbst Ordnungsgemäß zu stoppen</a:t>
+            </a:r>
+            <a:br>
+              <a:rPr lang="de-DE" dirty="0"/>
+            </a:br>
+            <a:r>
+              <a:rPr lang="de-DE" dirty="0"/>
+              <a:t>SIGKILL würgt den Prozess sofort ab</a:t>
+            </a:r>
+          </a:p>
+        </p:txBody>
+      </p:sp>
+      <p:sp>
+        <p:nvSpPr>
+          <p:cNvPr id="4" name="Foliennummernplatzhalter 3"/>
+          <p:cNvSpPr>
+            <a:spLocks noGrp="1"/>
+          </p:cNvSpPr>
+          <p:nvPr>
+            <p:ph type="sldNum" sz="quarter" idx="5"/>
+          </p:nvPr>
+        </p:nvSpPr>
+        <p:spPr/>
+        <p:txBody>
+          <a:bodyPr/>
+          <a:lstStyle/>
+          <a:p>
+            <a:fld id="{18182567-388C-4D33-8B7B-A651F195F118}" type="slidenum">
+              <a:rPr lang="de-DE" altLang="de-DE" smtClean="0"/>
+              <a:pPr/>
+              <a:t>26</a:t>
+            </a:fld>
+            <a:endParaRPr lang="de-DE" altLang="de-DE"/>
+          </a:p>
+        </p:txBody>
+      </p:sp>
+    </p:spTree>
+    <p:extLst>
+      <p:ext uri="{BB962C8B-B14F-4D97-AF65-F5344CB8AC3E}">
+        <p14:creationId xmlns:p14="http://schemas.microsoft.com/office/powerpoint/2010/main" val="1522668474"/>
+      </p:ext>
+    </p:extLst>
+  </p:cSld>
+  <p:clrMapOvr>
+    <a:masterClrMapping/>
+  </p:clrMapOvr>
+</p:notes>
+</file>
+
+<file path=ppt/notesSlides/notesSlide14.xml><?xml version="1.0" encoding="utf-8"?>
+<p:notes xmlns:a="http://schemas.openxmlformats.org/drawingml/2006/main" xmlns:r="http://schemas.openxmlformats.org/officeDocument/2006/relationships" xmlns:p="http://schemas.openxmlformats.org/presentationml/2006/main">
+  <p:cSld>
+    <p:spTree>
+      <p:nvGrpSpPr>
+        <p:cNvPr id="1" name=""/>
+        <p:cNvGrpSpPr/>
+        <p:nvPr/>
+      </p:nvGrpSpPr>
+      <p:grpSpPr>
+        <a:xfrm>
+          <a:off x="0" y="0"/>
+          <a:ext cx="0" cy="0"/>
+          <a:chOff x="0" y="0"/>
+          <a:chExt cx="0" cy="0"/>
+        </a:xfrm>
+      </p:grpSpPr>
+      <p:sp>
+        <p:nvSpPr>
+          <p:cNvPr id="2" name="Folienbildplatzhalter 1"/>
+          <p:cNvSpPr>
+            <a:spLocks noGrp="1" noRot="1" noChangeAspect="1"/>
+          </p:cNvSpPr>
+          <p:nvPr>
+            <p:ph type="sldImg"/>
+          </p:nvPr>
+        </p:nvSpPr>
+        <p:spPr/>
+      </p:sp>
+      <p:sp>
+        <p:nvSpPr>
+          <p:cNvPr id="3" name="Notizenplatzhalter 2"/>
+          <p:cNvSpPr>
+            <a:spLocks noGrp="1"/>
+          </p:cNvSpPr>
+          <p:nvPr>
+            <p:ph type="body" idx="1"/>
+          </p:nvPr>
+        </p:nvSpPr>
+        <p:spPr/>
+        <p:txBody>
+          <a:bodyPr/>
+          <a:lstStyle/>
+          <a:p>
+            <a:endParaRPr lang="de-DE" dirty="0"/>
+          </a:p>
+        </p:txBody>
+      </p:sp>
+      <p:sp>
+        <p:nvSpPr>
+          <p:cNvPr id="4" name="Foliennummernplatzhalter 3"/>
+          <p:cNvSpPr>
+            <a:spLocks noGrp="1"/>
+          </p:cNvSpPr>
+          <p:nvPr>
+            <p:ph type="sldNum" sz="quarter" idx="5"/>
+          </p:nvPr>
+        </p:nvSpPr>
+        <p:spPr/>
+        <p:txBody>
+          <a:bodyPr/>
+          <a:lstStyle/>
+          <a:p>
+            <a:fld id="{18182567-388C-4D33-8B7B-A651F195F118}" type="slidenum">
+              <a:rPr lang="de-DE" altLang="de-DE" smtClean="0"/>
+              <a:pPr/>
+              <a:t>27</a:t>
+            </a:fld>
+            <a:endParaRPr lang="de-DE" altLang="de-DE"/>
+          </a:p>
+        </p:txBody>
+      </p:sp>
+    </p:spTree>
+    <p:extLst>
+      <p:ext uri="{BB962C8B-B14F-4D97-AF65-F5344CB8AC3E}">
+        <p14:creationId xmlns:p14="http://schemas.microsoft.com/office/powerpoint/2010/main" val="2320076113"/>
+      </p:ext>
+    </p:extLst>
+  </p:cSld>
+  <p:clrMapOvr>
+    <a:masterClrMapping/>
+  </p:clrMapOvr>
+</p:notes>
+</file>
+
+<file path=ppt/notesSlides/notesSlide15.xml><?xml version="1.0" encoding="utf-8"?>
+<p:notes xmlns:a="http://schemas.openxmlformats.org/drawingml/2006/main" xmlns:r="http://schemas.openxmlformats.org/officeDocument/2006/relationships" xmlns:p="http://schemas.openxmlformats.org/presentationml/2006/main">
+  <p:cSld>
+    <p:spTree>
+      <p:nvGrpSpPr>
+        <p:cNvPr id="1" name=""/>
+        <p:cNvGrpSpPr/>
+        <p:nvPr/>
+      </p:nvGrpSpPr>
+      <p:grpSpPr>
+        <a:xfrm>
+          <a:off x="0" y="0"/>
+          <a:ext cx="0" cy="0"/>
+          <a:chOff x="0" y="0"/>
+          <a:chExt cx="0" cy="0"/>
+        </a:xfrm>
+      </p:grpSpPr>
+      <p:sp>
+        <p:nvSpPr>
+          <p:cNvPr id="2" name="Folienbildplatzhalter 1"/>
+          <p:cNvSpPr>
+            <a:spLocks noGrp="1" noRot="1" noChangeAspect="1"/>
+          </p:cNvSpPr>
+          <p:nvPr>
+            <p:ph type="sldImg"/>
+          </p:nvPr>
+        </p:nvSpPr>
+        <p:spPr/>
+      </p:sp>
+      <p:sp>
+        <p:nvSpPr>
+          <p:cNvPr id="3" name="Notizenplatzhalter 2"/>
+          <p:cNvSpPr>
+            <a:spLocks noGrp="1"/>
+          </p:cNvSpPr>
+          <p:nvPr>
+            <p:ph type="body" idx="1"/>
+          </p:nvPr>
+        </p:nvSpPr>
+        <p:spPr/>
+        <p:txBody>
+          <a:bodyPr/>
+          <a:lstStyle/>
+          <a:p>
+            <a:endParaRPr lang="de-DE" dirty="0"/>
+          </a:p>
+        </p:txBody>
+      </p:sp>
+      <p:sp>
+        <p:nvSpPr>
+          <p:cNvPr id="4" name="Foliennummernplatzhalter 3"/>
+          <p:cNvSpPr>
+            <a:spLocks noGrp="1"/>
+          </p:cNvSpPr>
+          <p:nvPr>
+            <p:ph type="sldNum" sz="quarter" idx="5"/>
+          </p:nvPr>
+        </p:nvSpPr>
+        <p:spPr/>
+        <p:txBody>
+          <a:bodyPr/>
+          <a:lstStyle/>
+          <a:p>
+            <a:fld id="{18182567-388C-4D33-8B7B-A651F195F118}" type="slidenum">
+              <a:rPr lang="de-DE" altLang="de-DE" smtClean="0"/>
+              <a:pPr/>
+              <a:t>28</a:t>
+            </a:fld>
+            <a:endParaRPr lang="de-DE" altLang="de-DE"/>
+          </a:p>
+        </p:txBody>
+      </p:sp>
+    </p:spTree>
+    <p:extLst>
+      <p:ext uri="{BB962C8B-B14F-4D97-AF65-F5344CB8AC3E}">
+        <p14:creationId xmlns:p14="http://schemas.microsoft.com/office/powerpoint/2010/main" val="2581772467"/>
+      </p:ext>
+    </p:extLst>
+  </p:cSld>
+  <p:clrMapOvr>
+    <a:masterClrMapping/>
+  </p:clrMapOvr>
+</p:notes>
+</file>
+
+<file path=ppt/notesSlides/notesSlide16.xml><?xml version="1.0" encoding="utf-8"?>
+<p:notes xmlns:a="http://schemas.openxmlformats.org/drawingml/2006/main" xmlns:r="http://schemas.openxmlformats.org/officeDocument/2006/relationships" xmlns:p="http://schemas.openxmlformats.org/presentationml/2006/main">
+  <p:cSld>
+    <p:spTree>
+      <p:nvGrpSpPr>
+        <p:cNvPr id="1" name=""/>
+        <p:cNvGrpSpPr/>
+        <p:nvPr/>
+      </p:nvGrpSpPr>
+      <p:grpSpPr>
+        <a:xfrm>
+          <a:off x="0" y="0"/>
+          <a:ext cx="0" cy="0"/>
+          <a:chOff x="0" y="0"/>
+          <a:chExt cx="0" cy="0"/>
+        </a:xfrm>
+      </p:grpSpPr>
+      <p:sp>
+        <p:nvSpPr>
+          <p:cNvPr id="2" name="Folienbildplatzhalter 1"/>
+          <p:cNvSpPr>
+            <a:spLocks noGrp="1" noRot="1" noChangeAspect="1"/>
+          </p:cNvSpPr>
+          <p:nvPr>
+            <p:ph type="sldImg"/>
+          </p:nvPr>
+        </p:nvSpPr>
+        <p:spPr/>
+      </p:sp>
+      <p:sp>
+        <p:nvSpPr>
+          <p:cNvPr id="3" name="Notizenplatzhalter 2"/>
+          <p:cNvSpPr>
+            <a:spLocks noGrp="1"/>
+          </p:cNvSpPr>
+          <p:nvPr>
+            <p:ph type="body" idx="1"/>
+          </p:nvPr>
+        </p:nvSpPr>
+        <p:spPr/>
+        <p:txBody>
+          <a:bodyPr/>
+          <a:lstStyle/>
+          <a:p>
+            <a:r>
+              <a:rPr lang="de-DE" noProof="0" dirty="0"/>
+              <a:t>Demo:</a:t>
+            </a:r>
+            <a:br>
+              <a:rPr lang="de-DE" noProof="0" dirty="0"/>
+            </a:br>
+            <a:r>
+              <a:rPr lang="de-DE" noProof="0" dirty="0"/>
+              <a:t>Ähnlich zu Übungsaufgabe in der ausgeblendeten Folie</a:t>
+            </a:r>
+            <a:br>
+              <a:rPr lang="de-DE" noProof="0" dirty="0"/>
+            </a:br>
+            <a:br>
+              <a:rPr lang="de-DE" noProof="0" dirty="0"/>
+            </a:br>
+            <a:r>
+              <a:rPr lang="de-DE" noProof="0" dirty="0"/>
+              <a:t>Image erstellen via </a:t>
+            </a:r>
+            <a:r>
+              <a:rPr lang="de-DE" noProof="0" dirty="0" err="1"/>
+              <a:t>Dockerfile</a:t>
+            </a:r>
+            <a:r>
+              <a:rPr lang="de-DE" noProof="0" dirty="0"/>
+              <a:t> im </a:t>
+            </a:r>
+            <a:r>
+              <a:rPr lang="de-DE" noProof="0" dirty="0" err="1"/>
+              <a:t>Example</a:t>
+            </a:r>
+            <a:r>
+              <a:rPr lang="de-DE" noProof="0" dirty="0"/>
+              <a:t> Ordner</a:t>
+            </a:r>
+            <a:br>
+              <a:rPr lang="de-DE" noProof="0" dirty="0"/>
+            </a:br>
+            <a:r>
+              <a:rPr lang="de-DE" noProof="0" dirty="0"/>
+              <a:t>Container aus dem Image starten</a:t>
+            </a:r>
+          </a:p>
+          <a:p>
+            <a:r>
+              <a:rPr lang="de-DE" noProof="0" dirty="0"/>
+              <a:t>Logs und Dateisystem mittels Docker Desktop zeigen. </a:t>
+            </a:r>
+          </a:p>
+        </p:txBody>
+      </p:sp>
+      <p:sp>
+        <p:nvSpPr>
+          <p:cNvPr id="4" name="Foliennummernplatzhalter 3"/>
+          <p:cNvSpPr>
+            <a:spLocks noGrp="1"/>
+          </p:cNvSpPr>
+          <p:nvPr>
+            <p:ph type="sldNum" sz="quarter" idx="5"/>
+          </p:nvPr>
+        </p:nvSpPr>
+        <p:spPr/>
+        <p:txBody>
+          <a:bodyPr/>
+          <a:lstStyle/>
+          <a:p>
+            <a:fld id="{18182567-388C-4D33-8B7B-A651F195F118}" type="slidenum">
+              <a:rPr lang="de-DE" altLang="de-DE" smtClean="0"/>
+              <a:pPr/>
+              <a:t>29</a:t>
+            </a:fld>
+            <a:endParaRPr lang="de-DE" altLang="de-DE"/>
+          </a:p>
+        </p:txBody>
+      </p:sp>
+    </p:spTree>
+    <p:extLst>
+      <p:ext uri="{BB962C8B-B14F-4D97-AF65-F5344CB8AC3E}">
+        <p14:creationId xmlns:p14="http://schemas.microsoft.com/office/powerpoint/2010/main" val="2778018805"/>
+      </p:ext>
+    </p:extLst>
+  </p:cSld>
+  <p:clrMapOvr>
+    <a:masterClrMapping/>
+  </p:clrMapOvr>
+</p:notes>
+</file>
+
 <file path=ppt/notesSlides/notesSlide2.xml><?xml version="1.0" encoding="utf-8"?>
 <p:notes xmlns:a="http://schemas.openxmlformats.org/drawingml/2006/main" xmlns:r="http://schemas.openxmlformats.org/officeDocument/2006/relationships" xmlns:p="http://schemas.openxmlformats.org/presentationml/2006/main">
   <p:cSld>
@@ -1166,7 +1838,22 @@
           <a:bodyPr/>
           <a:lstStyle/>
           <a:p>
-            <a:endParaRPr lang="de-DE" dirty="0"/>
+            <a:r>
+              <a:rPr lang="de-DE" dirty="0" err="1"/>
+              <a:t>Daemon</a:t>
+            </a:r>
+            <a:r>
+              <a:rPr lang="de-DE" dirty="0"/>
+              <a:t> </a:t>
+            </a:r>
+            <a:r>
+              <a:rPr lang="de-DE" dirty="0" err="1"/>
+              <a:t>is</a:t>
+            </a:r>
+            <a:r>
+              <a:rPr lang="de-DE" dirty="0"/>
+              <a:t> ein Hintergrund Prozess der meist nicht direkt mit dem User interagiert. Oft endet der Name mit D</a:t>
+            </a:r>
           </a:p>
         </p:txBody>
       </p:sp>
@@ -1188,7 +1875,7 @@
             <a:fld id="{18182567-388C-4D33-8B7B-A651F195F118}" type="slidenum">
               <a:rPr lang="de-DE" altLang="de-DE" smtClean="0"/>
               <a:pPr/>
-              <a:t>23</a:t>
+              <a:t>5</a:t>
             </a:fld>
             <a:endParaRPr lang="de-DE" altLang="de-DE"/>
           </a:p>
@@ -1197,7 +1884,7 @@
     </p:spTree>
     <p:extLst>
       <p:ext uri="{BB962C8B-B14F-4D97-AF65-F5344CB8AC3E}">
-        <p14:creationId xmlns:p14="http://schemas.microsoft.com/office/powerpoint/2010/main" val="1608987838"/>
+        <p14:creationId xmlns:p14="http://schemas.microsoft.com/office/powerpoint/2010/main" val="3458115759"/>
       </p:ext>
     </p:extLst>
   </p:cSld>
@@ -1251,7 +1938,24 @@
           <a:bodyPr/>
           <a:lstStyle/>
           <a:p>
-            <a:endParaRPr lang="de-DE" dirty="0"/>
+            <a:r>
+              <a:rPr lang="de-DE" dirty="0"/>
+              <a:t>Images, Container und </a:t>
+            </a:r>
+            <a:r>
+              <a:rPr lang="de-DE" dirty="0" err="1"/>
+              <a:t>Registries</a:t>
+            </a:r>
+            <a:r>
+              <a:rPr lang="de-DE" dirty="0"/>
+              <a:t> sind die Wichtigsten Komponenten</a:t>
+            </a:r>
+          </a:p>
+          <a:p>
+            <a:r>
+              <a:rPr lang="de-DE" dirty="0"/>
+              <a:t>Sie werden auf den nächsten Folien beschrieben</a:t>
+            </a:r>
           </a:p>
         </p:txBody>
       </p:sp>
@@ -1273,7 +1977,7 @@
             <a:fld id="{18182567-388C-4D33-8B7B-A651F195F118}" type="slidenum">
               <a:rPr lang="de-DE" altLang="de-DE" smtClean="0"/>
               <a:pPr/>
-              <a:t>24</a:t>
+              <a:t>8</a:t>
             </a:fld>
             <a:endParaRPr lang="de-DE" altLang="de-DE"/>
           </a:p>
@@ -1282,7 +1986,7 @@
     </p:spTree>
     <p:extLst>
       <p:ext uri="{BB962C8B-B14F-4D97-AF65-F5344CB8AC3E}">
-        <p14:creationId xmlns:p14="http://schemas.microsoft.com/office/powerpoint/2010/main" val="2331032350"/>
+        <p14:creationId xmlns:p14="http://schemas.microsoft.com/office/powerpoint/2010/main" val="2307410376"/>
       </p:ext>
     </p:extLst>
   </p:cSld>
@@ -1336,6 +2040,29 @@
           <a:bodyPr/>
           <a:lstStyle/>
           <a:p>
+            <a:pPr marL="0" marR="0" lvl="0" indent="0" algn="l" defTabSz="762000" rtl="0" eaLnBrk="0" fontAlgn="base" latinLnBrk="0" hangingPunct="0">
+              <a:lnSpc>
+                <a:spcPct val="100000"/>
+              </a:lnSpc>
+              <a:spcBef>
+                <a:spcPct val="30000"/>
+              </a:spcBef>
+              <a:spcAft>
+                <a:spcPct val="0"/>
+              </a:spcAft>
+              <a:buClrTx/>
+              <a:buSzTx/>
+              <a:buFontTx/>
+              <a:buNone/>
+              <a:tabLst/>
+              <a:defRPr/>
+            </a:pPr>
+            <a:r>
+              <a:rPr lang="de-DE" dirty="0"/>
+              <a:t>Bild ist Urheberrechtsfrei von unsplash.com</a:t>
+            </a:r>
+          </a:p>
+          <a:p>
             <a:endParaRPr lang="de-DE" dirty="0"/>
           </a:p>
         </p:txBody>
@@ -1358,7 +2085,7 @@
             <a:fld id="{18182567-388C-4D33-8B7B-A651F195F118}" type="slidenum">
               <a:rPr lang="de-DE" altLang="de-DE" smtClean="0"/>
               <a:pPr/>
-              <a:t>25</a:t>
+              <a:t>9</a:t>
             </a:fld>
             <a:endParaRPr lang="de-DE" altLang="de-DE"/>
           </a:p>
@@ -1367,7 +2094,7 @@
     </p:spTree>
     <p:extLst>
       <p:ext uri="{BB962C8B-B14F-4D97-AF65-F5344CB8AC3E}">
-        <p14:creationId xmlns:p14="http://schemas.microsoft.com/office/powerpoint/2010/main" val="1522668474"/>
+        <p14:creationId xmlns:p14="http://schemas.microsoft.com/office/powerpoint/2010/main" val="617615319"/>
       </p:ext>
     </p:extLst>
   </p:cSld>
@@ -1421,7 +2148,10 @@
           <a:bodyPr/>
           <a:lstStyle/>
           <a:p>
-            <a:endParaRPr lang="de-DE" dirty="0"/>
+            <a:r>
+              <a:rPr lang="de-DE" dirty="0"/>
+              <a:t>Bild ist Urheberrechtsfrei von unsplash.com</a:t>
+            </a:r>
           </a:p>
         </p:txBody>
       </p:sp>
@@ -1443,7 +2173,7 @@
             <a:fld id="{18182567-388C-4D33-8B7B-A651F195F118}" type="slidenum">
               <a:rPr lang="de-DE" altLang="de-DE" smtClean="0"/>
               <a:pPr/>
-              <a:t>26</a:t>
+              <a:t>10</a:t>
             </a:fld>
             <a:endParaRPr lang="de-DE" altLang="de-DE"/>
           </a:p>
@@ -1452,7 +2182,7 @@
     </p:spTree>
     <p:extLst>
       <p:ext uri="{BB962C8B-B14F-4D97-AF65-F5344CB8AC3E}">
-        <p14:creationId xmlns:p14="http://schemas.microsoft.com/office/powerpoint/2010/main" val="2320076113"/>
+        <p14:creationId xmlns:p14="http://schemas.microsoft.com/office/powerpoint/2010/main" val="4275414675"/>
       </p:ext>
     </p:extLst>
   </p:cSld>
@@ -1506,7 +2236,10 @@
           <a:bodyPr/>
           <a:lstStyle/>
           <a:p>
-            <a:endParaRPr lang="de-DE" dirty="0"/>
+            <a:r>
+              <a:rPr lang="de-DE" dirty="0"/>
+              <a:t>Bild generiert mit deepai.org</a:t>
+            </a:r>
           </a:p>
         </p:txBody>
       </p:sp>
@@ -1528,7 +2261,7 @@
             <a:fld id="{18182567-388C-4D33-8B7B-A651F195F118}" type="slidenum">
               <a:rPr lang="de-DE" altLang="de-DE" smtClean="0"/>
               <a:pPr/>
-              <a:t>27</a:t>
+              <a:t>12</a:t>
             </a:fld>
             <a:endParaRPr lang="de-DE" altLang="de-DE"/>
           </a:p>
@@ -1537,7 +2270,180 @@
     </p:spTree>
     <p:extLst>
       <p:ext uri="{BB962C8B-B14F-4D97-AF65-F5344CB8AC3E}">
-        <p14:creationId xmlns:p14="http://schemas.microsoft.com/office/powerpoint/2010/main" val="2581772467"/>
+        <p14:creationId xmlns:p14="http://schemas.microsoft.com/office/powerpoint/2010/main" val="2645555206"/>
+      </p:ext>
+    </p:extLst>
+  </p:cSld>
+  <p:clrMapOvr>
+    <a:masterClrMapping/>
+  </p:clrMapOvr>
+</p:notes>
+</file>
+
+<file path=ppt/notesSlides/notesSlide8.xml><?xml version="1.0" encoding="utf-8"?>
+<p:notes xmlns:a="http://schemas.openxmlformats.org/drawingml/2006/main" xmlns:r="http://schemas.openxmlformats.org/officeDocument/2006/relationships" xmlns:p="http://schemas.openxmlformats.org/presentationml/2006/main">
+  <p:cSld>
+    <p:spTree>
+      <p:nvGrpSpPr>
+        <p:cNvPr id="1" name=""/>
+        <p:cNvGrpSpPr/>
+        <p:nvPr/>
+      </p:nvGrpSpPr>
+      <p:grpSpPr>
+        <a:xfrm>
+          <a:off x="0" y="0"/>
+          <a:ext cx="0" cy="0"/>
+          <a:chOff x="0" y="0"/>
+          <a:chExt cx="0" cy="0"/>
+        </a:xfrm>
+      </p:grpSpPr>
+      <p:sp>
+        <p:nvSpPr>
+          <p:cNvPr id="2" name="Folienbildplatzhalter 1"/>
+          <p:cNvSpPr>
+            <a:spLocks noGrp="1" noRot="1" noChangeAspect="1"/>
+          </p:cNvSpPr>
+          <p:nvPr>
+            <p:ph type="sldImg"/>
+          </p:nvPr>
+        </p:nvSpPr>
+        <p:spPr/>
+      </p:sp>
+      <p:sp>
+        <p:nvSpPr>
+          <p:cNvPr id="3" name="Notizenplatzhalter 2"/>
+          <p:cNvSpPr>
+            <a:spLocks noGrp="1"/>
+          </p:cNvSpPr>
+          <p:nvPr>
+            <p:ph type="body" idx="1"/>
+          </p:nvPr>
+        </p:nvSpPr>
+        <p:spPr/>
+        <p:txBody>
+          <a:bodyPr/>
+          <a:lstStyle/>
+          <a:p>
+            <a:r>
+              <a:rPr lang="de-DE" dirty="0"/>
+              <a:t>Für das Demo Projekt nicht notwendig, aber wird oft gebraucht.</a:t>
+            </a:r>
+          </a:p>
+        </p:txBody>
+      </p:sp>
+      <p:sp>
+        <p:nvSpPr>
+          <p:cNvPr id="4" name="Foliennummernplatzhalter 3"/>
+          <p:cNvSpPr>
+            <a:spLocks noGrp="1"/>
+          </p:cNvSpPr>
+          <p:nvPr>
+            <p:ph type="sldNum" sz="quarter" idx="5"/>
+          </p:nvPr>
+        </p:nvSpPr>
+        <p:spPr/>
+        <p:txBody>
+          <a:bodyPr/>
+          <a:lstStyle/>
+          <a:p>
+            <a:fld id="{18182567-388C-4D33-8B7B-A651F195F118}" type="slidenum">
+              <a:rPr lang="de-DE" altLang="de-DE" smtClean="0"/>
+              <a:pPr/>
+              <a:t>20</a:t>
+            </a:fld>
+            <a:endParaRPr lang="de-DE" altLang="de-DE"/>
+          </a:p>
+        </p:txBody>
+      </p:sp>
+    </p:spTree>
+    <p:extLst>
+      <p:ext uri="{BB962C8B-B14F-4D97-AF65-F5344CB8AC3E}">
+        <p14:creationId xmlns:p14="http://schemas.microsoft.com/office/powerpoint/2010/main" val="3033990164"/>
+      </p:ext>
+    </p:extLst>
+  </p:cSld>
+  <p:clrMapOvr>
+    <a:masterClrMapping/>
+  </p:clrMapOvr>
+</p:notes>
+</file>
+
+<file path=ppt/notesSlides/notesSlide9.xml><?xml version="1.0" encoding="utf-8"?>
+<p:notes xmlns:a="http://schemas.openxmlformats.org/drawingml/2006/main" xmlns:r="http://schemas.openxmlformats.org/officeDocument/2006/relationships" xmlns:p="http://schemas.openxmlformats.org/presentationml/2006/main">
+  <p:cSld>
+    <p:spTree>
+      <p:nvGrpSpPr>
+        <p:cNvPr id="1" name=""/>
+        <p:cNvGrpSpPr/>
+        <p:nvPr/>
+      </p:nvGrpSpPr>
+      <p:grpSpPr>
+        <a:xfrm>
+          <a:off x="0" y="0"/>
+          <a:ext cx="0" cy="0"/>
+          <a:chOff x="0" y="0"/>
+          <a:chExt cx="0" cy="0"/>
+        </a:xfrm>
+      </p:grpSpPr>
+      <p:sp>
+        <p:nvSpPr>
+          <p:cNvPr id="2" name="Folienbildplatzhalter 1"/>
+          <p:cNvSpPr>
+            <a:spLocks noGrp="1" noRot="1" noChangeAspect="1"/>
+          </p:cNvSpPr>
+          <p:nvPr>
+            <p:ph type="sldImg"/>
+          </p:nvPr>
+        </p:nvSpPr>
+        <p:spPr/>
+      </p:sp>
+      <p:sp>
+        <p:nvSpPr>
+          <p:cNvPr id="3" name="Notizenplatzhalter 2"/>
+          <p:cNvSpPr>
+            <a:spLocks noGrp="1"/>
+          </p:cNvSpPr>
+          <p:nvPr>
+            <p:ph type="body" idx="1"/>
+          </p:nvPr>
+        </p:nvSpPr>
+        <p:spPr/>
+        <p:txBody>
+          <a:bodyPr/>
+          <a:lstStyle/>
+          <a:p>
+            <a:endParaRPr lang="de-DE" dirty="0"/>
+          </a:p>
+        </p:txBody>
+      </p:sp>
+      <p:sp>
+        <p:nvSpPr>
+          <p:cNvPr id="4" name="Foliennummernplatzhalter 3"/>
+          <p:cNvSpPr>
+            <a:spLocks noGrp="1"/>
+          </p:cNvSpPr>
+          <p:nvPr>
+            <p:ph type="sldNum" sz="quarter" idx="5"/>
+          </p:nvPr>
+        </p:nvSpPr>
+        <p:spPr/>
+        <p:txBody>
+          <a:bodyPr/>
+          <a:lstStyle/>
+          <a:p>
+            <a:fld id="{18182567-388C-4D33-8B7B-A651F195F118}" type="slidenum">
+              <a:rPr lang="de-DE" altLang="de-DE" smtClean="0"/>
+              <a:pPr/>
+              <a:t>21</a:t>
+            </a:fld>
+            <a:endParaRPr lang="de-DE" altLang="de-DE"/>
+          </a:p>
+        </p:txBody>
+      </p:sp>
+    </p:spTree>
+    <p:extLst>
+      <p:ext uri="{BB962C8B-B14F-4D97-AF65-F5344CB8AC3E}">
+        <p14:creationId xmlns:p14="http://schemas.microsoft.com/office/powerpoint/2010/main" val="3907952042"/>
       </p:ext>
     </p:extLst>
   </p:cSld>
@@ -1896,7 +2802,7 @@
               <a:pPr algn="ctr">
                 <a:defRPr/>
               </a:pPr>
-              <a:t>06.06.2024</a:t>
+              <a:t>07.06.2024</a:t>
             </a:fld>
             <a:endParaRPr lang="de-DE" sz="1000">
               <a:solidFill>
@@ -3940,6 +4846,199 @@
       </p:grpSpPr>
       <p:sp>
         <p:nvSpPr>
+          <p:cNvPr id="7170" name="Titel 1">
+            <a:extLst>
+              <a:ext uri="{FF2B5EF4-FFF2-40B4-BE49-F238E27FC236}">
+                <a16:creationId xmlns:a16="http://schemas.microsoft.com/office/drawing/2014/main" id="{14166EE9-31F6-1432-6B4F-746369646516}"/>
+              </a:ext>
+            </a:extLst>
+          </p:cNvPr>
+          <p:cNvSpPr>
+            <a:spLocks noGrp="1"/>
+          </p:cNvSpPr>
+          <p:nvPr>
+            <p:ph type="title"/>
+          </p:nvPr>
+        </p:nvSpPr>
+        <p:spPr>
+          <a:xfrm>
+            <a:off x="285750" y="150813"/>
+            <a:ext cx="5554663" cy="706437"/>
+          </a:xfrm>
+        </p:spPr>
+        <p:txBody>
+          <a:bodyPr/>
+          <a:lstStyle/>
+          <a:p>
+            <a:r>
+              <a:rPr lang="de-DE" altLang="de-DE" dirty="0"/>
+              <a:t>Lokale Entwicklung mit Docker</a:t>
+            </a:r>
+          </a:p>
+        </p:txBody>
+      </p:sp>
+      <p:sp>
+        <p:nvSpPr>
+          <p:cNvPr id="6" name="Textfeld 5">
+            <a:extLst>
+              <a:ext uri="{FF2B5EF4-FFF2-40B4-BE49-F238E27FC236}">
+                <a16:creationId xmlns:a16="http://schemas.microsoft.com/office/drawing/2014/main" id="{9CD25E95-B8E7-9391-5FA5-E84D7322D248}"/>
+              </a:ext>
+            </a:extLst>
+          </p:cNvPr>
+          <p:cNvSpPr txBox="1"/>
+          <p:nvPr/>
+        </p:nvSpPr>
+        <p:spPr bwMode="auto">
+          <a:xfrm>
+            <a:off x="4139952" y="1229333"/>
+            <a:ext cx="4862314" cy="1631216"/>
+          </a:xfrm>
+          <a:prstGeom prst="rect">
+            <a:avLst/>
+          </a:prstGeom>
+          <a:noFill/>
+          <a:ln w="9525">
+            <a:noFill/>
+            <a:miter lim="800000"/>
+            <a:headEnd/>
+            <a:tailEnd/>
+          </a:ln>
+        </p:spPr>
+        <p:txBody>
+          <a:bodyPr wrap="square" rtlCol="0" anchor="ctr">
+            <a:spAutoFit/>
+          </a:bodyPr>
+          <a:lstStyle/>
+          <a:p>
+            <a:pPr eaLnBrk="1" hangingPunct="1"/>
+            <a:r>
+              <a:rPr lang="de-DE" sz="2000" b="1" dirty="0">
+                <a:latin typeface="+mj-lt"/>
+              </a:rPr>
+              <a:t>Was ist ein Image?</a:t>
+            </a:r>
+            <a:endParaRPr lang="de-DE" sz="2000" b="1" dirty="0">
+              <a:latin typeface="Arial" charset="0"/>
+            </a:endParaRPr>
+          </a:p>
+          <a:p>
+            <a:pPr marL="342900" indent="-342900" eaLnBrk="1" hangingPunct="1">
+              <a:buFont typeface="Arial" panose="020B0604020202020204" pitchFamily="34" charset="0"/>
+              <a:buChar char="•"/>
+            </a:pPr>
+            <a:r>
+              <a:rPr lang="de-DE" sz="2000" dirty="0">
+                <a:latin typeface="Arial" charset="0"/>
+              </a:rPr>
+              <a:t>„Bauanleitung für Container“</a:t>
+            </a:r>
+          </a:p>
+          <a:p>
+            <a:pPr marL="342900" indent="-342900" eaLnBrk="1" hangingPunct="1">
+              <a:buFont typeface="Arial" panose="020B0604020202020204" pitchFamily="34" charset="0"/>
+              <a:buChar char="•"/>
+            </a:pPr>
+            <a:r>
+              <a:rPr lang="de-DE" sz="2000" dirty="0">
+                <a:latin typeface="Arial" charset="0"/>
+              </a:rPr>
+              <a:t>Ein Image, viele Container</a:t>
+            </a:r>
+          </a:p>
+          <a:p>
+            <a:pPr marL="342900" indent="-342900" eaLnBrk="1" hangingPunct="1">
+              <a:buFont typeface="Arial" panose="020B0604020202020204" pitchFamily="34" charset="0"/>
+              <a:buChar char="•"/>
+            </a:pPr>
+            <a:r>
+              <a:rPr lang="de-DE" sz="2000" dirty="0">
+                <a:latin typeface="Arial" charset="0"/>
+              </a:rPr>
+              <a:t>Werden in Schichten gebaut</a:t>
+            </a:r>
+          </a:p>
+          <a:p>
+            <a:pPr marL="342900" indent="-342900" eaLnBrk="1" hangingPunct="1">
+              <a:buFont typeface="Arial" panose="020B0604020202020204" pitchFamily="34" charset="0"/>
+              <a:buChar char="•"/>
+            </a:pPr>
+            <a:r>
+              <a:rPr lang="de-DE" sz="2000" dirty="0">
+                <a:latin typeface="Arial" charset="0"/>
+              </a:rPr>
+              <a:t>Basieren auf anderen Images</a:t>
+            </a:r>
+          </a:p>
+        </p:txBody>
+      </p:sp>
+      <p:pic>
+        <p:nvPicPr>
+          <p:cNvPr id="7" name="Inhaltsplatzhalter 6" descr="Ein Bild, das Elektronik, Compact Disc, Datenträger, CD enthält.&#10;&#10;Automatisch generierte Beschreibung">
+            <a:extLst>
+              <a:ext uri="{FF2B5EF4-FFF2-40B4-BE49-F238E27FC236}">
+                <a16:creationId xmlns:a16="http://schemas.microsoft.com/office/drawing/2014/main" id="{E22FBDEF-E23A-233B-B93E-55198BCB9CD2}"/>
+              </a:ext>
+            </a:extLst>
+          </p:cNvPr>
+          <p:cNvPicPr>
+            <a:picLocks noGrp="1" noChangeAspect="1"/>
+          </p:cNvPicPr>
+          <p:nvPr>
+            <p:ph idx="1"/>
+          </p:nvPr>
+        </p:nvPicPr>
+        <p:blipFill>
+          <a:blip r:embed="rId3">
+            <a:extLst>
+              <a:ext uri="{28A0092B-C50C-407E-A947-70E740481C1C}">
+                <a14:useLocalDpi xmlns:a14="http://schemas.microsoft.com/office/drawing/2010/main" val="0"/>
+              </a:ext>
+            </a:extLst>
+          </a:blip>
+          <a:stretch>
+            <a:fillRect/>
+          </a:stretch>
+        </p:blipFill>
+        <p:spPr>
+          <a:xfrm>
+            <a:off x="10466" y="2802674"/>
+            <a:ext cx="3985470" cy="3435060"/>
+          </a:xfrm>
+        </p:spPr>
+      </p:pic>
+    </p:spTree>
+    <p:extLst>
+      <p:ext uri="{BB962C8B-B14F-4D97-AF65-F5344CB8AC3E}">
+        <p14:creationId xmlns:p14="http://schemas.microsoft.com/office/powerpoint/2010/main" val="2158894280"/>
+      </p:ext>
+    </p:extLst>
+  </p:cSld>
+  <p:clrMapOvr>
+    <a:masterClrMapping/>
+  </p:clrMapOvr>
+</p:sld>
+</file>
+
+<file path=ppt/slides/slide11.xml><?xml version="1.0" encoding="utf-8"?>
+<p:sld xmlns:a="http://schemas.openxmlformats.org/drawingml/2006/main" xmlns:r="http://schemas.openxmlformats.org/officeDocument/2006/relationships" xmlns:p="http://schemas.openxmlformats.org/presentationml/2006/main">
+  <p:cSld>
+    <p:spTree>
+      <p:nvGrpSpPr>
+        <p:cNvPr id="1" name=""/>
+        <p:cNvGrpSpPr/>
+        <p:nvPr/>
+      </p:nvGrpSpPr>
+      <p:grpSpPr>
+        <a:xfrm>
+          <a:off x="0" y="0"/>
+          <a:ext cx="0" cy="0"/>
+          <a:chOff x="0" y="0"/>
+          <a:chExt cx="0" cy="0"/>
+        </a:xfrm>
+      </p:grpSpPr>
+      <p:sp>
+        <p:nvSpPr>
           <p:cNvPr id="2" name="Titel 1">
             <a:extLst>
               <a:ext uri="{FF2B5EF4-FFF2-40B4-BE49-F238E27FC236}">
@@ -4390,7 +5489,7 @@
 </p:sld>
 </file>
 
-<file path=ppt/slides/slide11.xml><?xml version="1.0" encoding="utf-8"?>
+<file path=ppt/slides/slide12.xml><?xml version="1.0" encoding="utf-8"?>
 <p:sld xmlns:a="http://schemas.openxmlformats.org/drawingml/2006/main" xmlns:r="http://schemas.openxmlformats.org/officeDocument/2006/relationships" xmlns:p="http://schemas.openxmlformats.org/presentationml/2006/main">
   <p:cSld>
     <p:spTree>
@@ -4435,44 +5534,6 @@
           </a:p>
         </p:txBody>
       </p:sp>
-      <p:pic>
-        <p:nvPicPr>
-          <p:cNvPr id="5" name="Inhaltsplatzhalter 4" descr="Ein Bild, das computer, Computer, Kleidung, Kerze enthält.&#10;&#10;Automatisch generierte Beschreibung">
-            <a:extLst>
-              <a:ext uri="{FF2B5EF4-FFF2-40B4-BE49-F238E27FC236}">
-                <a16:creationId xmlns:a16="http://schemas.microsoft.com/office/drawing/2014/main" id="{CEC9D8F3-E757-9742-C99C-C76831B3A640}"/>
-              </a:ext>
-            </a:extLst>
-          </p:cNvPr>
-          <p:cNvPicPr>
-            <a:picLocks noGrp="1" noChangeAspect="1"/>
-          </p:cNvPicPr>
-          <p:nvPr>
-            <p:ph idx="1"/>
-          </p:nvPr>
-        </p:nvPicPr>
-        <p:blipFill>
-          <a:blip r:embed="rId2">
-            <a:extLst>
-              <a:ext uri="{28A0092B-C50C-407E-A947-70E740481C1C}">
-                <a14:useLocalDpi xmlns:a14="http://schemas.microsoft.com/office/drawing/2010/main" val="0"/>
-              </a:ext>
-            </a:extLst>
-          </a:blip>
-          <a:stretch>
-            <a:fillRect/>
-          </a:stretch>
-        </p:blipFill>
-        <p:spPr>
-          <a:xfrm>
-            <a:off x="2877218" y="3933056"/>
-            <a:ext cx="3389563" cy="2259709"/>
-          </a:xfrm>
-          <a:effectLst>
-            <a:softEdge rad="63500"/>
-          </a:effectLst>
-        </p:spPr>
-      </p:pic>
       <p:sp>
         <p:nvSpPr>
           <p:cNvPr id="7" name="Textfeld 6">
@@ -4798,6 +5859,44 @@
           </a:p>
         </p:txBody>
       </p:sp>
+      <p:pic>
+        <p:nvPicPr>
+          <p:cNvPr id="11" name="Inhaltsplatzhalter 10" descr="Ein Bild, das Cartoon, Hut, Menschliches Gesicht, Buch enthält.&#10;&#10;Automatisch generierte Beschreibung">
+            <a:extLst>
+              <a:ext uri="{FF2B5EF4-FFF2-40B4-BE49-F238E27FC236}">
+                <a16:creationId xmlns:a16="http://schemas.microsoft.com/office/drawing/2014/main" id="{A7B21973-93E5-A6AA-FE4F-FFE4C7985C77}"/>
+              </a:ext>
+            </a:extLst>
+          </p:cNvPr>
+          <p:cNvPicPr>
+            <a:picLocks noGrp="1" noChangeAspect="1"/>
+          </p:cNvPicPr>
+          <p:nvPr>
+            <p:ph idx="1"/>
+          </p:nvPr>
+        </p:nvPicPr>
+        <p:blipFill>
+          <a:blip r:embed="rId6">
+            <a:extLst>
+              <a:ext uri="{28A0092B-C50C-407E-A947-70E740481C1C}">
+                <a14:useLocalDpi xmlns:a14="http://schemas.microsoft.com/office/drawing/2010/main" val="0"/>
+              </a:ext>
+            </a:extLst>
+          </a:blip>
+          <a:stretch>
+            <a:fillRect/>
+          </a:stretch>
+        </p:blipFill>
+        <p:spPr>
+          <a:xfrm>
+            <a:off x="2411760" y="3575546"/>
+            <a:ext cx="3605560" cy="2804325"/>
+          </a:xfrm>
+          <a:effectLst>
+            <a:softEdge rad="25400"/>
+          </a:effectLst>
+        </p:spPr>
+      </p:pic>
     </p:spTree>
     <p:extLst>
       <p:ext uri="{BB962C8B-B14F-4D97-AF65-F5344CB8AC3E}">
@@ -4811,7 +5910,7 @@
 </p:sld>
 </file>
 
-<file path=ppt/slides/slide12.xml><?xml version="1.0" encoding="utf-8"?>
+<file path=ppt/slides/slide13.xml><?xml version="1.0" encoding="utf-8"?>
 <p:sld xmlns:a="http://schemas.openxmlformats.org/drawingml/2006/main" xmlns:r="http://schemas.openxmlformats.org/officeDocument/2006/relationships" xmlns:p="http://schemas.openxmlformats.org/presentationml/2006/main">
   <p:cSld>
     <p:spTree>
@@ -4999,287 +6098,6 @@
 </p:sld>
 </file>
 
-<file path=ppt/slides/slide13.xml><?xml version="1.0" encoding="utf-8"?>
-<p:sld xmlns:a="http://schemas.openxmlformats.org/drawingml/2006/main" xmlns:r="http://schemas.openxmlformats.org/officeDocument/2006/relationships" xmlns:p="http://schemas.openxmlformats.org/presentationml/2006/main">
-  <p:cSld>
-    <p:spTree>
-      <p:nvGrpSpPr>
-        <p:cNvPr id="1" name=""/>
-        <p:cNvGrpSpPr/>
-        <p:nvPr/>
-      </p:nvGrpSpPr>
-      <p:grpSpPr>
-        <a:xfrm>
-          <a:off x="0" y="0"/>
-          <a:ext cx="0" cy="0"/>
-          <a:chOff x="0" y="0"/>
-          <a:chExt cx="0" cy="0"/>
-        </a:xfrm>
-      </p:grpSpPr>
-      <p:sp>
-        <p:nvSpPr>
-          <p:cNvPr id="2" name="Titel 1">
-            <a:extLst>
-              <a:ext uri="{FF2B5EF4-FFF2-40B4-BE49-F238E27FC236}">
-                <a16:creationId xmlns:a16="http://schemas.microsoft.com/office/drawing/2014/main" id="{14CE78CD-8283-9E7B-B613-42B66D240626}"/>
-              </a:ext>
-            </a:extLst>
-          </p:cNvPr>
-          <p:cNvSpPr>
-            <a:spLocks noGrp="1"/>
-          </p:cNvSpPr>
-          <p:nvPr>
-            <p:ph type="title"/>
-          </p:nvPr>
-        </p:nvSpPr>
-        <p:spPr/>
-        <p:txBody>
-          <a:bodyPr/>
-          <a:lstStyle/>
-          <a:p>
-            <a:r>
-              <a:rPr lang="de-DE" altLang="de-DE" dirty="0"/>
-              <a:t>Lokale Entwicklung mit Docker</a:t>
-            </a:r>
-            <a:endParaRPr lang="de-DE" dirty="0"/>
-          </a:p>
-        </p:txBody>
-      </p:sp>
-      <p:sp>
-        <p:nvSpPr>
-          <p:cNvPr id="3" name="Inhaltsplatzhalter 2">
-            <a:extLst>
-              <a:ext uri="{FF2B5EF4-FFF2-40B4-BE49-F238E27FC236}">
-                <a16:creationId xmlns:a16="http://schemas.microsoft.com/office/drawing/2014/main" id="{F8D03162-A290-8535-F9FD-8ACB2F578B1B}"/>
-              </a:ext>
-            </a:extLst>
-          </p:cNvPr>
-          <p:cNvSpPr>
-            <a:spLocks noGrp="1"/>
-          </p:cNvSpPr>
-          <p:nvPr>
-            <p:ph idx="1"/>
-          </p:nvPr>
-        </p:nvSpPr>
-        <p:spPr>
-          <a:xfrm>
-            <a:off x="303213" y="981075"/>
-            <a:ext cx="8516937" cy="3888085"/>
-          </a:xfrm>
-        </p:spPr>
-        <p:txBody>
-          <a:bodyPr/>
-          <a:lstStyle/>
-          <a:p>
-            <a:pPr marL="0" indent="0">
-              <a:buNone/>
-            </a:pPr>
-            <a:r>
-              <a:rPr lang="de-DE" b="1" dirty="0"/>
-              <a:t>FROM &lt;Image&gt;</a:t>
-            </a:r>
-          </a:p>
-          <a:p>
-            <a:pPr>
-              <a:buFont typeface="Arial" panose="020B0604020202020204" pitchFamily="34" charset="0"/>
-              <a:buChar char="•"/>
-            </a:pPr>
-            <a:r>
-              <a:rPr lang="de-DE" dirty="0"/>
-              <a:t>Basis für das neue Image</a:t>
-            </a:r>
-          </a:p>
-          <a:p>
-            <a:pPr>
-              <a:buFont typeface="Arial" panose="020B0604020202020204" pitchFamily="34" charset="0"/>
-              <a:buChar char="•"/>
-            </a:pPr>
-            <a:r>
-              <a:rPr lang="de-DE" dirty="0"/>
-              <a:t>Kann lokal oder in </a:t>
-            </a:r>
-            <a:r>
-              <a:rPr lang="de-DE" dirty="0" err="1"/>
-              <a:t>Registries</a:t>
-            </a:r>
-            <a:r>
-              <a:rPr lang="de-DE" dirty="0"/>
-              <a:t> sein</a:t>
-            </a:r>
-          </a:p>
-          <a:p>
-            <a:pPr>
-              <a:buFont typeface="Arial" panose="020B0604020202020204" pitchFamily="34" charset="0"/>
-              <a:buChar char="•"/>
-            </a:pPr>
-            <a:r>
-              <a:rPr lang="de-DE" dirty="0"/>
-              <a:t>Optional</a:t>
-            </a:r>
-          </a:p>
-          <a:p>
-            <a:pPr>
-              <a:buFont typeface="Arial" panose="020B0604020202020204" pitchFamily="34" charset="0"/>
-              <a:buChar char="•"/>
-            </a:pPr>
-            <a:r>
-              <a:rPr lang="de-DE" dirty="0"/>
-              <a:t>Wenn fehlt, wird das Image „</a:t>
-            </a:r>
-            <a:r>
-              <a:rPr lang="de-DE" dirty="0" err="1"/>
-              <a:t>scratch</a:t>
-            </a:r>
-            <a:r>
-              <a:rPr lang="de-DE" dirty="0"/>
-              <a:t>“ als Basis verwendet</a:t>
-            </a:r>
-          </a:p>
-          <a:p>
-            <a:pPr>
-              <a:buFont typeface="Arial" panose="020B0604020202020204" pitchFamily="34" charset="0"/>
-              <a:buChar char="•"/>
-            </a:pPr>
-            <a:r>
-              <a:rPr lang="de-DE" dirty="0"/>
-              <a:t>Nur eine Basis pro </a:t>
-            </a:r>
-            <a:r>
-              <a:rPr lang="de-DE" dirty="0" err="1"/>
-              <a:t>Dockerfile</a:t>
-            </a:r>
-            <a:endParaRPr lang="de-DE" dirty="0"/>
-          </a:p>
-          <a:p>
-            <a:pPr>
-              <a:buFont typeface="Arial" panose="020B0604020202020204" pitchFamily="34" charset="0"/>
-              <a:buChar char="•"/>
-            </a:pPr>
-            <a:endParaRPr lang="de-DE" dirty="0"/>
-          </a:p>
-        </p:txBody>
-      </p:sp>
-      <p:pic>
-        <p:nvPicPr>
-          <p:cNvPr id="4" name="Grafik 3">
-            <a:extLst>
-              <a:ext uri="{FF2B5EF4-FFF2-40B4-BE49-F238E27FC236}">
-                <a16:creationId xmlns:a16="http://schemas.microsoft.com/office/drawing/2014/main" id="{0E72DCD3-F329-D8E8-8EDD-A328294ACFFD}"/>
-              </a:ext>
-            </a:extLst>
-          </p:cNvPr>
-          <p:cNvPicPr>
-            <a:picLocks noChangeAspect="1"/>
-          </p:cNvPicPr>
-          <p:nvPr/>
-        </p:nvPicPr>
-        <p:blipFill>
-          <a:blip r:embed="rId2">
-            <a:extLst>
-              <a:ext uri="{28A0092B-C50C-407E-A947-70E740481C1C}">
-                <a14:useLocalDpi xmlns:a14="http://schemas.microsoft.com/office/drawing/2010/main" val="0"/>
-              </a:ext>
-            </a:extLst>
-          </a:blip>
-          <a:srcRect/>
-          <a:stretch/>
-        </p:blipFill>
-        <p:spPr>
-          <a:xfrm>
-            <a:off x="5289564" y="3555014"/>
-            <a:ext cx="3522269" cy="2628292"/>
-          </a:xfrm>
-          <a:prstGeom prst="rect">
-            <a:avLst/>
-          </a:prstGeom>
-        </p:spPr>
-      </p:pic>
-      <p:sp>
-        <p:nvSpPr>
-          <p:cNvPr id="5" name="Rechteck 4">
-            <a:extLst>
-              <a:ext uri="{FF2B5EF4-FFF2-40B4-BE49-F238E27FC236}">
-                <a16:creationId xmlns:a16="http://schemas.microsoft.com/office/drawing/2014/main" id="{31E39CB4-1AC2-A872-1417-5A3B4119DE3C}"/>
-              </a:ext>
-            </a:extLst>
-          </p:cNvPr>
-          <p:cNvSpPr/>
-          <p:nvPr/>
-        </p:nvSpPr>
-        <p:spPr bwMode="auto">
-          <a:xfrm>
-            <a:off x="5281247" y="3555014"/>
-            <a:ext cx="3559540" cy="306034"/>
-          </a:xfrm>
-          <a:prstGeom prst="rect">
-            <a:avLst/>
-          </a:prstGeom>
-          <a:solidFill>
-            <a:schemeClr val="accent1">
-              <a:alpha val="24000"/>
-            </a:schemeClr>
-          </a:solidFill>
-          <a:ln w="12700" cap="flat" cmpd="sng" algn="ctr">
-            <a:solidFill>
-              <a:schemeClr val="tx1"/>
-            </a:solidFill>
-            <a:prstDash val="solid"/>
-            <a:round/>
-            <a:headEnd type="none" w="sm" len="sm"/>
-            <a:tailEnd type="none" w="sm" len="sm"/>
-          </a:ln>
-          <a:effectLst/>
-        </p:spPr>
-        <p:txBody>
-          <a:bodyPr vert="horz" wrap="square" lIns="91440" tIns="45720" rIns="91440" bIns="45720" numCol="1" rtlCol="0" anchor="t" anchorCtr="0" compatLnSpc="1">
-            <a:prstTxWarp prst="textNoShape">
-              <a:avLst/>
-            </a:prstTxWarp>
-          </a:bodyPr>
-          <a:lstStyle/>
-          <a:p>
-            <a:pPr marL="0" marR="0" indent="0" algn="l" defTabSz="914400" rtl="0" eaLnBrk="0" fontAlgn="base" latinLnBrk="0" hangingPunct="0">
-              <a:lnSpc>
-                <a:spcPct val="100000"/>
-              </a:lnSpc>
-              <a:spcBef>
-                <a:spcPct val="0"/>
-              </a:spcBef>
-              <a:spcAft>
-                <a:spcPct val="0"/>
-              </a:spcAft>
-              <a:buClrTx/>
-              <a:buSzTx/>
-              <a:buFontTx/>
-              <a:buNone/>
-              <a:tabLst/>
-            </a:pPr>
-            <a:endParaRPr kumimoji="0" lang="de-DE" sz="2400" b="0" i="0" u="none" strike="noStrike" cap="none" normalizeH="0" baseline="0">
-              <a:ln>
-                <a:noFill/>
-              </a:ln>
-              <a:solidFill>
-                <a:schemeClr val="tx1"/>
-              </a:solidFill>
-              <a:effectLst/>
-              <a:latin typeface="Times New Roman" pitchFamily="18" charset="0"/>
-            </a:endParaRPr>
-          </a:p>
-        </p:txBody>
-      </p:sp>
-    </p:spTree>
-    <p:extLst>
-      <p:ext uri="{BB962C8B-B14F-4D97-AF65-F5344CB8AC3E}">
-        <p14:creationId xmlns:p14="http://schemas.microsoft.com/office/powerpoint/2010/main" val="3855785619"/>
-      </p:ext>
-    </p:extLst>
-  </p:cSld>
-  <p:clrMapOvr>
-    <a:masterClrMapping/>
-  </p:clrMapOvr>
-</p:sld>
-</file>
-
 <file path=ppt/slides/slide14.xml><?xml version="1.0" encoding="utf-8"?>
 <p:sld xmlns:a="http://schemas.openxmlformats.org/drawingml/2006/main" xmlns:r="http://schemas.openxmlformats.org/officeDocument/2006/relationships" xmlns:p="http://schemas.openxmlformats.org/presentationml/2006/main">
   <p:cSld>
@@ -5357,7 +6175,7 @@
             </a:pPr>
             <a:r>
               <a:rPr lang="de-DE" b="1" dirty="0"/>
-              <a:t>WORKDIR &lt;Directory&gt;</a:t>
+              <a:t>FROM &lt;Image&gt;</a:t>
             </a:r>
           </a:p>
           <a:p>
@@ -5367,7 +6185,7 @@
             </a:pPr>
             <a:r>
               <a:rPr lang="de-DE" dirty="0"/>
-              <a:t>Setzt Arbeitsverzeichnis</a:t>
+              <a:t>Basis für das neue Image</a:t>
             </a:r>
           </a:p>
           <a:p>
@@ -5377,8 +6195,66 @@
             </a:pPr>
             <a:r>
               <a:rPr lang="de-DE" dirty="0"/>
-              <a:t>Alle Befehle werden hier ausgeführt wird</a:t>
-            </a:r>
+              <a:t>Kann lokal oder in </a:t>
+            </a:r>
+            <a:r>
+              <a:rPr lang="de-DE" dirty="0" err="1"/>
+              <a:t>Registries</a:t>
+            </a:r>
+            <a:r>
+              <a:rPr lang="de-DE" dirty="0"/>
+              <a:t> sein</a:t>
+            </a:r>
+          </a:p>
+          <a:p>
+            <a:pPr>
+              <a:buFont typeface="Arial" panose="020B0604020202020204" pitchFamily="34" charset="0"/>
+              <a:buChar char="•"/>
+            </a:pPr>
+            <a:r>
+              <a:rPr lang="de-DE" dirty="0"/>
+              <a:t>Optional</a:t>
+            </a:r>
+          </a:p>
+          <a:p>
+            <a:pPr>
+              <a:buFont typeface="Arial" panose="020B0604020202020204" pitchFamily="34" charset="0"/>
+              <a:buChar char="•"/>
+            </a:pPr>
+            <a:r>
+              <a:rPr lang="de-DE" dirty="0"/>
+              <a:t>Wenn fehlt, wird das Image „</a:t>
+            </a:r>
+            <a:r>
+              <a:rPr lang="de-DE" dirty="0" err="1"/>
+              <a:t>scratch</a:t>
+            </a:r>
+            <a:r>
+              <a:rPr lang="de-DE" dirty="0"/>
+              <a:t>“ als Basis verwendet</a:t>
+            </a:r>
+          </a:p>
+          <a:p>
+            <a:pPr>
+              <a:buFont typeface="Arial" panose="020B0604020202020204" pitchFamily="34" charset="0"/>
+              <a:buChar char="•"/>
+            </a:pPr>
+            <a:r>
+              <a:rPr lang="de-DE" dirty="0"/>
+              <a:t>Nur eine Basis pro </a:t>
+            </a:r>
+            <a:r>
+              <a:rPr lang="de-DE" dirty="0" err="1"/>
+              <a:t>Dockerfile</a:t>
+            </a:r>
+            <a:endParaRPr lang="de-DE" dirty="0"/>
+          </a:p>
+          <a:p>
+            <a:pPr>
+              <a:buFont typeface="Arial" panose="020B0604020202020204" pitchFamily="34" charset="0"/>
+              <a:buChar char="•"/>
+            </a:pPr>
+            <a:endParaRPr lang="de-DE" dirty="0"/>
           </a:p>
         </p:txBody>
       </p:sp>
@@ -5431,20 +6307,20 @@
         </p:nvSpPr>
         <p:spPr bwMode="auto">
           <a:xfrm>
-            <a:off x="5281247" y="3933056"/>
+            <a:off x="5281247" y="3555014"/>
             <a:ext cx="3559540" cy="306034"/>
           </a:xfrm>
           <a:prstGeom prst="rect">
             <a:avLst/>
           </a:prstGeom>
           <a:solidFill>
-            <a:schemeClr val="accent1">
+            <a:schemeClr val="accent2">
               <a:alpha val="24000"/>
             </a:schemeClr>
           </a:solidFill>
           <a:ln w="12700" cap="flat" cmpd="sng" algn="ctr">
             <a:solidFill>
-              <a:schemeClr val="tx1"/>
+              <a:srgbClr val="0D4F3C"/>
             </a:solidFill>
             <a:prstDash val="solid"/>
             <a:round/>
@@ -5493,7 +6369,7 @@
     </p:spTree>
     <p:extLst>
       <p:ext uri="{BB962C8B-B14F-4D97-AF65-F5344CB8AC3E}">
-        <p14:creationId xmlns:p14="http://schemas.microsoft.com/office/powerpoint/2010/main" val="1526919550"/>
+        <p14:creationId xmlns:p14="http://schemas.microsoft.com/office/powerpoint/2010/main" val="3855785619"/>
       </p:ext>
     </p:extLst>
   </p:cSld>
@@ -5580,7 +6456,7 @@
             </a:pPr>
             <a:r>
               <a:rPr lang="de-DE" b="1" dirty="0"/>
-              <a:t>ENV &lt;Name&gt;=&lt;Value&gt;</a:t>
+              <a:t>WORKDIR &lt;Directory&gt;</a:t>
             </a:r>
           </a:p>
           <a:p>
@@ -5590,7 +6466,7 @@
             </a:pPr>
             <a:r>
               <a:rPr lang="de-DE" dirty="0"/>
-              <a:t>Setzt Umgebungsvariablen</a:t>
+              <a:t>Setzt Arbeitsverzeichnis</a:t>
             </a:r>
           </a:p>
           <a:p>
@@ -5600,17 +6476,7 @@
             </a:pPr>
             <a:r>
               <a:rPr lang="de-DE" dirty="0"/>
-              <a:t>Beliebig viele pro Command </a:t>
-            </a:r>
-          </a:p>
-          <a:p>
-            <a:pPr lvl="1">
-              <a:buFont typeface="Arial" panose="020B0604020202020204" pitchFamily="34" charset="0"/>
-              <a:buChar char="•"/>
-            </a:pPr>
-            <a:r>
-              <a:rPr lang="de-DE" dirty="0"/>
-              <a:t>ENV &lt;Name1&gt;=&lt;Value1&gt; &lt;Name2&gt;=&lt;Value2&gt; …</a:t>
+              <a:t>Alle Befehle werden hier ausgeführt wird</a:t>
             </a:r>
           </a:p>
         </p:txBody>
@@ -5664,20 +6530,20 @@
         </p:nvSpPr>
         <p:spPr bwMode="auto">
           <a:xfrm>
-            <a:off x="5281247" y="4347102"/>
+            <a:off x="5281247" y="3933056"/>
             <a:ext cx="3559540" cy="306034"/>
           </a:xfrm>
           <a:prstGeom prst="rect">
             <a:avLst/>
           </a:prstGeom>
           <a:solidFill>
-            <a:schemeClr val="accent1">
+            <a:schemeClr val="accent2">
               <a:alpha val="24000"/>
             </a:schemeClr>
           </a:solidFill>
           <a:ln w="12700" cap="flat" cmpd="sng" algn="ctr">
             <a:solidFill>
-              <a:schemeClr val="tx1"/>
+              <a:srgbClr val="0D4F3C"/>
             </a:solidFill>
             <a:prstDash val="solid"/>
             <a:round/>
@@ -5726,7 +6592,7 @@
     </p:spTree>
     <p:extLst>
       <p:ext uri="{BB962C8B-B14F-4D97-AF65-F5344CB8AC3E}">
-        <p14:creationId xmlns:p14="http://schemas.microsoft.com/office/powerpoint/2010/main" val="1278368705"/>
+        <p14:creationId xmlns:p14="http://schemas.microsoft.com/office/powerpoint/2010/main" val="1526919550"/>
       </p:ext>
     </p:extLst>
   </p:cSld>
@@ -5813,7 +6679,7 @@
             </a:pPr>
             <a:r>
               <a:rPr lang="de-DE" b="1" dirty="0"/>
-              <a:t>COPY &lt;Source&gt; &lt;Destination&gt;</a:t>
+              <a:t>ENV &lt;Name&gt;=&lt;Value&gt;</a:t>
             </a:r>
           </a:p>
           <a:p>
@@ -5823,7 +6689,7 @@
             </a:pPr>
             <a:r>
               <a:rPr lang="de-DE" dirty="0"/>
-              <a:t>Kopiert Dateien und Verzeichnisse in den Container</a:t>
+              <a:t>Setzt Umgebungsvariablen</a:t>
             </a:r>
           </a:p>
           <a:p>
@@ -5833,7 +6699,17 @@
             </a:pPr>
             <a:r>
               <a:rPr lang="de-DE" dirty="0"/>
-              <a:t>Destination ist relativ zum Arbeitsverzeichnis</a:t>
+              <a:t>Beliebig viele pro Command </a:t>
+            </a:r>
+          </a:p>
+          <a:p>
+            <a:pPr lvl="1">
+              <a:buFont typeface="Arial" panose="020B0604020202020204" pitchFamily="34" charset="0"/>
+              <a:buChar char="•"/>
+            </a:pPr>
+            <a:r>
+              <a:rPr lang="de-DE" dirty="0"/>
+              <a:t>ENV &lt;Name1&gt;=&lt;Value1&gt; &lt;Name2&gt;=&lt;Value2&gt; …</a:t>
             </a:r>
           </a:p>
         </p:txBody>
@@ -5887,20 +6763,20 @@
         </p:nvSpPr>
         <p:spPr bwMode="auto">
           <a:xfrm>
-            <a:off x="5281247" y="4725144"/>
+            <a:off x="5281247" y="4347102"/>
             <a:ext cx="3559540" cy="306034"/>
           </a:xfrm>
           <a:prstGeom prst="rect">
             <a:avLst/>
           </a:prstGeom>
           <a:solidFill>
-            <a:schemeClr val="accent1">
+            <a:schemeClr val="accent2">
               <a:alpha val="24000"/>
             </a:schemeClr>
           </a:solidFill>
           <a:ln w="12700" cap="flat" cmpd="sng" algn="ctr">
             <a:solidFill>
-              <a:schemeClr val="tx1"/>
+              <a:srgbClr val="0D4F3C"/>
             </a:solidFill>
             <a:prstDash val="solid"/>
             <a:round/>
@@ -5949,7 +6825,7 @@
     </p:spTree>
     <p:extLst>
       <p:ext uri="{BB962C8B-B14F-4D97-AF65-F5344CB8AC3E}">
-        <p14:creationId xmlns:p14="http://schemas.microsoft.com/office/powerpoint/2010/main" val="2995769550"/>
+        <p14:creationId xmlns:p14="http://schemas.microsoft.com/office/powerpoint/2010/main" val="1278368705"/>
       </p:ext>
     </p:extLst>
   </p:cSld>
@@ -6036,7 +6912,7 @@
             </a:pPr>
             <a:r>
               <a:rPr lang="de-DE" b="1" dirty="0"/>
-              <a:t>RUN &lt;Command&gt;</a:t>
+              <a:t>COPY &lt;Source&gt; &lt;Destination&gt;</a:t>
             </a:r>
           </a:p>
           <a:p>
@@ -6046,7 +6922,7 @@
             </a:pPr>
             <a:r>
               <a:rPr lang="de-DE" dirty="0"/>
-              <a:t>Führt einen Befehl aus</a:t>
+              <a:t>Kopiert Dateien und Verzeichnisse in den Container</a:t>
             </a:r>
           </a:p>
           <a:p>
@@ -6056,35 +6932,7 @@
             </a:pPr>
             <a:r>
               <a:rPr lang="de-DE" dirty="0"/>
-              <a:t>Wird einmal beim Bauen des Images ausgeführt</a:t>
-            </a:r>
-          </a:p>
-          <a:p>
-            <a:pPr>
-              <a:buFont typeface="Arial" panose="020B0604020202020204" pitchFamily="34" charset="0"/>
-              <a:buChar char="•"/>
-            </a:pPr>
-            <a:r>
-              <a:rPr lang="de-DE" dirty="0"/>
-              <a:t>RUN &lt;Command&gt;</a:t>
-            </a:r>
-          </a:p>
-          <a:p>
-            <a:pPr>
-              <a:buFont typeface="Arial" panose="020B0604020202020204" pitchFamily="34" charset="0"/>
-              <a:buChar char="•"/>
-            </a:pPr>
-            <a:r>
-              <a:rPr lang="de-DE" dirty="0"/>
-              <a:t>RUN [&lt;</a:t>
-            </a:r>
-            <a:r>
-              <a:rPr lang="de-DE" dirty="0" err="1"/>
-              <a:t>Program</a:t>
-            </a:r>
-            <a:r>
-              <a:rPr lang="de-DE" dirty="0"/>
-              <a:t>&gt;,&lt;Param1&gt;, …]</a:t>
+              <a:t>Destination ist relativ zum Arbeitsverzeichnis</a:t>
             </a:r>
           </a:p>
         </p:txBody>
@@ -6138,20 +6986,20 @@
         </p:nvSpPr>
         <p:spPr bwMode="auto">
           <a:xfrm>
-            <a:off x="5281247" y="5139190"/>
+            <a:off x="5281247" y="4725144"/>
             <a:ext cx="3559540" cy="306034"/>
           </a:xfrm>
           <a:prstGeom prst="rect">
             <a:avLst/>
           </a:prstGeom>
           <a:solidFill>
-            <a:schemeClr val="accent1">
+            <a:schemeClr val="accent2">
               <a:alpha val="24000"/>
             </a:schemeClr>
           </a:solidFill>
           <a:ln w="12700" cap="flat" cmpd="sng" algn="ctr">
             <a:solidFill>
-              <a:schemeClr val="tx1"/>
+              <a:srgbClr val="0D4F3C"/>
             </a:solidFill>
             <a:prstDash val="solid"/>
             <a:round/>
@@ -6200,7 +7048,7 @@
     </p:spTree>
     <p:extLst>
       <p:ext uri="{BB962C8B-B14F-4D97-AF65-F5344CB8AC3E}">
-        <p14:creationId xmlns:p14="http://schemas.microsoft.com/office/powerpoint/2010/main" val="1258100051"/>
+        <p14:creationId xmlns:p14="http://schemas.microsoft.com/office/powerpoint/2010/main" val="2995769550"/>
       </p:ext>
     </p:extLst>
   </p:cSld>
@@ -6287,7 +7135,7 @@
             </a:pPr>
             <a:r>
               <a:rPr lang="de-DE" b="1" dirty="0"/>
-              <a:t>CMD &lt;Command&gt;</a:t>
+              <a:t>RUN &lt;Command&gt;</a:t>
             </a:r>
           </a:p>
           <a:p>
@@ -6297,7 +7145,7 @@
             </a:pPr>
             <a:r>
               <a:rPr lang="de-DE" dirty="0"/>
-              <a:t>Gibt den Standartstartbefehl an</a:t>
+              <a:t>Führt einen Befehl aus</a:t>
             </a:r>
           </a:p>
           <a:p>
@@ -6307,7 +7155,7 @@
             </a:pPr>
             <a:r>
               <a:rPr lang="de-DE" dirty="0"/>
-              <a:t>Wird standartmäßig beim Containerstart ausgeführt</a:t>
+              <a:t>Wird einmal beim Bauen des Images ausgeführt</a:t>
             </a:r>
           </a:p>
           <a:p>
@@ -6317,17 +7165,7 @@
             </a:pPr>
             <a:r>
               <a:rPr lang="de-DE" dirty="0"/>
-              <a:t>Nur ein CMD pro Image</a:t>
-            </a:r>
-          </a:p>
-          <a:p>
-            <a:pPr lvl="1">
-              <a:buFont typeface="Arial" panose="020B0604020202020204" pitchFamily="34" charset="0"/>
-              <a:buChar char="•"/>
-            </a:pPr>
-            <a:r>
-              <a:rPr lang="de-DE" dirty="0"/>
-              <a:t>Wenn mehr als eins, wird das letzte ausgeführt</a:t>
+              <a:t>RUN &lt;Command&gt;</a:t>
             </a:r>
           </a:p>
           <a:p>
@@ -6337,17 +7175,7 @@
             </a:pPr>
             <a:r>
               <a:rPr lang="de-DE" dirty="0"/>
-              <a:t>CMD &lt;Command&gt;</a:t>
-            </a:r>
-          </a:p>
-          <a:p>
-            <a:pPr>
-              <a:buFont typeface="Arial" panose="020B0604020202020204" pitchFamily="34" charset="0"/>
-              <a:buChar char="•"/>
-            </a:pPr>
-            <a:r>
-              <a:rPr lang="de-DE" dirty="0"/>
-              <a:t>CMD [&lt;</a:t>
+              <a:t>RUN [&lt;</a:t>
             </a:r>
             <a:r>
               <a:rPr lang="de-DE" dirty="0" err="1"/>
@@ -6409,20 +7237,20 @@
         </p:nvSpPr>
         <p:spPr bwMode="auto">
           <a:xfrm>
-            <a:off x="5281247" y="5499230"/>
+            <a:off x="5281247" y="5139190"/>
             <a:ext cx="3559540" cy="306034"/>
           </a:xfrm>
           <a:prstGeom prst="rect">
             <a:avLst/>
           </a:prstGeom>
           <a:solidFill>
-            <a:schemeClr val="accent1">
+            <a:schemeClr val="accent2">
               <a:alpha val="24000"/>
             </a:schemeClr>
           </a:solidFill>
           <a:ln w="12700" cap="flat" cmpd="sng" algn="ctr">
             <a:solidFill>
-              <a:schemeClr val="tx1"/>
+              <a:srgbClr val="0D4F3C"/>
             </a:solidFill>
             <a:prstDash val="solid"/>
             <a:round/>
@@ -6471,7 +7299,7 @@
     </p:spTree>
     <p:extLst>
       <p:ext uri="{BB962C8B-B14F-4D97-AF65-F5344CB8AC3E}">
-        <p14:creationId xmlns:p14="http://schemas.microsoft.com/office/powerpoint/2010/main" val="815974343"/>
+        <p14:creationId xmlns:p14="http://schemas.microsoft.com/office/powerpoint/2010/main" val="1258100051"/>
       </p:ext>
     </p:extLst>
   </p:cSld>
@@ -6558,7 +7386,7 @@
             </a:pPr>
             <a:r>
               <a:rPr lang="de-DE" b="1" dirty="0"/>
-              <a:t>EXPOSE &lt;Port&gt;</a:t>
+              <a:t>CMD &lt;Command&gt;</a:t>
             </a:r>
           </a:p>
           <a:p>
@@ -6568,7 +7396,7 @@
             </a:pPr>
             <a:r>
               <a:rPr lang="de-DE" dirty="0"/>
-              <a:t>Öffnet einen Port des Containers nach außen</a:t>
+              <a:t>Gibt den Standartstartbefehl an</a:t>
             </a:r>
           </a:p>
           <a:p>
@@ -6578,7 +7406,55 @@
             </a:pPr>
             <a:r>
               <a:rPr lang="de-DE" dirty="0"/>
-              <a:t>Muss einem Host Port zugewiesen werden</a:t>
+              <a:t>Wird standartmäßig beim Containerstart ausgeführt</a:t>
+            </a:r>
+          </a:p>
+          <a:p>
+            <a:pPr>
+              <a:buFont typeface="Arial" panose="020B0604020202020204" pitchFamily="34" charset="0"/>
+              <a:buChar char="•"/>
+            </a:pPr>
+            <a:r>
+              <a:rPr lang="de-DE" dirty="0"/>
+              <a:t>Nur ein CMD pro Image</a:t>
+            </a:r>
+          </a:p>
+          <a:p>
+            <a:pPr lvl="1">
+              <a:buFont typeface="Arial" panose="020B0604020202020204" pitchFamily="34" charset="0"/>
+              <a:buChar char="•"/>
+            </a:pPr>
+            <a:r>
+              <a:rPr lang="de-DE" dirty="0"/>
+              <a:t>Wenn mehr als eins, wird das letzte ausgeführt</a:t>
+            </a:r>
+          </a:p>
+          <a:p>
+            <a:pPr>
+              <a:buFont typeface="Arial" panose="020B0604020202020204" pitchFamily="34" charset="0"/>
+              <a:buChar char="•"/>
+            </a:pPr>
+            <a:r>
+              <a:rPr lang="de-DE" dirty="0"/>
+              <a:t>CMD &lt;Command&gt;</a:t>
+            </a:r>
+          </a:p>
+          <a:p>
+            <a:pPr>
+              <a:buFont typeface="Arial" panose="020B0604020202020204" pitchFamily="34" charset="0"/>
+              <a:buChar char="•"/>
+            </a:pPr>
+            <a:r>
+              <a:rPr lang="de-DE" dirty="0"/>
+              <a:t>CMD [&lt;</a:t>
+            </a:r>
+            <a:r>
+              <a:rPr lang="de-DE" dirty="0" err="1"/>
+              <a:t>Program</a:t>
+            </a:r>
+            <a:r>
+              <a:rPr lang="de-DE" dirty="0"/>
+              <a:t>&gt;,&lt;Param1&gt;, …]</a:t>
             </a:r>
           </a:p>
         </p:txBody>
@@ -6632,20 +7508,20 @@
         </p:nvSpPr>
         <p:spPr bwMode="auto">
           <a:xfrm>
-            <a:off x="5281247" y="5931278"/>
+            <a:off x="5281247" y="5499230"/>
             <a:ext cx="3559540" cy="306034"/>
           </a:xfrm>
           <a:prstGeom prst="rect">
             <a:avLst/>
           </a:prstGeom>
           <a:solidFill>
-            <a:schemeClr val="accent1">
+            <a:schemeClr val="accent2">
               <a:alpha val="24000"/>
             </a:schemeClr>
           </a:solidFill>
           <a:ln w="12700" cap="flat" cmpd="sng" algn="ctr">
             <a:solidFill>
-              <a:schemeClr val="tx1"/>
+              <a:srgbClr val="0D4F3C"/>
             </a:solidFill>
             <a:prstDash val="solid"/>
             <a:round/>
@@ -6694,7 +7570,7 @@
     </p:spTree>
     <p:extLst>
       <p:ext uri="{BB962C8B-B14F-4D97-AF65-F5344CB8AC3E}">
-        <p14:creationId xmlns:p14="http://schemas.microsoft.com/office/powerpoint/2010/main" val="188330073"/>
+        <p14:creationId xmlns:p14="http://schemas.microsoft.com/office/powerpoint/2010/main" val="815974343"/>
       </p:ext>
     </p:extLst>
   </p:cSld>
@@ -6959,7 +7835,12 @@
             <p:ph idx="1"/>
           </p:nvPr>
         </p:nvSpPr>
-        <p:spPr/>
+        <p:spPr>
+          <a:xfrm>
+            <a:off x="303213" y="981075"/>
+            <a:ext cx="8516937" cy="3888085"/>
+          </a:xfrm>
+        </p:spPr>
         <p:txBody>
           <a:bodyPr/>
           <a:lstStyle/>
@@ -6969,7 +7850,7 @@
             </a:pPr>
             <a:r>
               <a:rPr lang="de-DE" b="1" dirty="0"/>
-              <a:t>Allgemein</a:t>
+              <a:t>EXPOSE &lt;Port&gt;</a:t>
             </a:r>
           </a:p>
           <a:p>
@@ -6978,48 +7859,8 @@
               <a:buChar char="•"/>
             </a:pPr>
             <a:r>
-              <a:rPr lang="de-DE" dirty="0" err="1"/>
-              <a:t>Dockerfiles</a:t>
-            </a:r>
-            <a:r>
               <a:rPr lang="de-DE" dirty="0"/>
-              <a:t> heißen </a:t>
-            </a:r>
-            <a:r>
-              <a:rPr lang="de-DE" dirty="0" err="1"/>
-              <a:t>standertmäßig</a:t>
-            </a:r>
-            <a:r>
-              <a:rPr lang="de-DE" dirty="0"/>
-              <a:t> „</a:t>
-            </a:r>
-            <a:r>
-              <a:rPr lang="de-DE" dirty="0" err="1"/>
-              <a:t>Dockerfile</a:t>
-            </a:r>
-            <a:r>
-              <a:rPr lang="de-DE" dirty="0"/>
-              <a:t>“</a:t>
-            </a:r>
-          </a:p>
-          <a:p>
-            <a:pPr lvl="1">
-              <a:buFont typeface="Arial" panose="020B0604020202020204" pitchFamily="34" charset="0"/>
-              <a:buChar char="•"/>
-            </a:pPr>
-            <a:r>
-              <a:rPr lang="de-DE" dirty="0"/>
-              <a:t>Keine Dateiendung</a:t>
-            </a:r>
-          </a:p>
-          <a:p>
-            <a:pPr lvl="1">
-              <a:buFont typeface="Arial" panose="020B0604020202020204" pitchFamily="34" charset="0"/>
-              <a:buChar char="•"/>
-            </a:pPr>
-            <a:r>
-              <a:rPr lang="de-DE" dirty="0"/>
-              <a:t>Können anders heißen</a:t>
+              <a:t>Öffnet einen Port des Containers nach außen</a:t>
             </a:r>
           </a:p>
           <a:p>
@@ -7029,28 +7870,123 @@
             </a:pPr>
             <a:r>
               <a:rPr lang="de-DE" dirty="0"/>
-              <a:t>Gibt weitere Anweisungen</a:t>
-            </a:r>
-          </a:p>
-          <a:p>
-            <a:pPr>
-              <a:buFont typeface="Arial" panose="020B0604020202020204" pitchFamily="34" charset="0"/>
-              <a:buChar char="•"/>
-            </a:pPr>
-            <a:r>
-              <a:rPr lang="de-DE" dirty="0">
-                <a:hlinkClick r:id="rId2"/>
-              </a:rPr>
-              <a:t>https://docs.docker.com/reference/dockerfile/</a:t>
-            </a:r>
-            <a:endParaRPr lang="de-DE" dirty="0"/>
+              <a:t>Muss einem Host Port zugewiesen werden</a:t>
+            </a:r>
+          </a:p>
+        </p:txBody>
+      </p:sp>
+      <p:pic>
+        <p:nvPicPr>
+          <p:cNvPr id="4" name="Grafik 3">
+            <a:extLst>
+              <a:ext uri="{FF2B5EF4-FFF2-40B4-BE49-F238E27FC236}">
+                <a16:creationId xmlns:a16="http://schemas.microsoft.com/office/drawing/2014/main" id="{0E72DCD3-F329-D8E8-8EDD-A328294ACFFD}"/>
+              </a:ext>
+            </a:extLst>
+          </p:cNvPr>
+          <p:cNvPicPr>
+            <a:picLocks noChangeAspect="1"/>
+          </p:cNvPicPr>
+          <p:nvPr/>
+        </p:nvPicPr>
+        <p:blipFill>
+          <a:blip r:embed="rId3">
+            <a:extLst>
+              <a:ext uri="{28A0092B-C50C-407E-A947-70E740481C1C}">
+                <a14:useLocalDpi xmlns:a14="http://schemas.microsoft.com/office/drawing/2010/main" val="0"/>
+              </a:ext>
+            </a:extLst>
+          </a:blip>
+          <a:srcRect/>
+          <a:stretch/>
+        </p:blipFill>
+        <p:spPr>
+          <a:xfrm>
+            <a:off x="5289564" y="3555014"/>
+            <a:ext cx="3522269" cy="2628292"/>
+          </a:xfrm>
+          <a:prstGeom prst="rect">
+            <a:avLst/>
+          </a:prstGeom>
+        </p:spPr>
+      </p:pic>
+      <p:sp>
+        <p:nvSpPr>
+          <p:cNvPr id="5" name="Rechteck 4">
+            <a:extLst>
+              <a:ext uri="{FF2B5EF4-FFF2-40B4-BE49-F238E27FC236}">
+                <a16:creationId xmlns:a16="http://schemas.microsoft.com/office/drawing/2014/main" id="{31E39CB4-1AC2-A872-1417-5A3B4119DE3C}"/>
+              </a:ext>
+            </a:extLst>
+          </p:cNvPr>
+          <p:cNvSpPr/>
+          <p:nvPr/>
+        </p:nvSpPr>
+        <p:spPr bwMode="auto">
+          <a:xfrm>
+            <a:off x="5281247" y="5931278"/>
+            <a:ext cx="3559540" cy="306034"/>
+          </a:xfrm>
+          <a:prstGeom prst="rect">
+            <a:avLst/>
+          </a:prstGeom>
+          <a:solidFill>
+            <a:schemeClr val="accent2">
+              <a:alpha val="24000"/>
+            </a:schemeClr>
+          </a:solidFill>
+          <a:ln w="12700" cap="flat" cmpd="sng" algn="ctr">
+            <a:solidFill>
+              <a:srgbClr val="0D4F3C"/>
+            </a:solidFill>
+            <a:prstDash val="solid"/>
+            <a:round/>
+            <a:headEnd type="none" w="sm" len="sm"/>
+            <a:tailEnd type="none" w="sm" len="sm"/>
+          </a:ln>
+          <a:effectLst/>
+        </p:spPr>
+        <p:txBody>
+          <a:bodyPr vert="horz" wrap="square" lIns="91440" tIns="45720" rIns="91440" bIns="45720" numCol="1" rtlCol="0" anchor="t" anchorCtr="0" compatLnSpc="1">
+            <a:prstTxWarp prst="textNoShape">
+              <a:avLst/>
+            </a:prstTxWarp>
+          </a:bodyPr>
+          <a:lstStyle/>
+          <a:p>
+            <a:pPr marL="0" marR="0" indent="0" algn="l" defTabSz="914400" rtl="0" eaLnBrk="0" fontAlgn="base" latinLnBrk="0" hangingPunct="0">
+              <a:lnSpc>
+                <a:spcPct val="100000"/>
+              </a:lnSpc>
+              <a:spcBef>
+                <a:spcPct val="0"/>
+              </a:spcBef>
+              <a:spcAft>
+                <a:spcPct val="0"/>
+              </a:spcAft>
+              <a:buClrTx/>
+              <a:buSzTx/>
+              <a:buFontTx/>
+              <a:buNone/>
+              <a:tabLst/>
+            </a:pPr>
+            <a:endParaRPr kumimoji="0" lang="de-DE" sz="2400" b="0" i="0" u="none" strike="noStrike" cap="none" normalizeH="0" baseline="0">
+              <a:ln>
+                <a:noFill/>
+              </a:ln>
+              <a:solidFill>
+                <a:schemeClr val="tx1"/>
+              </a:solidFill>
+              <a:effectLst/>
+              <a:latin typeface="Times New Roman" pitchFamily="18" charset="0"/>
+            </a:endParaRPr>
           </a:p>
         </p:txBody>
       </p:sp>
     </p:spTree>
     <p:extLst>
       <p:ext uri="{BB962C8B-B14F-4D97-AF65-F5344CB8AC3E}">
-        <p14:creationId xmlns:p14="http://schemas.microsoft.com/office/powerpoint/2010/main" val="3386637184"/>
+        <p14:creationId xmlns:p14="http://schemas.microsoft.com/office/powerpoint/2010/main" val="188330073"/>
       </p:ext>
     </p:extLst>
   </p:cSld>
@@ -7082,6 +8018,169 @@
           <p:cNvPr id="2" name="Titel 1">
             <a:extLst>
               <a:ext uri="{FF2B5EF4-FFF2-40B4-BE49-F238E27FC236}">
+                <a16:creationId xmlns:a16="http://schemas.microsoft.com/office/drawing/2014/main" id="{14CE78CD-8283-9E7B-B613-42B66D240626}"/>
+              </a:ext>
+            </a:extLst>
+          </p:cNvPr>
+          <p:cNvSpPr>
+            <a:spLocks noGrp="1"/>
+          </p:cNvSpPr>
+          <p:nvPr>
+            <p:ph type="title"/>
+          </p:nvPr>
+        </p:nvSpPr>
+        <p:spPr/>
+        <p:txBody>
+          <a:bodyPr/>
+          <a:lstStyle/>
+          <a:p>
+            <a:r>
+              <a:rPr lang="de-DE" altLang="de-DE" dirty="0"/>
+              <a:t>Lokale Entwicklung mit Docker</a:t>
+            </a:r>
+            <a:endParaRPr lang="de-DE" dirty="0"/>
+          </a:p>
+        </p:txBody>
+      </p:sp>
+      <p:sp>
+        <p:nvSpPr>
+          <p:cNvPr id="3" name="Inhaltsplatzhalter 2">
+            <a:extLst>
+              <a:ext uri="{FF2B5EF4-FFF2-40B4-BE49-F238E27FC236}">
+                <a16:creationId xmlns:a16="http://schemas.microsoft.com/office/drawing/2014/main" id="{F8D03162-A290-8535-F9FD-8ACB2F578B1B}"/>
+              </a:ext>
+            </a:extLst>
+          </p:cNvPr>
+          <p:cNvSpPr>
+            <a:spLocks noGrp="1"/>
+          </p:cNvSpPr>
+          <p:nvPr>
+            <p:ph idx="1"/>
+          </p:nvPr>
+        </p:nvSpPr>
+        <p:spPr/>
+        <p:txBody>
+          <a:bodyPr/>
+          <a:lstStyle/>
+          <a:p>
+            <a:pPr marL="0" indent="0">
+              <a:buNone/>
+            </a:pPr>
+            <a:r>
+              <a:rPr lang="de-DE" b="1" dirty="0"/>
+              <a:t>Allgemein</a:t>
+            </a:r>
+          </a:p>
+          <a:p>
+            <a:pPr>
+              <a:buFont typeface="Arial" panose="020B0604020202020204" pitchFamily="34" charset="0"/>
+              <a:buChar char="•"/>
+            </a:pPr>
+            <a:r>
+              <a:rPr lang="de-DE" dirty="0" err="1"/>
+              <a:t>Dockerfiles</a:t>
+            </a:r>
+            <a:r>
+              <a:rPr lang="de-DE" dirty="0"/>
+              <a:t> heißen </a:t>
+            </a:r>
+            <a:r>
+              <a:rPr lang="de-DE" dirty="0" err="1"/>
+              <a:t>standertmäßig</a:t>
+            </a:r>
+            <a:r>
+              <a:rPr lang="de-DE" dirty="0"/>
+              <a:t> „</a:t>
+            </a:r>
+            <a:r>
+              <a:rPr lang="de-DE" dirty="0" err="1"/>
+              <a:t>Dockerfile</a:t>
+            </a:r>
+            <a:r>
+              <a:rPr lang="de-DE" dirty="0"/>
+              <a:t>“</a:t>
+            </a:r>
+          </a:p>
+          <a:p>
+            <a:pPr lvl="1">
+              <a:buFont typeface="Arial" panose="020B0604020202020204" pitchFamily="34" charset="0"/>
+              <a:buChar char="•"/>
+            </a:pPr>
+            <a:r>
+              <a:rPr lang="de-DE" dirty="0"/>
+              <a:t>Keine Dateiendung</a:t>
+            </a:r>
+          </a:p>
+          <a:p>
+            <a:pPr lvl="1">
+              <a:buFont typeface="Arial" panose="020B0604020202020204" pitchFamily="34" charset="0"/>
+              <a:buChar char="•"/>
+            </a:pPr>
+            <a:r>
+              <a:rPr lang="de-DE" dirty="0"/>
+              <a:t>Können anders heißen</a:t>
+            </a:r>
+          </a:p>
+          <a:p>
+            <a:pPr>
+              <a:buFont typeface="Arial" panose="020B0604020202020204" pitchFamily="34" charset="0"/>
+              <a:buChar char="•"/>
+            </a:pPr>
+            <a:r>
+              <a:rPr lang="de-DE" dirty="0"/>
+              <a:t>Gibt weitere Anweisungen</a:t>
+            </a:r>
+          </a:p>
+          <a:p>
+            <a:pPr>
+              <a:buFont typeface="Arial" panose="020B0604020202020204" pitchFamily="34" charset="0"/>
+              <a:buChar char="•"/>
+            </a:pPr>
+            <a:r>
+              <a:rPr lang="de-DE" dirty="0">
+                <a:hlinkClick r:id="rId3"/>
+              </a:rPr>
+              <a:t>https://docs.docker.com/reference/dockerfile/</a:t>
+            </a:r>
+            <a:endParaRPr lang="de-DE" dirty="0"/>
+          </a:p>
+        </p:txBody>
+      </p:sp>
+    </p:spTree>
+    <p:extLst>
+      <p:ext uri="{BB962C8B-B14F-4D97-AF65-F5344CB8AC3E}">
+        <p14:creationId xmlns:p14="http://schemas.microsoft.com/office/powerpoint/2010/main" val="3386637184"/>
+      </p:ext>
+    </p:extLst>
+  </p:cSld>
+  <p:clrMapOvr>
+    <a:masterClrMapping/>
+  </p:clrMapOvr>
+</p:sld>
+</file>
+
+<file path=ppt/slides/slide22.xml><?xml version="1.0" encoding="utf-8"?>
+<p:sld xmlns:a="http://schemas.openxmlformats.org/drawingml/2006/main" xmlns:r="http://schemas.openxmlformats.org/officeDocument/2006/relationships" xmlns:p="http://schemas.openxmlformats.org/presentationml/2006/main">
+  <p:cSld>
+    <p:spTree>
+      <p:nvGrpSpPr>
+        <p:cNvPr id="1" name=""/>
+        <p:cNvGrpSpPr/>
+        <p:nvPr/>
+      </p:nvGrpSpPr>
+      <p:grpSpPr>
+        <a:xfrm>
+          <a:off x="0" y="0"/>
+          <a:ext cx="0" cy="0"/>
+          <a:chOff x="0" y="0"/>
+          <a:chExt cx="0" cy="0"/>
+        </a:xfrm>
+      </p:grpSpPr>
+      <p:sp>
+        <p:nvSpPr>
+          <p:cNvPr id="2" name="Titel 1">
+            <a:extLst>
+              <a:ext uri="{FF2B5EF4-FFF2-40B4-BE49-F238E27FC236}">
                 <a16:creationId xmlns:a16="http://schemas.microsoft.com/office/drawing/2014/main" id="{3F3329A8-BE96-2E73-2F3C-D199DF9A7044}"/>
               </a:ext>
             </a:extLst>
@@ -7123,7 +8222,7 @@
           </p:nvPr>
         </p:nvPicPr>
         <p:blipFill>
-          <a:blip r:embed="rId2">
+          <a:blip r:embed="rId3">
             <a:extLst>
               <a:ext uri="{28A0092B-C50C-407E-A947-70E740481C1C}">
                 <a14:useLocalDpi xmlns:a14="http://schemas.microsoft.com/office/drawing/2010/main" val="0"/>
@@ -7144,6 +8243,50 @@
           </a:effectLst>
         </p:spPr>
       </p:pic>
+      <p:sp>
+        <p:nvSpPr>
+          <p:cNvPr id="3" name="Textfeld 2">
+            <a:extLst>
+              <a:ext uri="{FF2B5EF4-FFF2-40B4-BE49-F238E27FC236}">
+                <a16:creationId xmlns:a16="http://schemas.microsoft.com/office/drawing/2014/main" id="{6221A13A-73F8-2461-0B9C-44E024C93EB4}"/>
+              </a:ext>
+            </a:extLst>
+          </p:cNvPr>
+          <p:cNvSpPr txBox="1"/>
+          <p:nvPr/>
+        </p:nvSpPr>
+        <p:spPr bwMode="auto">
+          <a:xfrm>
+            <a:off x="4211960" y="6047710"/>
+            <a:ext cx="4824536" cy="261610"/>
+          </a:xfrm>
+          <a:prstGeom prst="rect">
+            <a:avLst/>
+          </a:prstGeom>
+          <a:noFill/>
+          <a:ln w="9525">
+            <a:noFill/>
+            <a:miter lim="800000"/>
+            <a:headEnd/>
+            <a:tailEnd/>
+          </a:ln>
+        </p:spPr>
+        <p:txBody>
+          <a:bodyPr wrap="square" rtlCol="0" anchor="ctr">
+            <a:spAutoFit/>
+          </a:bodyPr>
+          <a:lstStyle/>
+          <a:p>
+            <a:pPr algn="r" eaLnBrk="1" hangingPunct="1"/>
+            <a:r>
+              <a:rPr lang="de-DE" sz="1100" dirty="0">
+                <a:latin typeface="Arial" charset="0"/>
+              </a:rPr>
+              <a:t>Generiert mit Imgflip.com</a:t>
+            </a:r>
+          </a:p>
+        </p:txBody>
+      </p:sp>
     </p:spTree>
     <p:extLst>
       <p:ext uri="{BB962C8B-B14F-4D97-AF65-F5344CB8AC3E}">
@@ -7157,7 +8300,7 @@
 </p:sld>
 </file>
 
-<file path=ppt/slides/slide22.xml><?xml version="1.0" encoding="utf-8"?>
+<file path=ppt/slides/slide23.xml><?xml version="1.0" encoding="utf-8"?>
 <p:sld xmlns:a="http://schemas.openxmlformats.org/drawingml/2006/main" xmlns:r="http://schemas.openxmlformats.org/officeDocument/2006/relationships" xmlns:p="http://schemas.openxmlformats.org/presentationml/2006/main">
   <p:cSld>
     <p:spTree>
@@ -7459,7 +8602,7 @@
 </p:sld>
 </file>
 
-<file path=ppt/slides/slide23.xml><?xml version="1.0" encoding="utf-8"?>
+<file path=ppt/slides/slide24.xml><?xml version="1.0" encoding="utf-8"?>
 <p:sld xmlns:a="http://schemas.openxmlformats.org/drawingml/2006/main" xmlns:r="http://schemas.openxmlformats.org/officeDocument/2006/relationships" xmlns:p="http://schemas.openxmlformats.org/presentationml/2006/main">
   <p:cSld>
     <p:spTree>
@@ -7541,20 +8684,6 @@
               <a:t>Erstellen von Containern</a:t>
             </a:r>
             <a:endParaRPr lang="de-DE" b="1" dirty="0"/>
-          </a:p>
-          <a:p>
-            <a:pPr>
-              <a:buFont typeface="Arial" panose="020B0604020202020204" pitchFamily="34" charset="0"/>
-              <a:buChar char="•"/>
-            </a:pPr>
-            <a:r>
-              <a:rPr lang="de-DE" dirty="0" err="1"/>
-              <a:t>docker</a:t>
-            </a:r>
-            <a:r>
-              <a:rPr lang="de-DE" dirty="0"/>
-              <a:t> erstellt und startet einen Container</a:t>
-            </a:r>
           </a:p>
           <a:p>
             <a:pPr>
@@ -7757,7 +8886,7 @@
 </p:sld>
 </file>
 
-<file path=ppt/slides/slide24.xml><?xml version="1.0" encoding="utf-8"?>
+<file path=ppt/slides/slide25.xml><?xml version="1.0" encoding="utf-8"?>
 <p:sld xmlns:a="http://schemas.openxmlformats.org/drawingml/2006/main" xmlns:r="http://schemas.openxmlformats.org/officeDocument/2006/relationships" xmlns:p="http://schemas.openxmlformats.org/presentationml/2006/main">
   <p:cSld>
     <p:spTree>
@@ -7838,7 +8967,6 @@
               </a:rPr>
               <a:t>Starten von Containern</a:t>
             </a:r>
-            <a:endParaRPr lang="de-DE" b="1" dirty="0"/>
           </a:p>
           <a:p>
             <a:pPr>
@@ -7847,21 +8975,6 @@
             </a:pPr>
             <a:r>
               <a:rPr lang="de-DE" dirty="0"/>
-              <a:t>Docker startet </a:t>
-            </a:r>
-            <a:r>
-              <a:rPr lang="de-DE" dirty="0" err="1"/>
-              <a:t>container</a:t>
-            </a:r>
-            <a:endParaRPr lang="de-DE" dirty="0"/>
-          </a:p>
-          <a:p>
-            <a:pPr>
-              <a:buFont typeface="Arial" panose="020B0604020202020204" pitchFamily="34" charset="0"/>
-              <a:buChar char="•"/>
-            </a:pPr>
-            <a:r>
-              <a:rPr lang="de-DE" dirty="0"/>
               <a:t>Kann mit ID oder Name identifiziert werden</a:t>
             </a:r>
           </a:p>
@@ -7881,7 +8994,7 @@
         </p:nvSpPr>
         <p:spPr bwMode="auto">
           <a:xfrm>
-            <a:off x="297818" y="2780928"/>
+            <a:off x="297818" y="3018959"/>
             <a:ext cx="8516937" cy="914097"/>
           </a:xfrm>
           <a:prstGeom prst="rect">
@@ -7997,7 +9110,7 @@
 </p:sld>
 </file>
 
-<file path=ppt/slides/slide25.xml><?xml version="1.0" encoding="utf-8"?>
+<file path=ppt/slides/slide26.xml><?xml version="1.0" encoding="utf-8"?>
 <p:sld xmlns:a="http://schemas.openxmlformats.org/drawingml/2006/main" xmlns:r="http://schemas.openxmlformats.org/officeDocument/2006/relationships" xmlns:p="http://schemas.openxmlformats.org/presentationml/2006/main">
   <p:cSld>
     <p:spTree>
@@ -8079,16 +9192,6 @@
               <a:t>Stoppen von Containern</a:t>
             </a:r>
             <a:endParaRPr lang="de-DE" b="1" dirty="0"/>
-          </a:p>
-          <a:p>
-            <a:pPr>
-              <a:buFont typeface="Arial" panose="020B0604020202020204" pitchFamily="34" charset="0"/>
-              <a:buChar char="•"/>
-            </a:pPr>
-            <a:r>
-              <a:rPr lang="de-DE" dirty="0"/>
-              <a:t>Docker stoppt den Container</a:t>
-            </a:r>
           </a:p>
           <a:p>
             <a:pPr>
@@ -8301,7 +9404,7 @@
 </p:sld>
 </file>
 
-<file path=ppt/slides/slide26.xml><?xml version="1.0" encoding="utf-8"?>
+<file path=ppt/slides/slide27.xml><?xml version="1.0" encoding="utf-8"?>
 <p:sld xmlns:a="http://schemas.openxmlformats.org/drawingml/2006/main" xmlns:r="http://schemas.openxmlformats.org/officeDocument/2006/relationships" xmlns:p="http://schemas.openxmlformats.org/presentationml/2006/main">
   <p:cSld>
     <p:spTree>
@@ -8546,7 +9649,7 @@
 </p:sld>
 </file>
 
-<file path=ppt/slides/slide27.xml><?xml version="1.0" encoding="utf-8"?>
+<file path=ppt/slides/slide28.xml><?xml version="1.0" encoding="utf-8"?>
 <p:sld xmlns:a="http://schemas.openxmlformats.org/drawingml/2006/main" xmlns:r="http://schemas.openxmlformats.org/officeDocument/2006/relationships" xmlns:p="http://schemas.openxmlformats.org/presentationml/2006/main">
   <p:cSld>
     <p:spTree>
@@ -8636,7 +9739,27 @@
             </a:pPr>
             <a:r>
               <a:rPr lang="de-DE" dirty="0"/>
-              <a:t>Erstellt eine Liste von Containern</a:t>
+              <a:t>Erstellt eine Liste von Containern </a:t>
+            </a:r>
+          </a:p>
+          <a:p>
+            <a:pPr>
+              <a:buFont typeface="Arial" panose="020B0604020202020204" pitchFamily="34" charset="0"/>
+              <a:buChar char="•"/>
+            </a:pPr>
+            <a:r>
+              <a:rPr lang="de-DE" dirty="0"/>
+              <a:t>Zeigt nur laufende Container an</a:t>
+            </a:r>
+          </a:p>
+          <a:p>
+            <a:pPr lvl="1">
+              <a:buFont typeface="Arial" panose="020B0604020202020204" pitchFamily="34" charset="0"/>
+              <a:buChar char="•"/>
+            </a:pPr>
+            <a:r>
+              <a:rPr lang="de-DE" dirty="0"/>
+              <a:t>Alle Container können mit -a angezeigt werden</a:t>
             </a:r>
           </a:p>
         </p:txBody>
@@ -8655,8 +9778,8 @@
         </p:nvSpPr>
         <p:spPr bwMode="auto">
           <a:xfrm>
-            <a:off x="297818" y="2247255"/>
-            <a:ext cx="8516937" cy="461665"/>
+            <a:off x="297818" y="3380799"/>
+            <a:ext cx="8516937" cy="1200329"/>
           </a:xfrm>
           <a:prstGeom prst="rect">
             <a:avLst/>
@@ -8705,6 +9828,48 @@
               <a:latin typeface="Arial" charset="0"/>
             </a:endParaRPr>
           </a:p>
+          <a:p>
+            <a:pPr algn="ctr" eaLnBrk="1" hangingPunct="1"/>
+            <a:r>
+              <a:rPr lang="de-DE" dirty="0" err="1">
+                <a:latin typeface="Arial" charset="0"/>
+              </a:rPr>
+              <a:t>docker</a:t>
+            </a:r>
+            <a:r>
+              <a:rPr lang="de-DE" dirty="0">
+                <a:latin typeface="Arial" charset="0"/>
+              </a:rPr>
+              <a:t> </a:t>
+            </a:r>
+            <a:r>
+              <a:rPr lang="de-DE" dirty="0" err="1">
+                <a:latin typeface="Arial" charset="0"/>
+              </a:rPr>
+              <a:t>ls</a:t>
+            </a:r>
+            <a:r>
+              <a:rPr lang="de-DE" dirty="0">
+                <a:latin typeface="Arial" charset="0"/>
+              </a:rPr>
+              <a:t> -a</a:t>
+            </a:r>
+          </a:p>
+          <a:p>
+            <a:pPr algn="ctr" eaLnBrk="1" hangingPunct="1"/>
+            <a:r>
+              <a:rPr lang="de-DE" dirty="0" err="1">
+                <a:latin typeface="Arial" charset="0"/>
+              </a:rPr>
+              <a:t>docker</a:t>
+            </a:r>
+            <a:r>
+              <a:rPr lang="de-DE" dirty="0">
+                <a:latin typeface="Arial" charset="0"/>
+              </a:rPr>
+              <a:t> ps</a:t>
+            </a:r>
+          </a:p>
         </p:txBody>
       </p:sp>
     </p:spTree>
@@ -8720,8 +9885,8 @@
 </p:sld>
 </file>
 
-<file path=ppt/slides/slide28.xml><?xml version="1.0" encoding="utf-8"?>
-<p:sld xmlns:a="http://schemas.openxmlformats.org/drawingml/2006/main" xmlns:r="http://schemas.openxmlformats.org/officeDocument/2006/relationships" xmlns:p="http://schemas.openxmlformats.org/presentationml/2006/main" show="0">
+<file path=ppt/slides/slide29.xml><?xml version="1.0" encoding="utf-8"?>
+<p:sld xmlns:a="http://schemas.openxmlformats.org/drawingml/2006/main" xmlns:r="http://schemas.openxmlformats.org/officeDocument/2006/relationships" xmlns:p="http://schemas.openxmlformats.org/presentationml/2006/main">
   <p:cSld>
     <p:spTree>
       <p:nvGrpSpPr>
@@ -8812,7 +9977,7 @@
           <p:nvPr/>
         </p:nvPicPr>
         <p:blipFill>
-          <a:blip r:embed="rId2">
+          <a:blip r:embed="rId3">
             <a:extLst>
               <a:ext uri="{28A0092B-C50C-407E-A947-70E740481C1C}">
                 <a14:useLocalDpi xmlns:a14="http://schemas.microsoft.com/office/drawing/2010/main" val="0"/>
@@ -8846,184 +10011,6 @@
 </p:sld>
 </file>
 
-<file path=ppt/slides/slide29.xml><?xml version="1.0" encoding="utf-8"?>
-<p:sld xmlns:a="http://schemas.openxmlformats.org/drawingml/2006/main" xmlns:r="http://schemas.openxmlformats.org/officeDocument/2006/relationships" xmlns:p="http://schemas.openxmlformats.org/presentationml/2006/main" show="0">
-  <p:cSld>
-    <p:spTree>
-      <p:nvGrpSpPr>
-        <p:cNvPr id="1" name=""/>
-        <p:cNvGrpSpPr/>
-        <p:nvPr/>
-      </p:nvGrpSpPr>
-      <p:grpSpPr>
-        <a:xfrm>
-          <a:off x="0" y="0"/>
-          <a:ext cx="0" cy="0"/>
-          <a:chOff x="0" y="0"/>
-          <a:chExt cx="0" cy="0"/>
-        </a:xfrm>
-      </p:grpSpPr>
-      <p:sp>
-        <p:nvSpPr>
-          <p:cNvPr id="2" name="Titel 1">
-            <a:extLst>
-              <a:ext uri="{FF2B5EF4-FFF2-40B4-BE49-F238E27FC236}">
-                <a16:creationId xmlns:a16="http://schemas.microsoft.com/office/drawing/2014/main" id="{EC8CF018-2FCF-81A4-5029-0F6FD9D27D5B}"/>
-              </a:ext>
-            </a:extLst>
-          </p:cNvPr>
-          <p:cNvSpPr>
-            <a:spLocks noGrp="1"/>
-          </p:cNvSpPr>
-          <p:nvPr>
-            <p:ph type="title"/>
-          </p:nvPr>
-        </p:nvSpPr>
-        <p:spPr/>
-        <p:txBody>
-          <a:bodyPr/>
-          <a:lstStyle/>
-          <a:p>
-            <a:r>
-              <a:rPr lang="de-DE" altLang="de-DE" dirty="0"/>
-              <a:t>Lokale Entwicklung mit Docker</a:t>
-            </a:r>
-            <a:endParaRPr lang="de-DE" dirty="0"/>
-          </a:p>
-        </p:txBody>
-      </p:sp>
-      <p:sp>
-        <p:nvSpPr>
-          <p:cNvPr id="3" name="Inhaltsplatzhalter 2">
-            <a:extLst>
-              <a:ext uri="{FF2B5EF4-FFF2-40B4-BE49-F238E27FC236}">
-                <a16:creationId xmlns:a16="http://schemas.microsoft.com/office/drawing/2014/main" id="{663C7B1B-4F20-6E54-746F-81BAA338EE5F}"/>
-              </a:ext>
-            </a:extLst>
-          </p:cNvPr>
-          <p:cNvSpPr>
-            <a:spLocks noGrp="1"/>
-          </p:cNvSpPr>
-          <p:nvPr>
-            <p:ph idx="1"/>
-          </p:nvPr>
-        </p:nvSpPr>
-        <p:spPr>
-          <a:xfrm>
-            <a:off x="303213" y="1340768"/>
-            <a:ext cx="8516937" cy="4532569"/>
-          </a:xfrm>
-        </p:spPr>
-        <p:txBody>
-          <a:bodyPr/>
-          <a:lstStyle/>
-          <a:p>
-            <a:pPr marL="0" indent="0">
-              <a:buNone/>
-            </a:pPr>
-            <a:r>
-              <a:rPr lang="de-DE" sz="2400" b="1" dirty="0">
-                <a:latin typeface="+mj-lt"/>
-              </a:rPr>
-              <a:t>Übungsaufgabe</a:t>
-            </a:r>
-            <a:endParaRPr lang="de-DE" b="1" dirty="0"/>
-          </a:p>
-          <a:p>
-            <a:pPr>
-              <a:buFont typeface="Arial" panose="020B0604020202020204" pitchFamily="34" charset="0"/>
-              <a:buChar char="•"/>
-            </a:pPr>
-            <a:r>
-              <a:rPr lang="de-DE" dirty="0"/>
-              <a:t>Installieren Sie Docker Desktop</a:t>
-            </a:r>
-          </a:p>
-          <a:p>
-            <a:pPr>
-              <a:buFont typeface="Arial" panose="020B0604020202020204" pitchFamily="34" charset="0"/>
-              <a:buChar char="•"/>
-            </a:pPr>
-            <a:r>
-              <a:rPr lang="de-DE" dirty="0"/>
-              <a:t>Öffnen Sie den Ordner der Übungsaufgabe</a:t>
-            </a:r>
-          </a:p>
-          <a:p>
-            <a:pPr>
-              <a:buFont typeface="Arial" panose="020B0604020202020204" pitchFamily="34" charset="0"/>
-              <a:buChar char="•"/>
-            </a:pPr>
-            <a:r>
-              <a:rPr lang="de-DE" dirty="0"/>
-              <a:t>Erstellen Sie ein Docker Image mittels des </a:t>
-            </a:r>
-            <a:r>
-              <a:rPr lang="de-DE" dirty="0" err="1"/>
-              <a:t>Dockerfiles</a:t>
-            </a:r>
-            <a:endParaRPr lang="de-DE" dirty="0"/>
-          </a:p>
-          <a:p>
-            <a:pPr>
-              <a:buFont typeface="Arial" panose="020B0604020202020204" pitchFamily="34" charset="0"/>
-              <a:buChar char="•"/>
-            </a:pPr>
-            <a:r>
-              <a:rPr lang="de-DE" dirty="0"/>
-              <a:t>Führen Sie den Container aus und untersuchen sie logs und das Dateisystem</a:t>
-            </a:r>
-          </a:p>
-          <a:p>
-            <a:pPr>
-              <a:buFont typeface="Arial" panose="020B0604020202020204" pitchFamily="34" charset="0"/>
-              <a:buChar char="•"/>
-            </a:pPr>
-            <a:r>
-              <a:rPr lang="de-DE" dirty="0"/>
-              <a:t>Passen Sie das </a:t>
-            </a:r>
-            <a:r>
-              <a:rPr lang="de-DE" dirty="0" err="1"/>
-              <a:t>Dockerfile</a:t>
-            </a:r>
-            <a:r>
-              <a:rPr lang="de-DE" dirty="0"/>
-              <a:t> an um bei der Installation zusätzlich „cleanup.sh“ auszuführen.</a:t>
-            </a:r>
-          </a:p>
-          <a:p>
-            <a:pPr>
-              <a:buFont typeface="Arial" panose="020B0604020202020204" pitchFamily="34" charset="0"/>
-              <a:buChar char="•"/>
-            </a:pPr>
-            <a:r>
-              <a:rPr lang="de-DE" dirty="0"/>
-              <a:t>Erstellen Sie das Image und einen Container erneut und untersuchen Sie wieder den Container</a:t>
-            </a:r>
-          </a:p>
-          <a:p>
-            <a:pPr>
-              <a:buFont typeface="Arial" panose="020B0604020202020204" pitchFamily="34" charset="0"/>
-              <a:buChar char="•"/>
-            </a:pPr>
-            <a:endParaRPr lang="de-DE" dirty="0"/>
-          </a:p>
-        </p:txBody>
-      </p:sp>
-    </p:spTree>
-    <p:extLst>
-      <p:ext uri="{BB962C8B-B14F-4D97-AF65-F5344CB8AC3E}">
-        <p14:creationId xmlns:p14="http://schemas.microsoft.com/office/powerpoint/2010/main" val="2942762060"/>
-      </p:ext>
-    </p:extLst>
-  </p:cSld>
-  <p:clrMapOvr>
-    <a:masterClrMapping/>
-  </p:clrMapOvr>
-</p:sld>
-</file>
-
 <file path=ppt/slides/slide3.xml><?xml version="1.0" encoding="utf-8"?>
 <p:sld xmlns:a="http://schemas.openxmlformats.org/drawingml/2006/main" xmlns:r="http://schemas.openxmlformats.org/officeDocument/2006/relationships" xmlns:p="http://schemas.openxmlformats.org/presentationml/2006/main">
   <p:cSld>
@@ -9294,6 +10281,184 @@
 </file>
 
 <file path=ppt/slides/slide30.xml><?xml version="1.0" encoding="utf-8"?>
+<p:sld xmlns:a="http://schemas.openxmlformats.org/drawingml/2006/main" xmlns:r="http://schemas.openxmlformats.org/officeDocument/2006/relationships" xmlns:p="http://schemas.openxmlformats.org/presentationml/2006/main" show="0">
+  <p:cSld>
+    <p:spTree>
+      <p:nvGrpSpPr>
+        <p:cNvPr id="1" name=""/>
+        <p:cNvGrpSpPr/>
+        <p:nvPr/>
+      </p:nvGrpSpPr>
+      <p:grpSpPr>
+        <a:xfrm>
+          <a:off x="0" y="0"/>
+          <a:ext cx="0" cy="0"/>
+          <a:chOff x="0" y="0"/>
+          <a:chExt cx="0" cy="0"/>
+        </a:xfrm>
+      </p:grpSpPr>
+      <p:sp>
+        <p:nvSpPr>
+          <p:cNvPr id="2" name="Titel 1">
+            <a:extLst>
+              <a:ext uri="{FF2B5EF4-FFF2-40B4-BE49-F238E27FC236}">
+                <a16:creationId xmlns:a16="http://schemas.microsoft.com/office/drawing/2014/main" id="{EC8CF018-2FCF-81A4-5029-0F6FD9D27D5B}"/>
+              </a:ext>
+            </a:extLst>
+          </p:cNvPr>
+          <p:cNvSpPr>
+            <a:spLocks noGrp="1"/>
+          </p:cNvSpPr>
+          <p:nvPr>
+            <p:ph type="title"/>
+          </p:nvPr>
+        </p:nvSpPr>
+        <p:spPr/>
+        <p:txBody>
+          <a:bodyPr/>
+          <a:lstStyle/>
+          <a:p>
+            <a:r>
+              <a:rPr lang="de-DE" altLang="de-DE" dirty="0"/>
+              <a:t>Lokale Entwicklung mit Docker</a:t>
+            </a:r>
+            <a:endParaRPr lang="de-DE" dirty="0"/>
+          </a:p>
+        </p:txBody>
+      </p:sp>
+      <p:sp>
+        <p:nvSpPr>
+          <p:cNvPr id="3" name="Inhaltsplatzhalter 2">
+            <a:extLst>
+              <a:ext uri="{FF2B5EF4-FFF2-40B4-BE49-F238E27FC236}">
+                <a16:creationId xmlns:a16="http://schemas.microsoft.com/office/drawing/2014/main" id="{663C7B1B-4F20-6E54-746F-81BAA338EE5F}"/>
+              </a:ext>
+            </a:extLst>
+          </p:cNvPr>
+          <p:cNvSpPr>
+            <a:spLocks noGrp="1"/>
+          </p:cNvSpPr>
+          <p:nvPr>
+            <p:ph idx="1"/>
+          </p:nvPr>
+        </p:nvSpPr>
+        <p:spPr>
+          <a:xfrm>
+            <a:off x="303213" y="1340768"/>
+            <a:ext cx="8516937" cy="4532569"/>
+          </a:xfrm>
+        </p:spPr>
+        <p:txBody>
+          <a:bodyPr/>
+          <a:lstStyle/>
+          <a:p>
+            <a:pPr marL="0" indent="0">
+              <a:buNone/>
+            </a:pPr>
+            <a:r>
+              <a:rPr lang="de-DE" sz="2400" b="1" dirty="0">
+                <a:latin typeface="+mj-lt"/>
+              </a:rPr>
+              <a:t>Übungsaufgabe</a:t>
+            </a:r>
+            <a:endParaRPr lang="de-DE" b="1" dirty="0"/>
+          </a:p>
+          <a:p>
+            <a:pPr>
+              <a:buFont typeface="Arial" panose="020B0604020202020204" pitchFamily="34" charset="0"/>
+              <a:buChar char="•"/>
+            </a:pPr>
+            <a:r>
+              <a:rPr lang="de-DE" dirty="0"/>
+              <a:t>Installieren Sie Docker Desktop</a:t>
+            </a:r>
+          </a:p>
+          <a:p>
+            <a:pPr>
+              <a:buFont typeface="Arial" panose="020B0604020202020204" pitchFamily="34" charset="0"/>
+              <a:buChar char="•"/>
+            </a:pPr>
+            <a:r>
+              <a:rPr lang="de-DE" dirty="0"/>
+              <a:t>Öffnen Sie den Ordner der Übungsaufgabe</a:t>
+            </a:r>
+          </a:p>
+          <a:p>
+            <a:pPr>
+              <a:buFont typeface="Arial" panose="020B0604020202020204" pitchFamily="34" charset="0"/>
+              <a:buChar char="•"/>
+            </a:pPr>
+            <a:r>
+              <a:rPr lang="de-DE" dirty="0"/>
+              <a:t>Erstellen Sie ein Docker Image mittels des </a:t>
+            </a:r>
+            <a:r>
+              <a:rPr lang="de-DE" dirty="0" err="1"/>
+              <a:t>Dockerfiles</a:t>
+            </a:r>
+            <a:endParaRPr lang="de-DE" dirty="0"/>
+          </a:p>
+          <a:p>
+            <a:pPr>
+              <a:buFont typeface="Arial" panose="020B0604020202020204" pitchFamily="34" charset="0"/>
+              <a:buChar char="•"/>
+            </a:pPr>
+            <a:r>
+              <a:rPr lang="de-DE" dirty="0"/>
+              <a:t>Führen Sie den Container aus und untersuchen sie logs und das Dateisystem</a:t>
+            </a:r>
+          </a:p>
+          <a:p>
+            <a:pPr>
+              <a:buFont typeface="Arial" panose="020B0604020202020204" pitchFamily="34" charset="0"/>
+              <a:buChar char="•"/>
+            </a:pPr>
+            <a:r>
+              <a:rPr lang="de-DE" dirty="0"/>
+              <a:t>Passen Sie das </a:t>
+            </a:r>
+            <a:r>
+              <a:rPr lang="de-DE" dirty="0" err="1"/>
+              <a:t>Dockerfile</a:t>
+            </a:r>
+            <a:r>
+              <a:rPr lang="de-DE" dirty="0"/>
+              <a:t> an um bei der Installation zusätzlich „cleanup.sh“ auszuführen.</a:t>
+            </a:r>
+          </a:p>
+          <a:p>
+            <a:pPr>
+              <a:buFont typeface="Arial" panose="020B0604020202020204" pitchFamily="34" charset="0"/>
+              <a:buChar char="•"/>
+            </a:pPr>
+            <a:r>
+              <a:rPr lang="de-DE" dirty="0"/>
+              <a:t>Erstellen Sie das Image und einen Container erneut und untersuchen Sie wieder den Container</a:t>
+            </a:r>
+          </a:p>
+          <a:p>
+            <a:pPr>
+              <a:buFont typeface="Arial" panose="020B0604020202020204" pitchFamily="34" charset="0"/>
+              <a:buChar char="•"/>
+            </a:pPr>
+            <a:endParaRPr lang="de-DE" dirty="0"/>
+          </a:p>
+        </p:txBody>
+      </p:sp>
+    </p:spTree>
+    <p:extLst>
+      <p:ext uri="{BB962C8B-B14F-4D97-AF65-F5344CB8AC3E}">
+        <p14:creationId xmlns:p14="http://schemas.microsoft.com/office/powerpoint/2010/main" val="2942762060"/>
+      </p:ext>
+    </p:extLst>
+  </p:cSld>
+  <p:clrMapOvr>
+    <a:masterClrMapping/>
+  </p:clrMapOvr>
+</p:sld>
+</file>
+
+<file path=ppt/slides/slide31.xml><?xml version="1.0" encoding="utf-8"?>
 <p:sld xmlns:a="http://schemas.openxmlformats.org/drawingml/2006/main" xmlns:r="http://schemas.openxmlformats.org/officeDocument/2006/relationships" xmlns:p="http://schemas.openxmlformats.org/presentationml/2006/main">
   <p:cSld>
     <p:spTree>
@@ -10327,7 +11492,7 @@
 </p:sld>
 </file>
 
-<file path=ppt/slides/slide31.xml><?xml version="1.0" encoding="utf-8"?>
+<file path=ppt/slides/slide32.xml><?xml version="1.0" encoding="utf-8"?>
 <p:sld xmlns:a="http://schemas.openxmlformats.org/drawingml/2006/main" xmlns:r="http://schemas.openxmlformats.org/officeDocument/2006/relationships" xmlns:p="http://schemas.openxmlformats.org/presentationml/2006/main">
   <p:cSld>
     <p:spTree>
@@ -10776,7 +11941,7 @@
 </p:sld>
 </file>
 
-<file path=ppt/slides/slide32.xml><?xml version="1.0" encoding="utf-8"?>
+<file path=ppt/slides/slide33.xml><?xml version="1.0" encoding="utf-8"?>
 <p:sld xmlns:a="http://schemas.openxmlformats.org/drawingml/2006/main" xmlns:r="http://schemas.openxmlformats.org/officeDocument/2006/relationships" xmlns:p="http://schemas.openxmlformats.org/presentationml/2006/main">
   <p:cSld>
     <p:spTree>
@@ -10975,7 +12140,7 @@
 </p:sld>
 </file>
 
-<file path=ppt/slides/slide33.xml><?xml version="1.0" encoding="utf-8"?>
+<file path=ppt/slides/slide34.xml><?xml version="1.0" encoding="utf-8"?>
 <p:sld xmlns:a="http://schemas.openxmlformats.org/drawingml/2006/main" xmlns:r="http://schemas.openxmlformats.org/officeDocument/2006/relationships" xmlns:p="http://schemas.openxmlformats.org/presentationml/2006/main">
   <p:cSld>
     <p:spTree>
@@ -11228,6 +12393,50 @@
           </a:p>
         </p:txBody>
       </p:sp>
+      <p:sp>
+        <p:nvSpPr>
+          <p:cNvPr id="5" name="Textfeld 4">
+            <a:extLst>
+              <a:ext uri="{FF2B5EF4-FFF2-40B4-BE49-F238E27FC236}">
+                <a16:creationId xmlns:a16="http://schemas.microsoft.com/office/drawing/2014/main" id="{4EE1B79B-B1EA-D9E7-3FC2-5169889FDDCD}"/>
+              </a:ext>
+            </a:extLst>
+          </p:cNvPr>
+          <p:cNvSpPr txBox="1"/>
+          <p:nvPr/>
+        </p:nvSpPr>
+        <p:spPr bwMode="auto">
+          <a:xfrm>
+            <a:off x="5436096" y="6142510"/>
+            <a:ext cx="3528392" cy="261610"/>
+          </a:xfrm>
+          <a:prstGeom prst="rect">
+            <a:avLst/>
+          </a:prstGeom>
+          <a:noFill/>
+          <a:ln w="9525">
+            <a:noFill/>
+            <a:miter lim="800000"/>
+            <a:headEnd/>
+            <a:tailEnd/>
+          </a:ln>
+        </p:spPr>
+        <p:txBody>
+          <a:bodyPr wrap="square" rtlCol="0" anchor="ctr">
+            <a:spAutoFit/>
+          </a:bodyPr>
+          <a:lstStyle/>
+          <a:p>
+            <a:pPr algn="r" eaLnBrk="1" hangingPunct="1"/>
+            <a:r>
+              <a:rPr lang="de-DE" sz="1100" dirty="0">
+                <a:latin typeface="Arial" charset="0"/>
+              </a:rPr>
+              <a:t>https://docs.docker.com/get-started/overview/</a:t>
+            </a:r>
+          </a:p>
+        </p:txBody>
+      </p:sp>
     </p:spTree>
     <p:extLst>
       <p:ext uri="{BB962C8B-B14F-4D97-AF65-F5344CB8AC3E}">
@@ -11394,6 +12603,138 @@
           </a:p>
         </p:txBody>
       </p:sp>
+      <p:pic>
+        <p:nvPicPr>
+          <p:cNvPr id="4" name="Inhaltsplatzhalter 5" descr="Ein Bild, das Text, Screenshot, Diagramm, parallel enthält.&#10;&#10;Automatisch generierte Beschreibung">
+            <a:extLst>
+              <a:ext uri="{FF2B5EF4-FFF2-40B4-BE49-F238E27FC236}">
+                <a16:creationId xmlns:a16="http://schemas.microsoft.com/office/drawing/2014/main" id="{767F217F-FE1B-DE1D-C3EC-FDDEF82BE92E}"/>
+              </a:ext>
+            </a:extLst>
+          </p:cNvPr>
+          <p:cNvPicPr>
+            <a:picLocks noChangeAspect="1"/>
+          </p:cNvPicPr>
+          <p:nvPr/>
+        </p:nvPicPr>
+        <p:blipFill>
+          <a:blip r:embed="rId3">
+            <a:extLst>
+              <a:ext uri="{28A0092B-C50C-407E-A947-70E740481C1C}">
+                <a14:useLocalDpi xmlns:a14="http://schemas.microsoft.com/office/drawing/2010/main" val="0"/>
+              </a:ext>
+            </a:extLst>
+          </a:blip>
+          <a:stretch>
+            <a:fillRect/>
+          </a:stretch>
+        </p:blipFill>
+        <p:spPr bwMode="auto">
+          <a:xfrm>
+            <a:off x="4572000" y="3983214"/>
+            <a:ext cx="4040926" cy="2133530"/>
+          </a:xfrm>
+          <a:prstGeom prst="rect">
+            <a:avLst/>
+          </a:prstGeom>
+          <a:noFill/>
+          <a:ln>
+            <a:noFill/>
+          </a:ln>
+          <a:extLst>
+            <a:ext uri="{909E8E84-426E-40DD-AFC4-6F175D3DCCD1}">
+              <a14:hiddenFill xmlns:a14="http://schemas.microsoft.com/office/drawing/2010/main">
+                <a:solidFill>
+                  <a:srgbClr val="FFFFFF"/>
+                </a:solidFill>
+              </a14:hiddenFill>
+            </a:ext>
+            <a:ext uri="{91240B29-F687-4F45-9708-019B960494DF}">
+              <a14:hiddenLine xmlns:a14="http://schemas.microsoft.com/office/drawing/2010/main" w="9525">
+                <a:solidFill>
+                  <a:srgbClr val="000000"/>
+                </a:solidFill>
+                <a:miter lim="800000"/>
+                <a:headEnd/>
+                <a:tailEnd/>
+              </a14:hiddenLine>
+            </a:ext>
+          </a:extLst>
+        </p:spPr>
+      </p:pic>
+      <p:sp>
+        <p:nvSpPr>
+          <p:cNvPr id="5" name="Rechteck 4">
+            <a:extLst>
+              <a:ext uri="{FF2B5EF4-FFF2-40B4-BE49-F238E27FC236}">
+                <a16:creationId xmlns:a16="http://schemas.microsoft.com/office/drawing/2014/main" id="{FD4F055A-AB12-649A-4C3B-F0AD911525DC}"/>
+              </a:ext>
+            </a:extLst>
+          </p:cNvPr>
+          <p:cNvSpPr/>
+          <p:nvPr/>
+        </p:nvSpPr>
+        <p:spPr bwMode="auto">
+          <a:xfrm>
+            <a:off x="5508104" y="3909608"/>
+            <a:ext cx="2160239" cy="2327704"/>
+          </a:xfrm>
+          <a:prstGeom prst="rect">
+            <a:avLst/>
+          </a:prstGeom>
+          <a:solidFill>
+            <a:schemeClr val="accent2">
+              <a:alpha val="24000"/>
+            </a:schemeClr>
+          </a:solidFill>
+          <a:ln w="12700" cap="flat" cmpd="sng" algn="ctr">
+            <a:solidFill>
+              <a:srgbClr val="0D4F3C"/>
+            </a:solidFill>
+            <a:prstDash val="solid"/>
+            <a:round/>
+            <a:headEnd type="none" w="sm" len="sm"/>
+            <a:tailEnd type="none" w="sm" len="sm"/>
+          </a:ln>
+          <a:effectLst/>
+        </p:spPr>
+        <p:txBody>
+          <a:bodyPr vert="horz" wrap="square" lIns="91440" tIns="45720" rIns="91440" bIns="45720" numCol="1" rtlCol="0" anchor="t" anchorCtr="0" compatLnSpc="1">
+            <a:prstTxWarp prst="textNoShape">
+              <a:avLst/>
+            </a:prstTxWarp>
+          </a:bodyPr>
+          <a:lstStyle/>
+          <a:p>
+            <a:pPr marL="0" marR="0" indent="0" algn="l" defTabSz="914400" rtl="0" eaLnBrk="0" fontAlgn="base" latinLnBrk="0" hangingPunct="0">
+              <a:lnSpc>
+                <a:spcPct val="100000"/>
+              </a:lnSpc>
+              <a:spcBef>
+                <a:spcPct val="0"/>
+              </a:spcBef>
+              <a:spcAft>
+                <a:spcPct val="0"/>
+              </a:spcAft>
+              <a:buClrTx/>
+              <a:buSzTx/>
+              <a:buFontTx/>
+              <a:buNone/>
+              <a:tabLst/>
+            </a:pPr>
+            <a:endParaRPr kumimoji="0" lang="de-DE" sz="2400" b="0" i="0" u="none" strike="noStrike" cap="none" normalizeH="0" baseline="0">
+              <a:ln>
+                <a:noFill/>
+              </a:ln>
+              <a:solidFill>
+                <a:schemeClr val="tx1"/>
+              </a:solidFill>
+              <a:effectLst/>
+              <a:latin typeface="Times New Roman" pitchFamily="18" charset="0"/>
+            </a:endParaRPr>
+          </a:p>
+        </p:txBody>
+      </p:sp>
     </p:spTree>
     <p:extLst>
       <p:ext uri="{BB962C8B-B14F-4D97-AF65-F5344CB8AC3E}">
@@ -11668,7 +13009,7 @@
         </p:nvSpPr>
         <p:spPr bwMode="auto">
           <a:xfrm>
-            <a:off x="5292080" y="4869160"/>
+            <a:off x="971600" y="5516885"/>
             <a:ext cx="2160240" cy="720080"/>
           </a:xfrm>
           <a:prstGeom prst="rect">
@@ -11772,15 +13113,15 @@
           </p:cNvPr>
           <p:cNvCxnSpPr>
             <a:cxnSpLocks/>
-            <a:stCxn id="4" idx="3"/>
-            <a:endCxn id="5" idx="1"/>
+            <a:stCxn id="4" idx="2"/>
+            <a:endCxn id="5" idx="0"/>
           </p:cNvCxnSpPr>
           <p:nvPr/>
         </p:nvCxnSpPr>
         <p:spPr bwMode="auto">
-          <a:xfrm>
-            <a:off x="3147771" y="4509120"/>
-            <a:ext cx="2144309" cy="720080"/>
+          <a:xfrm flipH="1">
+            <a:off x="2051720" y="4869160"/>
+            <a:ext cx="15931" cy="647725"/>
           </a:xfrm>
           <a:prstGeom prst="straightConnector1">
             <a:avLst/>
@@ -11814,7 +13155,7 @@
         </p:nvSpPr>
         <p:spPr bwMode="auto">
           <a:xfrm>
-            <a:off x="3766775" y="4437907"/>
+            <a:off x="827584" y="5049979"/>
             <a:ext cx="1872207" cy="369332"/>
           </a:xfrm>
           <a:prstGeom prst="rect">
@@ -11841,6 +13182,138 @@
               </a:rPr>
               <a:t>REST API</a:t>
             </a:r>
+          </a:p>
+        </p:txBody>
+      </p:sp>
+      <p:pic>
+        <p:nvPicPr>
+          <p:cNvPr id="12" name="Inhaltsplatzhalter 5" descr="Ein Bild, das Text, Screenshot, Diagramm, parallel enthält.&#10;&#10;Automatisch generierte Beschreibung">
+            <a:extLst>
+              <a:ext uri="{FF2B5EF4-FFF2-40B4-BE49-F238E27FC236}">
+                <a16:creationId xmlns:a16="http://schemas.microsoft.com/office/drawing/2014/main" id="{1D597122-3204-BCDA-5D1D-1A548579E970}"/>
+              </a:ext>
+            </a:extLst>
+          </p:cNvPr>
+          <p:cNvPicPr>
+            <a:picLocks noChangeAspect="1"/>
+          </p:cNvPicPr>
+          <p:nvPr/>
+        </p:nvPicPr>
+        <p:blipFill>
+          <a:blip r:embed="rId2">
+            <a:extLst>
+              <a:ext uri="{28A0092B-C50C-407E-A947-70E740481C1C}">
+                <a14:useLocalDpi xmlns:a14="http://schemas.microsoft.com/office/drawing/2010/main" val="0"/>
+              </a:ext>
+            </a:extLst>
+          </a:blip>
+          <a:stretch>
+            <a:fillRect/>
+          </a:stretch>
+        </p:blipFill>
+        <p:spPr bwMode="auto">
+          <a:xfrm>
+            <a:off x="4572000" y="3983214"/>
+            <a:ext cx="4040926" cy="2133530"/>
+          </a:xfrm>
+          <a:prstGeom prst="rect">
+            <a:avLst/>
+          </a:prstGeom>
+          <a:noFill/>
+          <a:ln>
+            <a:noFill/>
+          </a:ln>
+          <a:extLst>
+            <a:ext uri="{909E8E84-426E-40DD-AFC4-6F175D3DCCD1}">
+              <a14:hiddenFill xmlns:a14="http://schemas.microsoft.com/office/drawing/2010/main">
+                <a:solidFill>
+                  <a:srgbClr val="FFFFFF"/>
+                </a:solidFill>
+              </a14:hiddenFill>
+            </a:ext>
+            <a:ext uri="{91240B29-F687-4F45-9708-019B960494DF}">
+              <a14:hiddenLine xmlns:a14="http://schemas.microsoft.com/office/drawing/2010/main" w="9525">
+                <a:solidFill>
+                  <a:srgbClr val="000000"/>
+                </a:solidFill>
+                <a:miter lim="800000"/>
+                <a:headEnd/>
+                <a:tailEnd/>
+              </a14:hiddenLine>
+            </a:ext>
+          </a:extLst>
+        </p:spPr>
+      </p:pic>
+      <p:sp>
+        <p:nvSpPr>
+          <p:cNvPr id="13" name="Rechteck 12">
+            <a:extLst>
+              <a:ext uri="{FF2B5EF4-FFF2-40B4-BE49-F238E27FC236}">
+                <a16:creationId xmlns:a16="http://schemas.microsoft.com/office/drawing/2014/main" id="{C16A5EAA-7041-49A8-3FBF-F68EAE6B8289}"/>
+              </a:ext>
+            </a:extLst>
+          </p:cNvPr>
+          <p:cNvSpPr/>
+          <p:nvPr/>
+        </p:nvSpPr>
+        <p:spPr bwMode="auto">
+          <a:xfrm>
+            <a:off x="4515294" y="3909608"/>
+            <a:ext cx="945017" cy="2327704"/>
+          </a:xfrm>
+          <a:prstGeom prst="rect">
+            <a:avLst/>
+          </a:prstGeom>
+          <a:solidFill>
+            <a:schemeClr val="accent2">
+              <a:alpha val="24000"/>
+            </a:schemeClr>
+          </a:solidFill>
+          <a:ln w="12700" cap="flat" cmpd="sng" algn="ctr">
+            <a:solidFill>
+              <a:srgbClr val="0D4F3C"/>
+            </a:solidFill>
+            <a:prstDash val="solid"/>
+            <a:round/>
+            <a:headEnd type="none" w="sm" len="sm"/>
+            <a:tailEnd type="none" w="sm" len="sm"/>
+          </a:ln>
+          <a:effectLst/>
+        </p:spPr>
+        <p:txBody>
+          <a:bodyPr vert="horz" wrap="square" lIns="91440" tIns="45720" rIns="91440" bIns="45720" numCol="1" rtlCol="0" anchor="t" anchorCtr="0" compatLnSpc="1">
+            <a:prstTxWarp prst="textNoShape">
+              <a:avLst/>
+            </a:prstTxWarp>
+          </a:bodyPr>
+          <a:lstStyle/>
+          <a:p>
+            <a:pPr marL="0" marR="0" indent="0" algn="l" defTabSz="914400" rtl="0" eaLnBrk="0" fontAlgn="base" latinLnBrk="0" hangingPunct="0">
+              <a:lnSpc>
+                <a:spcPct val="100000"/>
+              </a:lnSpc>
+              <a:spcBef>
+                <a:spcPct val="0"/>
+              </a:spcBef>
+              <a:spcAft>
+                <a:spcPct val="0"/>
+              </a:spcAft>
+              <a:buClrTx/>
+              <a:buSzTx/>
+              <a:buFontTx/>
+              <a:buNone/>
+              <a:tabLst/>
+            </a:pPr>
+            <a:endParaRPr kumimoji="0" lang="de-DE" sz="2400" b="0" i="0" u="none" strike="noStrike" cap="none" normalizeH="0" baseline="0">
+              <a:ln>
+                <a:noFill/>
+              </a:ln>
+              <a:solidFill>
+                <a:schemeClr val="tx1"/>
+              </a:solidFill>
+              <a:effectLst/>
+              <a:latin typeface="Times New Roman" pitchFamily="18" charset="0"/>
+            </a:endParaRPr>
           </a:p>
         </p:txBody>
       </p:sp>
@@ -12103,10 +13576,10 @@
       </p:grpSpPr>
       <p:sp>
         <p:nvSpPr>
-          <p:cNvPr id="7170" name="Titel 1">
-            <a:extLst>
-              <a:ext uri="{FF2B5EF4-FFF2-40B4-BE49-F238E27FC236}">
-                <a16:creationId xmlns:a16="http://schemas.microsoft.com/office/drawing/2014/main" id="{14166EE9-31F6-1432-6B4F-746369646516}"/>
+          <p:cNvPr id="2" name="Titel 1">
+            <a:extLst>
+              <a:ext uri="{FF2B5EF4-FFF2-40B4-BE49-F238E27FC236}">
+                <a16:creationId xmlns:a16="http://schemas.microsoft.com/office/drawing/2014/main" id="{26FFBC5D-31BA-6F29-1307-97E4E666E11D}"/>
               </a:ext>
             </a:extLst>
           </p:cNvPr>
@@ -12117,12 +13590,7 @@
             <p:ph type="title"/>
           </p:nvPr>
         </p:nvSpPr>
-        <p:spPr>
-          <a:xfrm>
-            <a:off x="285750" y="150813"/>
-            <a:ext cx="5554663" cy="706437"/>
-          </a:xfrm>
-        </p:spPr>
+        <p:spPr/>
         <p:txBody>
           <a:bodyPr/>
           <a:lstStyle/>
@@ -12131,15 +13599,16 @@
               <a:rPr lang="de-DE" altLang="de-DE" dirty="0"/>
               <a:t>Lokale Entwicklung mit Docker</a:t>
             </a:r>
+            <a:endParaRPr lang="de-DE" dirty="0"/>
           </a:p>
         </p:txBody>
       </p:sp>
       <p:pic>
         <p:nvPicPr>
-          <p:cNvPr id="3" name="Inhaltsplatzhalter 2" descr="Ein Bild, das Behälter, Frachtcontainer, Frachtverkehr, Warenladung enthält.&#10;&#10;Automatisch generierte Beschreibung">
-            <a:extLst>
-              <a:ext uri="{FF2B5EF4-FFF2-40B4-BE49-F238E27FC236}">
-                <a16:creationId xmlns:a16="http://schemas.microsoft.com/office/drawing/2014/main" id="{E5B7AAEB-1A49-AE18-F67D-D84291F157CE}"/>
+          <p:cNvPr id="6" name="Inhaltsplatzhalter 5" descr="Ein Bild, das Text, Screenshot, Diagramm, parallel enthält.&#10;&#10;Automatisch generierte Beschreibung">
+            <a:extLst>
+              <a:ext uri="{FF2B5EF4-FFF2-40B4-BE49-F238E27FC236}">
+                <a16:creationId xmlns:a16="http://schemas.microsoft.com/office/drawing/2014/main" id="{691D6D46-577F-757D-73CB-39F98A2B11AD}"/>
               </a:ext>
             </a:extLst>
           </p:cNvPr>
@@ -12151,7 +13620,7 @@
           </p:nvPr>
         </p:nvPicPr>
         <p:blipFill>
-          <a:blip r:embed="rId2">
+          <a:blip r:embed="rId3">
             <a:extLst>
               <a:ext uri="{28A0092B-C50C-407E-A947-70E740481C1C}">
                 <a14:useLocalDpi xmlns:a14="http://schemas.microsoft.com/office/drawing/2010/main" val="0"/>
@@ -12164,17 +13633,17 @@
         </p:blipFill>
         <p:spPr>
           <a:xfrm>
-            <a:off x="5292080" y="1298165"/>
-            <a:ext cx="3628725" cy="2778907"/>
+            <a:off x="907045" y="2090271"/>
+            <a:ext cx="7329910" cy="3870050"/>
           </a:xfrm>
         </p:spPr>
       </p:pic>
       <p:sp>
         <p:nvSpPr>
-          <p:cNvPr id="6" name="Textfeld 5">
-            <a:extLst>
-              <a:ext uri="{FF2B5EF4-FFF2-40B4-BE49-F238E27FC236}">
-                <a16:creationId xmlns:a16="http://schemas.microsoft.com/office/drawing/2014/main" id="{9CD25E95-B8E7-9391-5FA5-E84D7322D248}"/>
+          <p:cNvPr id="4" name="Textfeld 3">
+            <a:extLst>
+              <a:ext uri="{FF2B5EF4-FFF2-40B4-BE49-F238E27FC236}">
+                <a16:creationId xmlns:a16="http://schemas.microsoft.com/office/drawing/2014/main" id="{B4323966-8051-9371-9650-27BE4F108771}"/>
               </a:ext>
             </a:extLst>
           </p:cNvPr>
@@ -12183,8 +13652,8 @@
         </p:nvSpPr>
         <p:spPr bwMode="auto">
           <a:xfrm>
-            <a:off x="461764" y="3702511"/>
-            <a:ext cx="4862314" cy="2246769"/>
+            <a:off x="323528" y="1181364"/>
+            <a:ext cx="8496944" cy="584775"/>
           </a:xfrm>
           <a:prstGeom prst="rect">
             <a:avLst/>
@@ -12203,95 +13672,239 @@
           </a:bodyPr>
           <a:lstStyle/>
           <a:p>
-            <a:pPr eaLnBrk="1" hangingPunct="1"/>
-            <a:r>
-              <a:rPr lang="de-DE" sz="2000" b="1" dirty="0">
+            <a:pPr algn="ctr" eaLnBrk="1" hangingPunct="1"/>
+            <a:r>
+              <a:rPr lang="de-DE" sz="3200" dirty="0">
                 <a:latin typeface="+mj-lt"/>
               </a:rPr>
-              <a:t>Was ist ein Container?</a:t>
-            </a:r>
-            <a:endParaRPr lang="de-DE" sz="2000" b="1" dirty="0">
-              <a:latin typeface="Arial" charset="0"/>
+              <a:t>Docker Infrastruktur</a:t>
+            </a:r>
+          </a:p>
+        </p:txBody>
+      </p:sp>
+      <p:sp>
+        <p:nvSpPr>
+          <p:cNvPr id="3" name="Rechteck 2">
+            <a:extLst>
+              <a:ext uri="{FF2B5EF4-FFF2-40B4-BE49-F238E27FC236}">
+                <a16:creationId xmlns:a16="http://schemas.microsoft.com/office/drawing/2014/main" id="{601A3A72-F85B-F166-2335-4DB84A380CB1}"/>
+              </a:ext>
+            </a:extLst>
+          </p:cNvPr>
+          <p:cNvSpPr/>
+          <p:nvPr/>
+        </p:nvSpPr>
+        <p:spPr bwMode="auto">
+          <a:xfrm>
+            <a:off x="4099491" y="2492896"/>
+            <a:ext cx="945017" cy="1656184"/>
+          </a:xfrm>
+          <a:prstGeom prst="rect">
+            <a:avLst/>
+          </a:prstGeom>
+          <a:solidFill>
+            <a:schemeClr val="accent2">
+              <a:alpha val="24000"/>
+            </a:schemeClr>
+          </a:solidFill>
+          <a:ln w="12700" cap="flat" cmpd="sng" algn="ctr">
+            <a:solidFill>
+              <a:srgbClr val="0D4F3C"/>
+            </a:solidFill>
+            <a:prstDash val="solid"/>
+            <a:round/>
+            <a:headEnd type="none" w="sm" len="sm"/>
+            <a:tailEnd type="none" w="sm" len="sm"/>
+          </a:ln>
+          <a:effectLst/>
+        </p:spPr>
+        <p:txBody>
+          <a:bodyPr vert="horz" wrap="square" lIns="91440" tIns="45720" rIns="91440" bIns="45720" numCol="1" rtlCol="0" anchor="t" anchorCtr="0" compatLnSpc="1">
+            <a:prstTxWarp prst="textNoShape">
+              <a:avLst/>
+            </a:prstTxWarp>
+          </a:bodyPr>
+          <a:lstStyle/>
+          <a:p>
+            <a:pPr marL="0" marR="0" indent="0" algn="l" defTabSz="914400" rtl="0" eaLnBrk="0" fontAlgn="base" latinLnBrk="0" hangingPunct="0">
+              <a:lnSpc>
+                <a:spcPct val="100000"/>
+              </a:lnSpc>
+              <a:spcBef>
+                <a:spcPct val="0"/>
+              </a:spcBef>
+              <a:spcAft>
+                <a:spcPct val="0"/>
+              </a:spcAft>
+              <a:buClrTx/>
+              <a:buSzTx/>
+              <a:buFontTx/>
+              <a:buNone/>
+              <a:tabLst/>
+            </a:pPr>
+            <a:endParaRPr kumimoji="0" lang="de-DE" sz="2400" b="0" i="0" u="none" strike="noStrike" cap="none" normalizeH="0" baseline="0">
+              <a:ln>
+                <a:noFill/>
+              </a:ln>
+              <a:solidFill>
+                <a:schemeClr val="tx1"/>
+              </a:solidFill>
+              <a:effectLst/>
+              <a:latin typeface="Times New Roman" pitchFamily="18" charset="0"/>
             </a:endParaRPr>
           </a:p>
-          <a:p>
-            <a:pPr marL="342900" indent="-342900" eaLnBrk="1" hangingPunct="1">
-              <a:buFont typeface="Arial" panose="020B0604020202020204" pitchFamily="34" charset="0"/>
-              <a:buChar char="•"/>
-            </a:pPr>
-            <a:r>
-              <a:rPr lang="de-DE" sz="2000" dirty="0">
-                <a:latin typeface="Arial" charset="0"/>
-              </a:rPr>
-              <a:t>Virtuelle Umgebung für Software</a:t>
-            </a:r>
-          </a:p>
-          <a:p>
-            <a:pPr marL="342900" indent="-342900" eaLnBrk="1" hangingPunct="1">
-              <a:buFont typeface="Arial" panose="020B0604020202020204" pitchFamily="34" charset="0"/>
-              <a:buChar char="•"/>
-            </a:pPr>
-            <a:r>
-              <a:rPr lang="de-DE" sz="2000" dirty="0">
-                <a:latin typeface="Arial" charset="0"/>
-              </a:rPr>
-              <a:t>Klein und Lightweight</a:t>
-            </a:r>
-          </a:p>
-          <a:p>
-            <a:pPr marL="342900" indent="-342900" eaLnBrk="1" hangingPunct="1">
-              <a:buFont typeface="Arial" panose="020B0604020202020204" pitchFamily="34" charset="0"/>
-              <a:buChar char="•"/>
-            </a:pPr>
-            <a:r>
-              <a:rPr lang="de-DE" sz="2000" dirty="0">
-                <a:latin typeface="Arial" charset="0"/>
-              </a:rPr>
-              <a:t>Abgekapselt</a:t>
-            </a:r>
-          </a:p>
-          <a:p>
-            <a:pPr marL="342900" indent="-342900" eaLnBrk="1" hangingPunct="1">
-              <a:buFont typeface="Arial" panose="020B0604020202020204" pitchFamily="34" charset="0"/>
-              <a:buChar char="•"/>
-            </a:pPr>
-            <a:r>
-              <a:rPr lang="de-DE" sz="2000" dirty="0">
-                <a:latin typeface="Arial" charset="0"/>
-              </a:rPr>
-              <a:t>Eigenes Dateisystem</a:t>
-            </a:r>
-          </a:p>
-          <a:p>
-            <a:pPr marL="342900" indent="-342900" eaLnBrk="1" hangingPunct="1">
-              <a:buFont typeface="Arial" panose="020B0604020202020204" pitchFamily="34" charset="0"/>
-              <a:buChar char="•"/>
-            </a:pPr>
-            <a:r>
-              <a:rPr lang="de-DE" sz="2000" dirty="0">
-                <a:latin typeface="Arial" charset="0"/>
-              </a:rPr>
-              <a:t>Performant</a:t>
-            </a:r>
-          </a:p>
-          <a:p>
-            <a:pPr marL="342900" indent="-342900" eaLnBrk="1" hangingPunct="1">
-              <a:buFont typeface="Arial" panose="020B0604020202020204" pitchFamily="34" charset="0"/>
-              <a:buChar char="•"/>
-            </a:pPr>
-            <a:r>
-              <a:rPr lang="de-DE" sz="2000" dirty="0">
-                <a:latin typeface="Arial" charset="0"/>
-              </a:rPr>
-              <a:t>Betriebssystemunabhängig</a:t>
-            </a:r>
+        </p:txBody>
+      </p:sp>
+      <p:sp>
+        <p:nvSpPr>
+          <p:cNvPr id="5" name="Rechteck 4">
+            <a:extLst>
+              <a:ext uri="{FF2B5EF4-FFF2-40B4-BE49-F238E27FC236}">
+                <a16:creationId xmlns:a16="http://schemas.microsoft.com/office/drawing/2014/main" id="{ED4B6DBB-81D1-3C79-642C-1F07D11EDC33}"/>
+              </a:ext>
+            </a:extLst>
+          </p:cNvPr>
+          <p:cNvSpPr/>
+          <p:nvPr/>
+        </p:nvSpPr>
+        <p:spPr bwMode="auto">
+          <a:xfrm>
+            <a:off x="5283167" y="2454021"/>
+            <a:ext cx="945017" cy="1263011"/>
+          </a:xfrm>
+          <a:prstGeom prst="rect">
+            <a:avLst/>
+          </a:prstGeom>
+          <a:solidFill>
+            <a:schemeClr val="accent2">
+              <a:alpha val="24000"/>
+            </a:schemeClr>
+          </a:solidFill>
+          <a:ln w="12700" cap="flat" cmpd="sng" algn="ctr">
+            <a:solidFill>
+              <a:srgbClr val="0D4F3C"/>
+            </a:solidFill>
+            <a:prstDash val="solid"/>
+            <a:round/>
+            <a:headEnd type="none" w="sm" len="sm"/>
+            <a:tailEnd type="none" w="sm" len="sm"/>
+          </a:ln>
+          <a:effectLst/>
+        </p:spPr>
+        <p:txBody>
+          <a:bodyPr vert="horz" wrap="square" lIns="91440" tIns="45720" rIns="91440" bIns="45720" numCol="1" rtlCol="0" anchor="t" anchorCtr="0" compatLnSpc="1">
+            <a:prstTxWarp prst="textNoShape">
+              <a:avLst/>
+            </a:prstTxWarp>
+          </a:bodyPr>
+          <a:lstStyle/>
+          <a:p>
+            <a:pPr marL="0" marR="0" indent="0" algn="l" defTabSz="914400" rtl="0" eaLnBrk="0" fontAlgn="base" latinLnBrk="0" hangingPunct="0">
+              <a:lnSpc>
+                <a:spcPct val="100000"/>
+              </a:lnSpc>
+              <a:spcBef>
+                <a:spcPct val="0"/>
+              </a:spcBef>
+              <a:spcAft>
+                <a:spcPct val="0"/>
+              </a:spcAft>
+              <a:buClrTx/>
+              <a:buSzTx/>
+              <a:buFontTx/>
+              <a:buNone/>
+              <a:tabLst/>
+            </a:pPr>
+            <a:endParaRPr kumimoji="0" lang="de-DE" sz="2400" b="0" i="0" u="none" strike="noStrike" cap="none" normalizeH="0" baseline="0">
+              <a:ln>
+                <a:noFill/>
+              </a:ln>
+              <a:solidFill>
+                <a:schemeClr val="tx1"/>
+              </a:solidFill>
+              <a:effectLst/>
+              <a:latin typeface="Times New Roman" pitchFamily="18" charset="0"/>
+            </a:endParaRPr>
+          </a:p>
+        </p:txBody>
+      </p:sp>
+      <p:sp>
+        <p:nvSpPr>
+          <p:cNvPr id="7" name="Rechteck 6">
+            <a:extLst>
+              <a:ext uri="{FF2B5EF4-FFF2-40B4-BE49-F238E27FC236}">
+                <a16:creationId xmlns:a16="http://schemas.microsoft.com/office/drawing/2014/main" id="{E94399D0-39A1-83DF-A17B-F0F6D15A6BB6}"/>
+              </a:ext>
+            </a:extLst>
+          </p:cNvPr>
+          <p:cNvSpPr/>
+          <p:nvPr/>
+        </p:nvSpPr>
+        <p:spPr bwMode="auto">
+          <a:xfrm>
+            <a:off x="6735221" y="2057977"/>
+            <a:ext cx="1501733" cy="3902344"/>
+          </a:xfrm>
+          <a:prstGeom prst="rect">
+            <a:avLst/>
+          </a:prstGeom>
+          <a:solidFill>
+            <a:schemeClr val="accent2">
+              <a:alpha val="24000"/>
+            </a:schemeClr>
+          </a:solidFill>
+          <a:ln w="12700" cap="flat" cmpd="sng" algn="ctr">
+            <a:solidFill>
+              <a:srgbClr val="0D4F3C"/>
+            </a:solidFill>
+            <a:prstDash val="solid"/>
+            <a:round/>
+            <a:headEnd type="none" w="sm" len="sm"/>
+            <a:tailEnd type="none" w="sm" len="sm"/>
+          </a:ln>
+          <a:effectLst/>
+        </p:spPr>
+        <p:txBody>
+          <a:bodyPr vert="horz" wrap="square" lIns="91440" tIns="45720" rIns="91440" bIns="45720" numCol="1" rtlCol="0" anchor="t" anchorCtr="0" compatLnSpc="1">
+            <a:prstTxWarp prst="textNoShape">
+              <a:avLst/>
+            </a:prstTxWarp>
+          </a:bodyPr>
+          <a:lstStyle/>
+          <a:p>
+            <a:pPr marL="0" marR="0" indent="0" algn="l" defTabSz="914400" rtl="0" eaLnBrk="0" fontAlgn="base" latinLnBrk="0" hangingPunct="0">
+              <a:lnSpc>
+                <a:spcPct val="100000"/>
+              </a:lnSpc>
+              <a:spcBef>
+                <a:spcPct val="0"/>
+              </a:spcBef>
+              <a:spcAft>
+                <a:spcPct val="0"/>
+              </a:spcAft>
+              <a:buClrTx/>
+              <a:buSzTx/>
+              <a:buFontTx/>
+              <a:buNone/>
+              <a:tabLst/>
+            </a:pPr>
+            <a:endParaRPr kumimoji="0" lang="de-DE" sz="2400" b="0" i="0" u="none" strike="noStrike" cap="none" normalizeH="0" baseline="0">
+              <a:ln>
+                <a:noFill/>
+              </a:ln>
+              <a:solidFill>
+                <a:schemeClr val="tx1"/>
+              </a:solidFill>
+              <a:effectLst/>
+              <a:latin typeface="Times New Roman" pitchFamily="18" charset="0"/>
+            </a:endParaRPr>
           </a:p>
         </p:txBody>
       </p:sp>
     </p:spTree>
     <p:extLst>
       <p:ext uri="{BB962C8B-B14F-4D97-AF65-F5344CB8AC3E}">
-        <p14:creationId xmlns:p14="http://schemas.microsoft.com/office/powerpoint/2010/main" val="1437393746"/>
+        <p14:creationId xmlns:p14="http://schemas.microsoft.com/office/powerpoint/2010/main" val="742900448"/>
       </p:ext>
     </p:extLst>
   </p:cSld>
@@ -12365,8 +13978,8 @@
         </p:nvSpPr>
         <p:spPr bwMode="auto">
           <a:xfrm>
-            <a:off x="4139952" y="1229333"/>
-            <a:ext cx="4862314" cy="1631216"/>
+            <a:off x="461763" y="1268760"/>
+            <a:ext cx="5378649" cy="4401205"/>
           </a:xfrm>
           <a:prstGeom prst="rect">
             <a:avLst/>
@@ -12380,7 +13993,7 @@
           </a:ln>
         </p:spPr>
         <p:txBody>
-          <a:bodyPr wrap="square" rtlCol="0" anchor="ctr">
+          <a:bodyPr wrap="square" rtlCol="0" anchor="t" anchorCtr="0">
             <a:spAutoFit/>
           </a:bodyPr>
           <a:lstStyle/>
@@ -12390,7 +14003,7 @@
               <a:rPr lang="de-DE" sz="2000" b="1" dirty="0">
                 <a:latin typeface="+mj-lt"/>
               </a:rPr>
-              <a:t>Was ist ein Image?</a:t>
+              <a:t>Was ist ein Container?</a:t>
             </a:r>
             <a:endParaRPr lang="de-DE" sz="2000" b="1" dirty="0">
               <a:latin typeface="Arial" charset="0"/>
@@ -12405,7 +14018,7 @@
               <a:rPr lang="de-DE" sz="2000" dirty="0">
                 <a:latin typeface="Arial" charset="0"/>
               </a:rPr>
-              <a:t>„Bauanleitung für Container“</a:t>
+              <a:t>Virtuelle Umgebung für Software</a:t>
             </a:r>
           </a:p>
           <a:p>
@@ -12417,7 +14030,7 @@
               <a:rPr lang="de-DE" sz="2000" dirty="0">
                 <a:latin typeface="Arial" charset="0"/>
               </a:rPr>
-              <a:t>Ein Image, viele Container</a:t>
+              <a:t>Klein und Lightweight</a:t>
             </a:r>
           </a:p>
           <a:p>
@@ -12429,7 +14042,7 @@
               <a:rPr lang="de-DE" sz="2000" dirty="0">
                 <a:latin typeface="Arial" charset="0"/>
               </a:rPr>
-              <a:t>Werden in Schichten gebaut</a:t>
+              <a:t>Abgekapselt</a:t>
             </a:r>
           </a:p>
           <a:p>
@@ -12441,17 +14054,128 @@
               <a:rPr lang="de-DE" sz="2000" dirty="0">
                 <a:latin typeface="Arial" charset="0"/>
               </a:rPr>
-              <a:t>Basieren auf anderen Images</a:t>
+              <a:t>Eigenes Dateisystem</a:t>
+            </a:r>
+          </a:p>
+          <a:p>
+            <a:pPr marL="342900" indent="-342900" eaLnBrk="1" hangingPunct="1">
+              <a:buFont typeface="Arial" panose="020B0604020202020204" pitchFamily="34" charset="0"/>
+              <a:buChar char="•"/>
+            </a:pPr>
+            <a:r>
+              <a:rPr lang="de-DE" sz="2000" dirty="0">
+                <a:latin typeface="Arial" charset="0"/>
+              </a:rPr>
+              <a:t>Performant</a:t>
+            </a:r>
+          </a:p>
+          <a:p>
+            <a:pPr marL="342900" indent="-342900" eaLnBrk="1" hangingPunct="1">
+              <a:buFont typeface="Arial" panose="020B0604020202020204" pitchFamily="34" charset="0"/>
+              <a:buChar char="•"/>
+            </a:pPr>
+            <a:r>
+              <a:rPr lang="de-DE" sz="2000" dirty="0">
+                <a:latin typeface="Arial" charset="0"/>
+              </a:rPr>
+              <a:t>Betriebssystemunabhängig</a:t>
+            </a:r>
+          </a:p>
+          <a:p>
+            <a:pPr marL="342900" indent="-342900" eaLnBrk="1" hangingPunct="1">
+              <a:buFont typeface="Arial" panose="020B0604020202020204" pitchFamily="34" charset="0"/>
+              <a:buChar char="•"/>
+            </a:pPr>
+            <a:endParaRPr lang="de-DE" sz="2000" dirty="0">
+              <a:latin typeface="Arial" charset="0"/>
+            </a:endParaRPr>
+          </a:p>
+          <a:p>
+            <a:pPr eaLnBrk="1" hangingPunct="1"/>
+            <a:r>
+              <a:rPr lang="de-DE" sz="2000" b="1" dirty="0">
+                <a:latin typeface="Arial" charset="0"/>
+              </a:rPr>
+              <a:t>Warum keine VM?</a:t>
+            </a:r>
+          </a:p>
+          <a:p>
+            <a:pPr marL="342900" indent="-342900" eaLnBrk="1" hangingPunct="1">
+              <a:buFont typeface="Arial" panose="020B0604020202020204" pitchFamily="34" charset="0"/>
+              <a:buChar char="•"/>
+            </a:pPr>
+            <a:r>
+              <a:rPr lang="de-DE" sz="2000" dirty="0">
+                <a:latin typeface="Arial" charset="0"/>
+              </a:rPr>
+              <a:t>Weniger Speicherplatz</a:t>
+            </a:r>
+          </a:p>
+          <a:p>
+            <a:pPr marL="800100" lvl="1" indent="-342900" eaLnBrk="1" hangingPunct="1">
+              <a:buFont typeface="Arial" panose="020B0604020202020204" pitchFamily="34" charset="0"/>
+              <a:buChar char="•"/>
+            </a:pPr>
+            <a:r>
+              <a:rPr lang="de-DE" sz="2000" dirty="0">
+                <a:latin typeface="Arial" charset="0"/>
+              </a:rPr>
+              <a:t>MB im Vergleich zu GB</a:t>
+            </a:r>
+          </a:p>
+          <a:p>
+            <a:pPr marL="342900" indent="-342900" eaLnBrk="1" hangingPunct="1">
+              <a:buFont typeface="Arial" panose="020B0604020202020204" pitchFamily="34" charset="0"/>
+              <a:buChar char="•"/>
+            </a:pPr>
+            <a:r>
+              <a:rPr lang="de-DE" sz="2000" dirty="0">
+                <a:latin typeface="Arial" charset="0"/>
+              </a:rPr>
+              <a:t>Schnelleres Startup für </a:t>
+            </a:r>
+            <a:r>
+              <a:rPr lang="de-DE" sz="2000" dirty="0" err="1">
+                <a:latin typeface="Arial" charset="0"/>
+              </a:rPr>
+              <a:t>Scaling</a:t>
+            </a:r>
+            <a:endParaRPr lang="de-DE" sz="2000" dirty="0">
+              <a:latin typeface="Arial" charset="0"/>
+            </a:endParaRPr>
+          </a:p>
+          <a:p>
+            <a:pPr marL="800100" lvl="1" indent="-342900" eaLnBrk="1" hangingPunct="1">
+              <a:buFont typeface="Arial" panose="020B0604020202020204" pitchFamily="34" charset="0"/>
+              <a:buChar char="•"/>
+            </a:pPr>
+            <a:r>
+              <a:rPr lang="de-DE" sz="2000" dirty="0">
+                <a:latin typeface="Arial" charset="0"/>
+              </a:rPr>
+              <a:t>Sekunden im Vergleich zu Minuten</a:t>
+            </a:r>
+          </a:p>
+          <a:p>
+            <a:pPr marL="342900" indent="-342900" eaLnBrk="1" hangingPunct="1">
+              <a:buFont typeface="Arial" panose="020B0604020202020204" pitchFamily="34" charset="0"/>
+              <a:buChar char="•"/>
+            </a:pPr>
+            <a:r>
+              <a:rPr lang="de-DE" sz="2000" dirty="0">
+                <a:latin typeface="Arial" charset="0"/>
+              </a:rPr>
+              <a:t>Performanter</a:t>
             </a:r>
           </a:p>
         </p:txBody>
       </p:sp>
       <p:pic>
         <p:nvPicPr>
-          <p:cNvPr id="7" name="Inhaltsplatzhalter 6" descr="Ein Bild, das Elektronik, Compact Disc, Datenträger, CD enthält.&#10;&#10;Automatisch generierte Beschreibung">
-            <a:extLst>
-              <a:ext uri="{FF2B5EF4-FFF2-40B4-BE49-F238E27FC236}">
-                <a16:creationId xmlns:a16="http://schemas.microsoft.com/office/drawing/2014/main" id="{E22FBDEF-E23A-233B-B93E-55198BCB9CD2}"/>
+          <p:cNvPr id="5" name="Inhaltsplatzhalter 4" descr="Ein Bild, das Himmel, Wolke, draußen, Frachtcontainer enthält.&#10;&#10;Automatisch generierte Beschreibung">
+            <a:extLst>
+              <a:ext uri="{FF2B5EF4-FFF2-40B4-BE49-F238E27FC236}">
+                <a16:creationId xmlns:a16="http://schemas.microsoft.com/office/drawing/2014/main" id="{1F7346A8-5256-139B-4943-9DE69544571F}"/>
               </a:ext>
             </a:extLst>
           </p:cNvPr>
@@ -12463,7 +14187,7 @@
           </p:nvPr>
         </p:nvPicPr>
         <p:blipFill>
-          <a:blip r:embed="rId2">
+          <a:blip r:embed="rId3">
             <a:extLst>
               <a:ext uri="{28A0092B-C50C-407E-A947-70E740481C1C}">
                 <a14:useLocalDpi xmlns:a14="http://schemas.microsoft.com/office/drawing/2010/main" val="0"/>
@@ -12476,15 +14200,18 @@
         </p:blipFill>
         <p:spPr>
           <a:xfrm>
-            <a:off x="10466" y="2802674"/>
-            <a:ext cx="3985470" cy="3435060"/>
+            <a:off x="5806082" y="1259632"/>
+            <a:ext cx="3096344" cy="3870431"/>
           </a:xfrm>
+          <a:effectLst>
+            <a:softEdge rad="25400"/>
+          </a:effectLst>
         </p:spPr>
       </p:pic>
     </p:spTree>
     <p:extLst>
       <p:ext uri="{BB962C8B-B14F-4D97-AF65-F5344CB8AC3E}">
-        <p14:creationId xmlns:p14="http://schemas.microsoft.com/office/powerpoint/2010/main" val="2158894280"/>
+        <p14:creationId xmlns:p14="http://schemas.microsoft.com/office/powerpoint/2010/main" val="1437393746"/>
       </p:ext>
     </p:extLst>
   </p:cSld>

</xml_diff>

<commit_message>
Typos und Notizen 3-2 Docker
</commit_message>
<xml_diff>
--- a/slides/Tag-3_2-Docker.pptx
+++ b/slides/Tag-3_2-Docker.pptx
@@ -1082,7 +1082,16 @@
           <a:bodyPr/>
           <a:lstStyle/>
           <a:p>
-            <a:endParaRPr lang="de-DE" dirty="0"/>
+            <a:r>
+              <a:rPr lang="de-DE" dirty="0"/>
+              <a:t>Container können vom Entwickler gepuscht und via Cloud in Produktion gepullt und gestartet werden</a:t>
+            </a:r>
+          </a:p>
+          <a:p>
+            <a:r>
+              <a:rPr lang="de-DE" dirty="0"/>
+              <a:t>Push via CD</a:t>
+            </a:r>
           </a:p>
         </p:txBody>
       </p:sp>
@@ -1104,7 +1113,7 @@
             <a:fld id="{18182567-388C-4D33-8B7B-A651F195F118}" type="slidenum">
               <a:rPr lang="de-DE" altLang="de-DE" smtClean="0"/>
               <a:pPr/>
-              <a:t>22</a:t>
+              <a:t>11</a:t>
             </a:fld>
             <a:endParaRPr lang="de-DE" altLang="de-DE"/>
           </a:p>
@@ -1113,7 +1122,7 @@
     </p:spTree>
     <p:extLst>
       <p:ext uri="{BB962C8B-B14F-4D97-AF65-F5344CB8AC3E}">
-        <p14:creationId xmlns:p14="http://schemas.microsoft.com/office/powerpoint/2010/main" val="1608299900"/>
+        <p14:creationId xmlns:p14="http://schemas.microsoft.com/office/powerpoint/2010/main" val="3809681213"/>
       </p:ext>
     </p:extLst>
   </p:cSld>
@@ -1168,22 +1177,18 @@
           <a:lstStyle/>
           <a:p>
             <a:r>
-              <a:rPr lang="de-DE" dirty="0" err="1"/>
-              <a:t>run</a:t>
-            </a:r>
-            <a:r>
-              <a:rPr lang="de-DE" dirty="0"/>
-              <a:t> erstellt und startet Container direkt</a:t>
-            </a:r>
-          </a:p>
-          <a:p>
-            <a:r>
-              <a:rPr lang="de-DE" dirty="0" err="1"/>
-              <a:t>create</a:t>
-            </a:r>
-            <a:r>
-              <a:rPr lang="de-DE" dirty="0"/>
-              <a:t> erstellt nur den Container</a:t>
+              <a:rPr lang="de-DE" dirty="0"/>
+              <a:t>Bild generiert mit deepai.org</a:t>
+            </a:r>
+            <a:br>
+              <a:rPr lang="de-DE" dirty="0"/>
+            </a:br>
+            <a:br>
+              <a:rPr lang="de-DE" dirty="0"/>
+            </a:br>
+            <a:r>
+              <a:rPr lang="de-DE" dirty="0"/>
+              <a:t>Installation ist sehr unterschiedlich aber sehr gut dokumentiert.</a:t>
             </a:r>
           </a:p>
         </p:txBody>
@@ -1206,7 +1211,7 @@
             <a:fld id="{18182567-388C-4D33-8B7B-A651F195F118}" type="slidenum">
               <a:rPr lang="de-DE" altLang="de-DE" smtClean="0"/>
               <a:pPr/>
-              <a:t>24</a:t>
+              <a:t>12</a:t>
             </a:fld>
             <a:endParaRPr lang="de-DE" altLang="de-DE"/>
           </a:p>
@@ -1215,7 +1220,7 @@
     </p:spTree>
     <p:extLst>
       <p:ext uri="{BB962C8B-B14F-4D97-AF65-F5344CB8AC3E}">
-        <p14:creationId xmlns:p14="http://schemas.microsoft.com/office/powerpoint/2010/main" val="1608987838"/>
+        <p14:creationId xmlns:p14="http://schemas.microsoft.com/office/powerpoint/2010/main" val="2645555206"/>
       </p:ext>
     </p:extLst>
   </p:cSld>
@@ -1269,7 +1274,17 @@
           <a:bodyPr/>
           <a:lstStyle/>
           <a:p>
-            <a:endParaRPr lang="de-DE" dirty="0"/>
+            <a:r>
+              <a:rPr lang="de-DE" dirty="0"/>
+              <a:t>Einzelne schritte dieses Beispiels werden genauer durchgegangen</a:t>
+            </a:r>
+            <a:br>
+              <a:rPr lang="de-DE" dirty="0"/>
+            </a:br>
+            <a:r>
+              <a:rPr lang="de-DE" dirty="0"/>
+              <a:t>Schichten und Caching wird später weiter erläutert</a:t>
+            </a:r>
           </a:p>
         </p:txBody>
       </p:sp>
@@ -1291,7 +1306,7 @@
             <a:fld id="{18182567-388C-4D33-8B7B-A651F195F118}" type="slidenum">
               <a:rPr lang="de-DE" altLang="de-DE" smtClean="0"/>
               <a:pPr/>
-              <a:t>25</a:t>
+              <a:t>13</a:t>
             </a:fld>
             <a:endParaRPr lang="de-DE" altLang="de-DE"/>
           </a:p>
@@ -1300,7 +1315,7 @@
     </p:spTree>
     <p:extLst>
       <p:ext uri="{BB962C8B-B14F-4D97-AF65-F5344CB8AC3E}">
-        <p14:creationId xmlns:p14="http://schemas.microsoft.com/office/powerpoint/2010/main" val="2331032350"/>
+        <p14:creationId xmlns:p14="http://schemas.microsoft.com/office/powerpoint/2010/main" val="509761487"/>
       </p:ext>
     </p:extLst>
   </p:cSld>
@@ -1356,14 +1371,7 @@
           <a:p>
             <a:r>
               <a:rPr lang="de-DE" dirty="0"/>
-              <a:t>SIGTERM Gibt dem Programm Möglichkeit zu reagieren und sich selbst Ordnungsgemäß zu stoppen</a:t>
-            </a:r>
-            <a:br>
-              <a:rPr lang="de-DE" dirty="0"/>
-            </a:br>
-            <a:r>
-              <a:rPr lang="de-DE" dirty="0"/>
-              <a:t>SIGKILL würgt den Prozess sofort ab</a:t>
+              <a:t>Für das Demo Projekt nicht notwendig, aber wird oft gebraucht.</a:t>
             </a:r>
           </a:p>
         </p:txBody>
@@ -1386,7 +1394,7 @@
             <a:fld id="{18182567-388C-4D33-8B7B-A651F195F118}" type="slidenum">
               <a:rPr lang="de-DE" altLang="de-DE" smtClean="0"/>
               <a:pPr/>
-              <a:t>26</a:t>
+              <a:t>20</a:t>
             </a:fld>
             <a:endParaRPr lang="de-DE" altLang="de-DE"/>
           </a:p>
@@ -1395,7 +1403,7 @@
     </p:spTree>
     <p:extLst>
       <p:ext uri="{BB962C8B-B14F-4D97-AF65-F5344CB8AC3E}">
-        <p14:creationId xmlns:p14="http://schemas.microsoft.com/office/powerpoint/2010/main" val="1522668474"/>
+        <p14:creationId xmlns:p14="http://schemas.microsoft.com/office/powerpoint/2010/main" val="3033990164"/>
       </p:ext>
     </p:extLst>
   </p:cSld>
@@ -1449,7 +1457,55 @@
           <a:bodyPr/>
           <a:lstStyle/>
           <a:p>
-            <a:endParaRPr lang="de-DE" dirty="0"/>
+            <a:r>
+              <a:rPr lang="de-DE" dirty="0"/>
+              <a:t>Anderer Dateiname muss beim </a:t>
+            </a:r>
+            <a:r>
+              <a:rPr lang="de-DE" dirty="0" err="1"/>
+              <a:t>build</a:t>
+            </a:r>
+            <a:r>
+              <a:rPr lang="de-DE" dirty="0"/>
+              <a:t> </a:t>
+            </a:r>
+            <a:r>
+              <a:rPr lang="de-DE" dirty="0" err="1"/>
+              <a:t>command</a:t>
+            </a:r>
+            <a:r>
+              <a:rPr lang="de-DE" dirty="0"/>
+              <a:t> angegeben werden.</a:t>
+            </a:r>
+          </a:p>
+          <a:p>
+            <a:r>
+              <a:rPr lang="de-DE" dirty="0"/>
+              <a:t>Das Image wird nach jeden schritt (jeder </a:t>
+            </a:r>
+            <a:r>
+              <a:rPr lang="de-DE" dirty="0" err="1"/>
+              <a:t>layer</a:t>
+            </a:r>
+            <a:r>
+              <a:rPr lang="de-DE" dirty="0"/>
+              <a:t>) </a:t>
+            </a:r>
+            <a:r>
+              <a:rPr lang="de-DE" dirty="0" err="1"/>
+              <a:t>gecached</a:t>
+            </a:r>
+            <a:r>
+              <a:rPr lang="de-DE" dirty="0"/>
+              <a:t>.</a:t>
+            </a:r>
+            <a:br>
+              <a:rPr lang="de-DE" dirty="0"/>
+            </a:br>
+            <a:r>
+              <a:rPr lang="de-DE" dirty="0"/>
+              <a:t>Nur wenn sich ein schritt verändert wird dieser (und alle danach) neu gebaut.</a:t>
+            </a:r>
           </a:p>
         </p:txBody>
       </p:sp>
@@ -1471,7 +1527,7 @@
             <a:fld id="{18182567-388C-4D33-8B7B-A651F195F118}" type="slidenum">
               <a:rPr lang="de-DE" altLang="de-DE" smtClean="0"/>
               <a:pPr/>
-              <a:t>27</a:t>
+              <a:t>21</a:t>
             </a:fld>
             <a:endParaRPr lang="de-DE" altLang="de-DE"/>
           </a:p>
@@ -1480,7 +1536,7 @@
     </p:spTree>
     <p:extLst>
       <p:ext uri="{BB962C8B-B14F-4D97-AF65-F5344CB8AC3E}">
-        <p14:creationId xmlns:p14="http://schemas.microsoft.com/office/powerpoint/2010/main" val="2320076113"/>
+        <p14:creationId xmlns:p14="http://schemas.microsoft.com/office/powerpoint/2010/main" val="3907952042"/>
       </p:ext>
     </p:extLst>
   </p:cSld>
@@ -1556,7 +1612,7 @@
             <a:fld id="{18182567-388C-4D33-8B7B-A651F195F118}" type="slidenum">
               <a:rPr lang="de-DE" altLang="de-DE" smtClean="0"/>
               <a:pPr/>
-              <a:t>28</a:t>
+              <a:t>22</a:t>
             </a:fld>
             <a:endParaRPr lang="de-DE" altLang="de-DE"/>
           </a:p>
@@ -1565,7 +1621,7 @@
     </p:spTree>
     <p:extLst>
       <p:ext uri="{BB962C8B-B14F-4D97-AF65-F5344CB8AC3E}">
-        <p14:creationId xmlns:p14="http://schemas.microsoft.com/office/powerpoint/2010/main" val="2581772467"/>
+        <p14:creationId xmlns:p14="http://schemas.microsoft.com/office/powerpoint/2010/main" val="1608299900"/>
       </p:ext>
     </p:extLst>
   </p:cSld>
@@ -1620,54 +1676,16 @@
           <a:lstStyle/>
           <a:p>
             <a:r>
-              <a:rPr lang="de-DE" noProof="0" dirty="0"/>
-              <a:t>Demo:</a:t>
-            </a:r>
-            <a:br>
-              <a:rPr lang="de-DE" noProof="0" dirty="0"/>
-            </a:br>
-            <a:r>
-              <a:rPr lang="de-DE" noProof="0" dirty="0"/>
-              <a:t>Ähnlich zu Übungsaufgabe in der ausgeblendeten Folie</a:t>
-            </a:r>
-            <a:br>
-              <a:rPr lang="de-DE" noProof="0" dirty="0"/>
-            </a:br>
-            <a:br>
-              <a:rPr lang="de-DE" noProof="0" dirty="0"/>
-            </a:br>
-            <a:r>
-              <a:rPr lang="de-DE" noProof="0" dirty="0"/>
-              <a:t>Image erstellen via </a:t>
-            </a:r>
-            <a:r>
-              <a:rPr lang="de-DE" noProof="0" dirty="0" err="1"/>
-              <a:t>Dockerfile</a:t>
-            </a:r>
-            <a:r>
-              <a:rPr lang="de-DE" noProof="0" dirty="0"/>
-              <a:t> im </a:t>
-            </a:r>
-            <a:r>
-              <a:rPr lang="de-DE" noProof="0" dirty="0" err="1"/>
-              <a:t>Example</a:t>
-            </a:r>
-            <a:r>
-              <a:rPr lang="de-DE" noProof="0" dirty="0"/>
-              <a:t> Ordner</a:t>
-            </a:r>
-            <a:br>
-              <a:rPr lang="de-DE" noProof="0" dirty="0"/>
-            </a:br>
-            <a:r>
-              <a:rPr lang="de-DE" noProof="0" dirty="0"/>
-              <a:t>Container aus dem Image starten</a:t>
-            </a:r>
-          </a:p>
-          <a:p>
-            <a:r>
-              <a:rPr lang="de-DE" noProof="0" dirty="0"/>
-              <a:t>Logs und Dateisystem mittels Docker Desktop zeigen. </a:t>
+              <a:rPr lang="de-DE" dirty="0"/>
+              <a:t>-f </a:t>
+            </a:r>
+            <a:r>
+              <a:rPr lang="de-DE" dirty="0" err="1"/>
+              <a:t>differentfile.file</a:t>
+            </a:r>
+            <a:r>
+              <a:rPr lang="de-DE" dirty="0"/>
+              <a:t> um eine anders benannte Datei zu benutzen</a:t>
             </a:r>
           </a:p>
         </p:txBody>
@@ -1690,7 +1708,7 @@
             <a:fld id="{18182567-388C-4D33-8B7B-A651F195F118}" type="slidenum">
               <a:rPr lang="de-DE" altLang="de-DE" smtClean="0"/>
               <a:pPr/>
-              <a:t>29</a:t>
+              <a:t>23</a:t>
             </a:fld>
             <a:endParaRPr lang="de-DE" altLang="de-DE"/>
           </a:p>
@@ -1699,7 +1717,301 @@
     </p:spTree>
     <p:extLst>
       <p:ext uri="{BB962C8B-B14F-4D97-AF65-F5344CB8AC3E}">
-        <p14:creationId xmlns:p14="http://schemas.microsoft.com/office/powerpoint/2010/main" val="2778018805"/>
+        <p14:creationId xmlns:p14="http://schemas.microsoft.com/office/powerpoint/2010/main" val="3054495615"/>
+      </p:ext>
+    </p:extLst>
+  </p:cSld>
+  <p:clrMapOvr>
+    <a:masterClrMapping/>
+  </p:clrMapOvr>
+</p:notes>
+</file>
+
+<file path=ppt/notesSlides/notesSlide17.xml><?xml version="1.0" encoding="utf-8"?>
+<p:notes xmlns:a="http://schemas.openxmlformats.org/drawingml/2006/main" xmlns:r="http://schemas.openxmlformats.org/officeDocument/2006/relationships" xmlns:p="http://schemas.openxmlformats.org/presentationml/2006/main">
+  <p:cSld>
+    <p:spTree>
+      <p:nvGrpSpPr>
+        <p:cNvPr id="1" name=""/>
+        <p:cNvGrpSpPr/>
+        <p:nvPr/>
+      </p:nvGrpSpPr>
+      <p:grpSpPr>
+        <a:xfrm>
+          <a:off x="0" y="0"/>
+          <a:ext cx="0" cy="0"/>
+          <a:chOff x="0" y="0"/>
+          <a:chExt cx="0" cy="0"/>
+        </a:xfrm>
+      </p:grpSpPr>
+      <p:sp>
+        <p:nvSpPr>
+          <p:cNvPr id="2" name="Folienbildplatzhalter 1"/>
+          <p:cNvSpPr>
+            <a:spLocks noGrp="1" noRot="1" noChangeAspect="1"/>
+          </p:cNvSpPr>
+          <p:nvPr>
+            <p:ph type="sldImg"/>
+          </p:nvPr>
+        </p:nvSpPr>
+        <p:spPr/>
+      </p:sp>
+      <p:sp>
+        <p:nvSpPr>
+          <p:cNvPr id="3" name="Notizenplatzhalter 2"/>
+          <p:cNvSpPr>
+            <a:spLocks noGrp="1"/>
+          </p:cNvSpPr>
+          <p:nvPr>
+            <p:ph type="body" idx="1"/>
+          </p:nvPr>
+        </p:nvSpPr>
+        <p:spPr/>
+        <p:txBody>
+          <a:bodyPr/>
+          <a:lstStyle/>
+          <a:p>
+            <a:r>
+              <a:rPr lang="de-DE" dirty="0" err="1"/>
+              <a:t>run</a:t>
+            </a:r>
+            <a:r>
+              <a:rPr lang="de-DE" dirty="0"/>
+              <a:t> erstellt und startet Container direkt</a:t>
+            </a:r>
+          </a:p>
+          <a:p>
+            <a:r>
+              <a:rPr lang="de-DE" dirty="0" err="1"/>
+              <a:t>create</a:t>
+            </a:r>
+            <a:r>
+              <a:rPr lang="de-DE" dirty="0"/>
+              <a:t> erstellt nur den Container</a:t>
+            </a:r>
+          </a:p>
+          <a:p>
+            <a:r>
+              <a:rPr lang="de-DE" dirty="0"/>
+              <a:t>Container bekommen Namen zugewiesen</a:t>
+            </a:r>
+          </a:p>
+          <a:p>
+            <a:r>
+              <a:rPr lang="de-DE" dirty="0"/>
+              <a:t>Images und Container können in der Docker Desktop GUI sehr einfach verwaltet werden. Für Debugging sehr angenehm</a:t>
+            </a:r>
+          </a:p>
+        </p:txBody>
+      </p:sp>
+      <p:sp>
+        <p:nvSpPr>
+          <p:cNvPr id="4" name="Foliennummernplatzhalter 3"/>
+          <p:cNvSpPr>
+            <a:spLocks noGrp="1"/>
+          </p:cNvSpPr>
+          <p:nvPr>
+            <p:ph type="sldNum" sz="quarter" idx="5"/>
+          </p:nvPr>
+        </p:nvSpPr>
+        <p:spPr/>
+        <p:txBody>
+          <a:bodyPr/>
+          <a:lstStyle/>
+          <a:p>
+            <a:fld id="{18182567-388C-4D33-8B7B-A651F195F118}" type="slidenum">
+              <a:rPr lang="de-DE" altLang="de-DE" smtClean="0"/>
+              <a:pPr/>
+              <a:t>24</a:t>
+            </a:fld>
+            <a:endParaRPr lang="de-DE" altLang="de-DE"/>
+          </a:p>
+        </p:txBody>
+      </p:sp>
+    </p:spTree>
+    <p:extLst>
+      <p:ext uri="{BB962C8B-B14F-4D97-AF65-F5344CB8AC3E}">
+        <p14:creationId xmlns:p14="http://schemas.microsoft.com/office/powerpoint/2010/main" val="1608987838"/>
+      </p:ext>
+    </p:extLst>
+  </p:cSld>
+  <p:clrMapOvr>
+    <a:masterClrMapping/>
+  </p:clrMapOvr>
+</p:notes>
+</file>
+
+<file path=ppt/notesSlides/notesSlide18.xml><?xml version="1.0" encoding="utf-8"?>
+<p:notes xmlns:a="http://schemas.openxmlformats.org/drawingml/2006/main" xmlns:r="http://schemas.openxmlformats.org/officeDocument/2006/relationships" xmlns:p="http://schemas.openxmlformats.org/presentationml/2006/main">
+  <p:cSld>
+    <p:spTree>
+      <p:nvGrpSpPr>
+        <p:cNvPr id="1" name=""/>
+        <p:cNvGrpSpPr/>
+        <p:nvPr/>
+      </p:nvGrpSpPr>
+      <p:grpSpPr>
+        <a:xfrm>
+          <a:off x="0" y="0"/>
+          <a:ext cx="0" cy="0"/>
+          <a:chOff x="0" y="0"/>
+          <a:chExt cx="0" cy="0"/>
+        </a:xfrm>
+      </p:grpSpPr>
+      <p:sp>
+        <p:nvSpPr>
+          <p:cNvPr id="2" name="Folienbildplatzhalter 1"/>
+          <p:cNvSpPr>
+            <a:spLocks noGrp="1" noRot="1" noChangeAspect="1"/>
+          </p:cNvSpPr>
+          <p:nvPr>
+            <p:ph type="sldImg"/>
+          </p:nvPr>
+        </p:nvSpPr>
+        <p:spPr/>
+      </p:sp>
+      <p:sp>
+        <p:nvSpPr>
+          <p:cNvPr id="3" name="Notizenplatzhalter 2"/>
+          <p:cNvSpPr>
+            <a:spLocks noGrp="1"/>
+          </p:cNvSpPr>
+          <p:nvPr>
+            <p:ph type="body" idx="1"/>
+          </p:nvPr>
+        </p:nvSpPr>
+        <p:spPr/>
+        <p:txBody>
+          <a:bodyPr/>
+          <a:lstStyle/>
+          <a:p>
+            <a:endParaRPr lang="de-DE" dirty="0"/>
+          </a:p>
+        </p:txBody>
+      </p:sp>
+      <p:sp>
+        <p:nvSpPr>
+          <p:cNvPr id="4" name="Foliennummernplatzhalter 3"/>
+          <p:cNvSpPr>
+            <a:spLocks noGrp="1"/>
+          </p:cNvSpPr>
+          <p:nvPr>
+            <p:ph type="sldNum" sz="quarter" idx="5"/>
+          </p:nvPr>
+        </p:nvSpPr>
+        <p:spPr/>
+        <p:txBody>
+          <a:bodyPr/>
+          <a:lstStyle/>
+          <a:p>
+            <a:fld id="{18182567-388C-4D33-8B7B-A651F195F118}" type="slidenum">
+              <a:rPr lang="de-DE" altLang="de-DE" smtClean="0"/>
+              <a:pPr/>
+              <a:t>25</a:t>
+            </a:fld>
+            <a:endParaRPr lang="de-DE" altLang="de-DE"/>
+          </a:p>
+        </p:txBody>
+      </p:sp>
+    </p:spTree>
+    <p:extLst>
+      <p:ext uri="{BB962C8B-B14F-4D97-AF65-F5344CB8AC3E}">
+        <p14:creationId xmlns:p14="http://schemas.microsoft.com/office/powerpoint/2010/main" val="2331032350"/>
+      </p:ext>
+    </p:extLst>
+  </p:cSld>
+  <p:clrMapOvr>
+    <a:masterClrMapping/>
+  </p:clrMapOvr>
+</p:notes>
+</file>
+
+<file path=ppt/notesSlides/notesSlide19.xml><?xml version="1.0" encoding="utf-8"?>
+<p:notes xmlns:a="http://schemas.openxmlformats.org/drawingml/2006/main" xmlns:r="http://schemas.openxmlformats.org/officeDocument/2006/relationships" xmlns:p="http://schemas.openxmlformats.org/presentationml/2006/main">
+  <p:cSld>
+    <p:spTree>
+      <p:nvGrpSpPr>
+        <p:cNvPr id="1" name=""/>
+        <p:cNvGrpSpPr/>
+        <p:nvPr/>
+      </p:nvGrpSpPr>
+      <p:grpSpPr>
+        <a:xfrm>
+          <a:off x="0" y="0"/>
+          <a:ext cx="0" cy="0"/>
+          <a:chOff x="0" y="0"/>
+          <a:chExt cx="0" cy="0"/>
+        </a:xfrm>
+      </p:grpSpPr>
+      <p:sp>
+        <p:nvSpPr>
+          <p:cNvPr id="2" name="Folienbildplatzhalter 1"/>
+          <p:cNvSpPr>
+            <a:spLocks noGrp="1" noRot="1" noChangeAspect="1"/>
+          </p:cNvSpPr>
+          <p:nvPr>
+            <p:ph type="sldImg"/>
+          </p:nvPr>
+        </p:nvSpPr>
+        <p:spPr/>
+      </p:sp>
+      <p:sp>
+        <p:nvSpPr>
+          <p:cNvPr id="3" name="Notizenplatzhalter 2"/>
+          <p:cNvSpPr>
+            <a:spLocks noGrp="1"/>
+          </p:cNvSpPr>
+          <p:nvPr>
+            <p:ph type="body" idx="1"/>
+          </p:nvPr>
+        </p:nvSpPr>
+        <p:spPr/>
+        <p:txBody>
+          <a:bodyPr/>
+          <a:lstStyle/>
+          <a:p>
+            <a:r>
+              <a:rPr lang="de-DE" dirty="0"/>
+              <a:t>SIGTERM Gibt dem Programm Möglichkeit zu reagieren und sich selbst Ordnungsgemäß zu stoppen</a:t>
+            </a:r>
+            <a:br>
+              <a:rPr lang="de-DE" dirty="0"/>
+            </a:br>
+            <a:r>
+              <a:rPr lang="de-DE" dirty="0"/>
+              <a:t>SIGKILL würgt den Prozess sofort ab</a:t>
+            </a:r>
+          </a:p>
+        </p:txBody>
+      </p:sp>
+      <p:sp>
+        <p:nvSpPr>
+          <p:cNvPr id="4" name="Foliennummernplatzhalter 3"/>
+          <p:cNvSpPr>
+            <a:spLocks noGrp="1"/>
+          </p:cNvSpPr>
+          <p:nvPr>
+            <p:ph type="sldNum" sz="quarter" idx="5"/>
+          </p:nvPr>
+        </p:nvSpPr>
+        <p:spPr/>
+        <p:txBody>
+          <a:bodyPr/>
+          <a:lstStyle/>
+          <a:p>
+            <a:fld id="{18182567-388C-4D33-8B7B-A651F195F118}" type="slidenum">
+              <a:rPr lang="de-DE" altLang="de-DE" smtClean="0"/>
+              <a:pPr/>
+              <a:t>26</a:t>
+            </a:fld>
+            <a:endParaRPr lang="de-DE" altLang="de-DE"/>
+          </a:p>
+        </p:txBody>
+      </p:sp>
+    </p:spTree>
+    <p:extLst>
+      <p:ext uri="{BB962C8B-B14F-4D97-AF65-F5344CB8AC3E}">
+        <p14:creationId xmlns:p14="http://schemas.microsoft.com/office/powerpoint/2010/main" val="1522668474"/>
       </p:ext>
     </p:extLst>
   </p:cSld>
@@ -1753,7 +2065,62 @@
           <a:bodyPr/>
           <a:lstStyle/>
           <a:p>
-            <a:endParaRPr lang="de-DE" dirty="0"/>
+            <a:r>
+              <a:rPr lang="en-US" dirty="0" err="1"/>
+              <a:t>Vielleicht</a:t>
+            </a:r>
+            <a:r>
+              <a:rPr lang="en-US" dirty="0"/>
+              <a:t> </a:t>
+            </a:r>
+            <a:r>
+              <a:rPr lang="en-US" dirty="0" err="1"/>
+              <a:t>auch</a:t>
+            </a:r>
+            <a:r>
+              <a:rPr lang="en-US" dirty="0"/>
+              <a:t> </a:t>
+            </a:r>
+            <a:r>
+              <a:rPr lang="en-US" dirty="0" err="1"/>
+              <a:t>darauf</a:t>
+            </a:r>
+            <a:r>
+              <a:rPr lang="en-US" dirty="0"/>
+              <a:t> </a:t>
+            </a:r>
+            <a:r>
+              <a:rPr lang="en-US" dirty="0" err="1"/>
+              <a:t>eingehen</a:t>
+            </a:r>
+            <a:r>
+              <a:rPr lang="en-US" dirty="0"/>
+              <a:t> </a:t>
+            </a:r>
+            <a:r>
+              <a:rPr lang="en-US" dirty="0" err="1"/>
+              <a:t>warum</a:t>
+            </a:r>
+            <a:r>
+              <a:rPr lang="en-US" dirty="0"/>
+              <a:t> Docker</a:t>
+            </a:r>
+            <a:r>
+              <a:rPr lang="de-DE" dirty="0"/>
+              <a:t>?</a:t>
+            </a:r>
+          </a:p>
+          <a:p>
+            <a:r>
+              <a:rPr lang="de-DE" dirty="0"/>
+              <a:t>Produktion und Entwicklungsumgebungen zueinander anpassen</a:t>
+            </a:r>
+          </a:p>
+          <a:p>
+            <a:r>
+              <a:rPr lang="de-DE" dirty="0"/>
+              <a:t>Mit Docker aufsetzen funktioniert in jeder Docker Umgebung gleich.</a:t>
+            </a:r>
           </a:p>
         </p:txBody>
       </p:sp>
@@ -1785,6 +2152,807 @@
     <p:extLst>
       <p:ext uri="{BB962C8B-B14F-4D97-AF65-F5344CB8AC3E}">
         <p14:creationId xmlns:p14="http://schemas.microsoft.com/office/powerpoint/2010/main" val="2551778916"/>
+      </p:ext>
+    </p:extLst>
+  </p:cSld>
+  <p:clrMapOvr>
+    <a:masterClrMapping/>
+  </p:clrMapOvr>
+</p:notes>
+</file>
+
+<file path=ppt/notesSlides/notesSlide20.xml><?xml version="1.0" encoding="utf-8"?>
+<p:notes xmlns:a="http://schemas.openxmlformats.org/drawingml/2006/main" xmlns:r="http://schemas.openxmlformats.org/officeDocument/2006/relationships" xmlns:p="http://schemas.openxmlformats.org/presentationml/2006/main">
+  <p:cSld>
+    <p:spTree>
+      <p:nvGrpSpPr>
+        <p:cNvPr id="1" name=""/>
+        <p:cNvGrpSpPr/>
+        <p:nvPr/>
+      </p:nvGrpSpPr>
+      <p:grpSpPr>
+        <a:xfrm>
+          <a:off x="0" y="0"/>
+          <a:ext cx="0" cy="0"/>
+          <a:chOff x="0" y="0"/>
+          <a:chExt cx="0" cy="0"/>
+        </a:xfrm>
+      </p:grpSpPr>
+      <p:sp>
+        <p:nvSpPr>
+          <p:cNvPr id="2" name="Folienbildplatzhalter 1"/>
+          <p:cNvSpPr>
+            <a:spLocks noGrp="1" noRot="1" noChangeAspect="1"/>
+          </p:cNvSpPr>
+          <p:nvPr>
+            <p:ph type="sldImg"/>
+          </p:nvPr>
+        </p:nvSpPr>
+        <p:spPr/>
+      </p:sp>
+      <p:sp>
+        <p:nvSpPr>
+          <p:cNvPr id="3" name="Notizenplatzhalter 2"/>
+          <p:cNvSpPr>
+            <a:spLocks noGrp="1"/>
+          </p:cNvSpPr>
+          <p:nvPr>
+            <p:ph type="body" idx="1"/>
+          </p:nvPr>
+        </p:nvSpPr>
+        <p:spPr/>
+        <p:txBody>
+          <a:bodyPr/>
+          <a:lstStyle/>
+          <a:p>
+            <a:endParaRPr lang="de-DE" dirty="0"/>
+          </a:p>
+        </p:txBody>
+      </p:sp>
+      <p:sp>
+        <p:nvSpPr>
+          <p:cNvPr id="4" name="Foliennummernplatzhalter 3"/>
+          <p:cNvSpPr>
+            <a:spLocks noGrp="1"/>
+          </p:cNvSpPr>
+          <p:nvPr>
+            <p:ph type="sldNum" sz="quarter" idx="5"/>
+          </p:nvPr>
+        </p:nvSpPr>
+        <p:spPr/>
+        <p:txBody>
+          <a:bodyPr/>
+          <a:lstStyle/>
+          <a:p>
+            <a:fld id="{18182567-388C-4D33-8B7B-A651F195F118}" type="slidenum">
+              <a:rPr lang="de-DE" altLang="de-DE" smtClean="0"/>
+              <a:pPr/>
+              <a:t>27</a:t>
+            </a:fld>
+            <a:endParaRPr lang="de-DE" altLang="de-DE"/>
+          </a:p>
+        </p:txBody>
+      </p:sp>
+    </p:spTree>
+    <p:extLst>
+      <p:ext uri="{BB962C8B-B14F-4D97-AF65-F5344CB8AC3E}">
+        <p14:creationId xmlns:p14="http://schemas.microsoft.com/office/powerpoint/2010/main" val="2320076113"/>
+      </p:ext>
+    </p:extLst>
+  </p:cSld>
+  <p:clrMapOvr>
+    <a:masterClrMapping/>
+  </p:clrMapOvr>
+</p:notes>
+</file>
+
+<file path=ppt/notesSlides/notesSlide21.xml><?xml version="1.0" encoding="utf-8"?>
+<p:notes xmlns:a="http://schemas.openxmlformats.org/drawingml/2006/main" xmlns:r="http://schemas.openxmlformats.org/officeDocument/2006/relationships" xmlns:p="http://schemas.openxmlformats.org/presentationml/2006/main">
+  <p:cSld>
+    <p:spTree>
+      <p:nvGrpSpPr>
+        <p:cNvPr id="1" name=""/>
+        <p:cNvGrpSpPr/>
+        <p:nvPr/>
+      </p:nvGrpSpPr>
+      <p:grpSpPr>
+        <a:xfrm>
+          <a:off x="0" y="0"/>
+          <a:ext cx="0" cy="0"/>
+          <a:chOff x="0" y="0"/>
+          <a:chExt cx="0" cy="0"/>
+        </a:xfrm>
+      </p:grpSpPr>
+      <p:sp>
+        <p:nvSpPr>
+          <p:cNvPr id="2" name="Folienbildplatzhalter 1"/>
+          <p:cNvSpPr>
+            <a:spLocks noGrp="1" noRot="1" noChangeAspect="1"/>
+          </p:cNvSpPr>
+          <p:nvPr>
+            <p:ph type="sldImg"/>
+          </p:nvPr>
+        </p:nvSpPr>
+        <p:spPr/>
+      </p:sp>
+      <p:sp>
+        <p:nvSpPr>
+          <p:cNvPr id="3" name="Notizenplatzhalter 2"/>
+          <p:cNvSpPr>
+            <a:spLocks noGrp="1"/>
+          </p:cNvSpPr>
+          <p:nvPr>
+            <p:ph type="body" idx="1"/>
+          </p:nvPr>
+        </p:nvSpPr>
+        <p:spPr/>
+        <p:txBody>
+          <a:bodyPr/>
+          <a:lstStyle/>
+          <a:p>
+            <a:endParaRPr lang="de-DE" dirty="0"/>
+          </a:p>
+        </p:txBody>
+      </p:sp>
+      <p:sp>
+        <p:nvSpPr>
+          <p:cNvPr id="4" name="Foliennummernplatzhalter 3"/>
+          <p:cNvSpPr>
+            <a:spLocks noGrp="1"/>
+          </p:cNvSpPr>
+          <p:nvPr>
+            <p:ph type="sldNum" sz="quarter" idx="5"/>
+          </p:nvPr>
+        </p:nvSpPr>
+        <p:spPr/>
+        <p:txBody>
+          <a:bodyPr/>
+          <a:lstStyle/>
+          <a:p>
+            <a:fld id="{18182567-388C-4D33-8B7B-A651F195F118}" type="slidenum">
+              <a:rPr lang="de-DE" altLang="de-DE" smtClean="0"/>
+              <a:pPr/>
+              <a:t>28</a:t>
+            </a:fld>
+            <a:endParaRPr lang="de-DE" altLang="de-DE"/>
+          </a:p>
+        </p:txBody>
+      </p:sp>
+    </p:spTree>
+    <p:extLst>
+      <p:ext uri="{BB962C8B-B14F-4D97-AF65-F5344CB8AC3E}">
+        <p14:creationId xmlns:p14="http://schemas.microsoft.com/office/powerpoint/2010/main" val="2581772467"/>
+      </p:ext>
+    </p:extLst>
+  </p:cSld>
+  <p:clrMapOvr>
+    <a:masterClrMapping/>
+  </p:clrMapOvr>
+</p:notes>
+</file>
+
+<file path=ppt/notesSlides/notesSlide22.xml><?xml version="1.0" encoding="utf-8"?>
+<p:notes xmlns:a="http://schemas.openxmlformats.org/drawingml/2006/main" xmlns:r="http://schemas.openxmlformats.org/officeDocument/2006/relationships" xmlns:p="http://schemas.openxmlformats.org/presentationml/2006/main">
+  <p:cSld>
+    <p:spTree>
+      <p:nvGrpSpPr>
+        <p:cNvPr id="1" name=""/>
+        <p:cNvGrpSpPr/>
+        <p:nvPr/>
+      </p:nvGrpSpPr>
+      <p:grpSpPr>
+        <a:xfrm>
+          <a:off x="0" y="0"/>
+          <a:ext cx="0" cy="0"/>
+          <a:chOff x="0" y="0"/>
+          <a:chExt cx="0" cy="0"/>
+        </a:xfrm>
+      </p:grpSpPr>
+      <p:sp>
+        <p:nvSpPr>
+          <p:cNvPr id="2" name="Folienbildplatzhalter 1"/>
+          <p:cNvSpPr>
+            <a:spLocks noGrp="1" noRot="1" noChangeAspect="1"/>
+          </p:cNvSpPr>
+          <p:nvPr>
+            <p:ph type="sldImg"/>
+          </p:nvPr>
+        </p:nvSpPr>
+        <p:spPr/>
+      </p:sp>
+      <p:sp>
+        <p:nvSpPr>
+          <p:cNvPr id="3" name="Notizenplatzhalter 2"/>
+          <p:cNvSpPr>
+            <a:spLocks noGrp="1"/>
+          </p:cNvSpPr>
+          <p:nvPr>
+            <p:ph type="body" idx="1"/>
+          </p:nvPr>
+        </p:nvSpPr>
+        <p:spPr/>
+        <p:txBody>
+          <a:bodyPr/>
+          <a:lstStyle/>
+          <a:p>
+            <a:r>
+              <a:rPr lang="de-DE" noProof="0" dirty="0"/>
+              <a:t>Demo:</a:t>
+            </a:r>
+            <a:br>
+              <a:rPr lang="de-DE" noProof="0" dirty="0"/>
+            </a:br>
+            <a:r>
+              <a:rPr lang="de-DE" noProof="0" dirty="0"/>
+              <a:t>Ähnlich zu Übungsaufgabe in der ausgeblendeten Folie</a:t>
+            </a:r>
+            <a:br>
+              <a:rPr lang="de-DE" noProof="0" dirty="0"/>
+            </a:br>
+            <a:br>
+              <a:rPr lang="de-DE" noProof="0" dirty="0"/>
+            </a:br>
+            <a:r>
+              <a:rPr lang="de-DE" noProof="0" dirty="0"/>
+              <a:t>Image erstellen via </a:t>
+            </a:r>
+            <a:r>
+              <a:rPr lang="de-DE" noProof="0" dirty="0" err="1"/>
+              <a:t>Dockerfile</a:t>
+            </a:r>
+            <a:r>
+              <a:rPr lang="de-DE" noProof="0" dirty="0"/>
+              <a:t> im </a:t>
+            </a:r>
+            <a:r>
+              <a:rPr lang="de-DE" noProof="0" dirty="0" err="1"/>
+              <a:t>Example</a:t>
+            </a:r>
+            <a:r>
+              <a:rPr lang="de-DE" noProof="0" dirty="0"/>
+              <a:t> Ordner</a:t>
+            </a:r>
+            <a:br>
+              <a:rPr lang="de-DE" noProof="0" dirty="0"/>
+            </a:br>
+            <a:r>
+              <a:rPr lang="de-DE" noProof="0" dirty="0"/>
+              <a:t>Container aus dem Image starten</a:t>
+            </a:r>
+          </a:p>
+          <a:p>
+            <a:r>
+              <a:rPr lang="de-DE" noProof="0" dirty="0"/>
+              <a:t>Logs und Dateisystem mittels Docker Desktop zeigen. </a:t>
+            </a:r>
+          </a:p>
+        </p:txBody>
+      </p:sp>
+      <p:sp>
+        <p:nvSpPr>
+          <p:cNvPr id="4" name="Foliennummernplatzhalter 3"/>
+          <p:cNvSpPr>
+            <a:spLocks noGrp="1"/>
+          </p:cNvSpPr>
+          <p:nvPr>
+            <p:ph type="sldNum" sz="quarter" idx="5"/>
+          </p:nvPr>
+        </p:nvSpPr>
+        <p:spPr/>
+        <p:txBody>
+          <a:bodyPr/>
+          <a:lstStyle/>
+          <a:p>
+            <a:fld id="{18182567-388C-4D33-8B7B-A651F195F118}" type="slidenum">
+              <a:rPr lang="de-DE" altLang="de-DE" smtClean="0"/>
+              <a:pPr/>
+              <a:t>29</a:t>
+            </a:fld>
+            <a:endParaRPr lang="de-DE" altLang="de-DE"/>
+          </a:p>
+        </p:txBody>
+      </p:sp>
+    </p:spTree>
+    <p:extLst>
+      <p:ext uri="{BB962C8B-B14F-4D97-AF65-F5344CB8AC3E}">
+        <p14:creationId xmlns:p14="http://schemas.microsoft.com/office/powerpoint/2010/main" val="2778018805"/>
+      </p:ext>
+    </p:extLst>
+  </p:cSld>
+  <p:clrMapOvr>
+    <a:masterClrMapping/>
+  </p:clrMapOvr>
+</p:notes>
+</file>
+
+<file path=ppt/notesSlides/notesSlide23.xml><?xml version="1.0" encoding="utf-8"?>
+<p:notes xmlns:a="http://schemas.openxmlformats.org/drawingml/2006/main" xmlns:r="http://schemas.openxmlformats.org/officeDocument/2006/relationships" xmlns:p="http://schemas.openxmlformats.org/presentationml/2006/main">
+  <p:cSld>
+    <p:spTree>
+      <p:nvGrpSpPr>
+        <p:cNvPr id="1" name=""/>
+        <p:cNvGrpSpPr/>
+        <p:nvPr/>
+      </p:nvGrpSpPr>
+      <p:grpSpPr>
+        <a:xfrm>
+          <a:off x="0" y="0"/>
+          <a:ext cx="0" cy="0"/>
+          <a:chOff x="0" y="0"/>
+          <a:chExt cx="0" cy="0"/>
+        </a:xfrm>
+      </p:grpSpPr>
+      <p:sp>
+        <p:nvSpPr>
+          <p:cNvPr id="2" name="Folienbildplatzhalter 1"/>
+          <p:cNvSpPr>
+            <a:spLocks noGrp="1" noRot="1" noChangeAspect="1"/>
+          </p:cNvSpPr>
+          <p:nvPr>
+            <p:ph type="sldImg"/>
+          </p:nvPr>
+        </p:nvSpPr>
+        <p:spPr/>
+      </p:sp>
+      <p:sp>
+        <p:nvSpPr>
+          <p:cNvPr id="3" name="Notizenplatzhalter 2"/>
+          <p:cNvSpPr>
+            <a:spLocks noGrp="1"/>
+          </p:cNvSpPr>
+          <p:nvPr>
+            <p:ph type="body" idx="1"/>
+          </p:nvPr>
+        </p:nvSpPr>
+        <p:spPr/>
+        <p:txBody>
+          <a:bodyPr/>
+          <a:lstStyle/>
+          <a:p>
+            <a:r>
+              <a:rPr lang="de-DE" dirty="0" err="1"/>
+              <a:t>Volumes</a:t>
+            </a:r>
+            <a:r>
+              <a:rPr lang="de-DE" dirty="0"/>
+              <a:t> sind nötig, um daten zwischen mehreren Containern des gleichen Images zu verwalten</a:t>
+            </a:r>
+          </a:p>
+          <a:p>
+            <a:r>
+              <a:rPr lang="de-DE" dirty="0"/>
+              <a:t>Werden ins Dateisystem direkt eingebunden</a:t>
+            </a:r>
+          </a:p>
+          <a:p>
+            <a:r>
+              <a:rPr lang="de-DE" dirty="0"/>
+              <a:t>In </a:t>
+            </a:r>
+            <a:r>
+              <a:rPr lang="de-DE" dirty="0" err="1"/>
+              <a:t>Dockerfile</a:t>
+            </a:r>
+            <a:r>
+              <a:rPr lang="de-DE" dirty="0"/>
+              <a:t> </a:t>
+            </a:r>
+            <a:r>
+              <a:rPr lang="de-DE" dirty="0" err="1"/>
+              <a:t>defininiert</a:t>
+            </a:r>
+            <a:endParaRPr lang="de-DE" dirty="0"/>
+          </a:p>
+        </p:txBody>
+      </p:sp>
+      <p:sp>
+        <p:nvSpPr>
+          <p:cNvPr id="4" name="Foliennummernplatzhalter 3"/>
+          <p:cNvSpPr>
+            <a:spLocks noGrp="1"/>
+          </p:cNvSpPr>
+          <p:nvPr>
+            <p:ph type="sldNum" sz="quarter" idx="5"/>
+          </p:nvPr>
+        </p:nvSpPr>
+        <p:spPr/>
+        <p:txBody>
+          <a:bodyPr/>
+          <a:lstStyle/>
+          <a:p>
+            <a:fld id="{18182567-388C-4D33-8B7B-A651F195F118}" type="slidenum">
+              <a:rPr lang="de-DE" altLang="de-DE" smtClean="0"/>
+              <a:pPr/>
+              <a:t>31</a:t>
+            </a:fld>
+            <a:endParaRPr lang="de-DE" altLang="de-DE"/>
+          </a:p>
+        </p:txBody>
+      </p:sp>
+    </p:spTree>
+    <p:extLst>
+      <p:ext uri="{BB962C8B-B14F-4D97-AF65-F5344CB8AC3E}">
+        <p14:creationId xmlns:p14="http://schemas.microsoft.com/office/powerpoint/2010/main" val="2163034506"/>
+      </p:ext>
+    </p:extLst>
+  </p:cSld>
+  <p:clrMapOvr>
+    <a:masterClrMapping/>
+  </p:clrMapOvr>
+</p:notes>
+</file>
+
+<file path=ppt/notesSlides/notesSlide24.xml><?xml version="1.0" encoding="utf-8"?>
+<p:notes xmlns:a="http://schemas.openxmlformats.org/drawingml/2006/main" xmlns:r="http://schemas.openxmlformats.org/officeDocument/2006/relationships" xmlns:p="http://schemas.openxmlformats.org/presentationml/2006/main">
+  <p:cSld>
+    <p:spTree>
+      <p:nvGrpSpPr>
+        <p:cNvPr id="1" name=""/>
+        <p:cNvGrpSpPr/>
+        <p:nvPr/>
+      </p:nvGrpSpPr>
+      <p:grpSpPr>
+        <a:xfrm>
+          <a:off x="0" y="0"/>
+          <a:ext cx="0" cy="0"/>
+          <a:chOff x="0" y="0"/>
+          <a:chExt cx="0" cy="0"/>
+        </a:xfrm>
+      </p:grpSpPr>
+      <p:sp>
+        <p:nvSpPr>
+          <p:cNvPr id="2" name="Folienbildplatzhalter 1"/>
+          <p:cNvSpPr>
+            <a:spLocks noGrp="1" noRot="1" noChangeAspect="1"/>
+          </p:cNvSpPr>
+          <p:nvPr>
+            <p:ph type="sldImg"/>
+          </p:nvPr>
+        </p:nvSpPr>
+        <p:spPr/>
+      </p:sp>
+      <p:sp>
+        <p:nvSpPr>
+          <p:cNvPr id="3" name="Notizenplatzhalter 2"/>
+          <p:cNvSpPr>
+            <a:spLocks noGrp="1"/>
+          </p:cNvSpPr>
+          <p:nvPr>
+            <p:ph type="body" idx="1"/>
+          </p:nvPr>
+        </p:nvSpPr>
+        <p:spPr/>
+        <p:txBody>
+          <a:bodyPr/>
+          <a:lstStyle/>
+          <a:p>
+            <a:r>
+              <a:rPr lang="de-DE" dirty="0"/>
+              <a:t>Kann in einer Datei mehrere Container, Netzwerke, </a:t>
+            </a:r>
+            <a:r>
+              <a:rPr lang="de-DE" dirty="0" err="1"/>
+              <a:t>Volumes</a:t>
+            </a:r>
+            <a:r>
+              <a:rPr lang="de-DE" dirty="0"/>
+              <a:t> definieren</a:t>
+            </a:r>
+            <a:br>
+              <a:rPr lang="de-DE" dirty="0"/>
+            </a:br>
+            <a:r>
+              <a:rPr lang="de-DE" dirty="0"/>
+              <a:t>Definiert wie diese interagieren</a:t>
+            </a:r>
+            <a:br>
+              <a:rPr lang="de-DE" dirty="0"/>
+            </a:br>
+            <a:r>
+              <a:rPr lang="de-DE" dirty="0"/>
+              <a:t>Docker </a:t>
+            </a:r>
+            <a:r>
+              <a:rPr lang="de-DE" dirty="0" err="1"/>
+              <a:t>Compose</a:t>
+            </a:r>
+            <a:r>
+              <a:rPr lang="de-DE" dirty="0"/>
+              <a:t> sehr nützlich, um mit Docker zu deployen oder komplexere Apps lokal zu testen.</a:t>
+            </a:r>
+          </a:p>
+          <a:p>
+            <a:endParaRPr lang="de-DE" dirty="0"/>
+          </a:p>
+        </p:txBody>
+      </p:sp>
+      <p:sp>
+        <p:nvSpPr>
+          <p:cNvPr id="4" name="Foliennummernplatzhalter 3"/>
+          <p:cNvSpPr>
+            <a:spLocks noGrp="1"/>
+          </p:cNvSpPr>
+          <p:nvPr>
+            <p:ph type="sldNum" sz="quarter" idx="5"/>
+          </p:nvPr>
+        </p:nvSpPr>
+        <p:spPr/>
+        <p:txBody>
+          <a:bodyPr/>
+          <a:lstStyle/>
+          <a:p>
+            <a:fld id="{18182567-388C-4D33-8B7B-A651F195F118}" type="slidenum">
+              <a:rPr lang="de-DE" altLang="de-DE" smtClean="0"/>
+              <a:pPr/>
+              <a:t>32</a:t>
+            </a:fld>
+            <a:endParaRPr lang="de-DE" altLang="de-DE"/>
+          </a:p>
+        </p:txBody>
+      </p:sp>
+    </p:spTree>
+    <p:extLst>
+      <p:ext uri="{BB962C8B-B14F-4D97-AF65-F5344CB8AC3E}">
+        <p14:creationId xmlns:p14="http://schemas.microsoft.com/office/powerpoint/2010/main" val="4151787575"/>
+      </p:ext>
+    </p:extLst>
+  </p:cSld>
+  <p:clrMapOvr>
+    <a:masterClrMapping/>
+  </p:clrMapOvr>
+</p:notes>
+</file>
+
+<file path=ppt/notesSlides/notesSlide25.xml><?xml version="1.0" encoding="utf-8"?>
+<p:notes xmlns:a="http://schemas.openxmlformats.org/drawingml/2006/main" xmlns:r="http://schemas.openxmlformats.org/officeDocument/2006/relationships" xmlns:p="http://schemas.openxmlformats.org/presentationml/2006/main">
+  <p:cSld>
+    <p:spTree>
+      <p:nvGrpSpPr>
+        <p:cNvPr id="1" name=""/>
+        <p:cNvGrpSpPr/>
+        <p:nvPr/>
+      </p:nvGrpSpPr>
+      <p:grpSpPr>
+        <a:xfrm>
+          <a:off x="0" y="0"/>
+          <a:ext cx="0" cy="0"/>
+          <a:chOff x="0" y="0"/>
+          <a:chExt cx="0" cy="0"/>
+        </a:xfrm>
+      </p:grpSpPr>
+      <p:sp>
+        <p:nvSpPr>
+          <p:cNvPr id="2" name="Folienbildplatzhalter 1"/>
+          <p:cNvSpPr>
+            <a:spLocks noGrp="1" noRot="1" noChangeAspect="1"/>
+          </p:cNvSpPr>
+          <p:nvPr>
+            <p:ph type="sldImg"/>
+          </p:nvPr>
+        </p:nvSpPr>
+        <p:spPr/>
+      </p:sp>
+      <p:sp>
+        <p:nvSpPr>
+          <p:cNvPr id="3" name="Notizenplatzhalter 2"/>
+          <p:cNvSpPr>
+            <a:spLocks noGrp="1"/>
+          </p:cNvSpPr>
+          <p:nvPr>
+            <p:ph type="body" idx="1"/>
+          </p:nvPr>
+        </p:nvSpPr>
+        <p:spPr/>
+        <p:txBody>
+          <a:bodyPr/>
+          <a:lstStyle/>
+          <a:p>
+            <a:r>
+              <a:rPr lang="de-DE" dirty="0"/>
+              <a:t>Für jeden </a:t>
+            </a:r>
+            <a:r>
+              <a:rPr lang="de-DE" dirty="0" err="1"/>
+              <a:t>Step</a:t>
+            </a:r>
+            <a:r>
+              <a:rPr lang="de-DE" dirty="0"/>
+              <a:t> ein Container</a:t>
+            </a:r>
+          </a:p>
+          <a:p>
+            <a:r>
+              <a:rPr lang="de-DE" dirty="0"/>
+              <a:t>Befehle werden sicher im Container ausgeführt</a:t>
+            </a:r>
+            <a:br>
+              <a:rPr lang="de-DE" dirty="0"/>
+            </a:br>
+            <a:r>
+              <a:rPr lang="de-DE" dirty="0"/>
+              <a:t>Verschiedene </a:t>
+            </a:r>
+            <a:r>
+              <a:rPr lang="de-DE" dirty="0" err="1"/>
+              <a:t>Steps</a:t>
+            </a:r>
+            <a:r>
+              <a:rPr lang="de-DE" dirty="0"/>
+              <a:t> können unterschiedliche Container verwenden z.B. </a:t>
+            </a:r>
+            <a:r>
+              <a:rPr lang="de-DE" dirty="0" err="1"/>
+              <a:t>npm</a:t>
+            </a:r>
+            <a:r>
+              <a:rPr lang="de-DE" dirty="0"/>
+              <a:t> </a:t>
+            </a:r>
+            <a:r>
+              <a:rPr lang="de-DE" dirty="0" err="1"/>
+              <a:t>build</a:t>
+            </a:r>
+            <a:r>
+              <a:rPr lang="de-DE" dirty="0"/>
+              <a:t>, </a:t>
+            </a:r>
+            <a:r>
+              <a:rPr lang="de-DE" dirty="0" err="1"/>
+              <a:t>java</a:t>
+            </a:r>
+            <a:r>
+              <a:rPr lang="de-DE" dirty="0"/>
+              <a:t> </a:t>
+            </a:r>
+            <a:r>
+              <a:rPr lang="de-DE" dirty="0" err="1"/>
+              <a:t>build</a:t>
+            </a:r>
+            <a:br>
+              <a:rPr lang="de-DE" dirty="0"/>
+            </a:br>
+            <a:r>
+              <a:rPr lang="de-DE" dirty="0"/>
+              <a:t>Container wird nach Export der Artefakte gelöscht</a:t>
+            </a:r>
+          </a:p>
+          <a:p>
+            <a:r>
+              <a:rPr lang="de-DE" dirty="0"/>
+              <a:t>Dateien können in </a:t>
+            </a:r>
+            <a:r>
+              <a:rPr lang="de-DE" dirty="0" err="1"/>
+              <a:t>Volumes</a:t>
+            </a:r>
+            <a:r>
+              <a:rPr lang="de-DE" dirty="0"/>
+              <a:t> </a:t>
+            </a:r>
+            <a:r>
+              <a:rPr lang="de-DE" dirty="0" err="1"/>
+              <a:t>gecached</a:t>
+            </a:r>
+            <a:r>
+              <a:rPr lang="de-DE" dirty="0"/>
+              <a:t> werden</a:t>
+            </a:r>
+          </a:p>
+        </p:txBody>
+      </p:sp>
+      <p:sp>
+        <p:nvSpPr>
+          <p:cNvPr id="4" name="Foliennummernplatzhalter 3"/>
+          <p:cNvSpPr>
+            <a:spLocks noGrp="1"/>
+          </p:cNvSpPr>
+          <p:nvPr>
+            <p:ph type="sldNum" sz="quarter" idx="5"/>
+          </p:nvPr>
+        </p:nvSpPr>
+        <p:spPr/>
+        <p:txBody>
+          <a:bodyPr/>
+          <a:lstStyle/>
+          <a:p>
+            <a:fld id="{18182567-388C-4D33-8B7B-A651F195F118}" type="slidenum">
+              <a:rPr lang="de-DE" altLang="de-DE" smtClean="0"/>
+              <a:pPr/>
+              <a:t>33</a:t>
+            </a:fld>
+            <a:endParaRPr lang="de-DE" altLang="de-DE"/>
+          </a:p>
+        </p:txBody>
+      </p:sp>
+    </p:spTree>
+    <p:extLst>
+      <p:ext uri="{BB962C8B-B14F-4D97-AF65-F5344CB8AC3E}">
+        <p14:creationId xmlns:p14="http://schemas.microsoft.com/office/powerpoint/2010/main" val="3258914236"/>
+      </p:ext>
+    </p:extLst>
+  </p:cSld>
+  <p:clrMapOvr>
+    <a:masterClrMapping/>
+  </p:clrMapOvr>
+</p:notes>
+</file>
+
+<file path=ppt/notesSlides/notesSlide26.xml><?xml version="1.0" encoding="utf-8"?>
+<p:notes xmlns:a="http://schemas.openxmlformats.org/drawingml/2006/main" xmlns:r="http://schemas.openxmlformats.org/officeDocument/2006/relationships" xmlns:p="http://schemas.openxmlformats.org/presentationml/2006/main">
+  <p:cSld>
+    <p:spTree>
+      <p:nvGrpSpPr>
+        <p:cNvPr id="1" name=""/>
+        <p:cNvGrpSpPr/>
+        <p:nvPr/>
+      </p:nvGrpSpPr>
+      <p:grpSpPr>
+        <a:xfrm>
+          <a:off x="0" y="0"/>
+          <a:ext cx="0" cy="0"/>
+          <a:chOff x="0" y="0"/>
+          <a:chExt cx="0" cy="0"/>
+        </a:xfrm>
+      </p:grpSpPr>
+      <p:sp>
+        <p:nvSpPr>
+          <p:cNvPr id="2" name="Folienbildplatzhalter 1"/>
+          <p:cNvSpPr>
+            <a:spLocks noGrp="1" noRot="1" noChangeAspect="1"/>
+          </p:cNvSpPr>
+          <p:nvPr>
+            <p:ph type="sldImg"/>
+          </p:nvPr>
+        </p:nvSpPr>
+        <p:spPr/>
+      </p:sp>
+      <p:sp>
+        <p:nvSpPr>
+          <p:cNvPr id="3" name="Notizenplatzhalter 2"/>
+          <p:cNvSpPr>
+            <a:spLocks noGrp="1"/>
+          </p:cNvSpPr>
+          <p:nvPr>
+            <p:ph type="body" idx="1"/>
+          </p:nvPr>
+        </p:nvSpPr>
+        <p:spPr/>
+        <p:txBody>
+          <a:bodyPr/>
+          <a:lstStyle/>
+          <a:p>
+            <a:endParaRPr lang="de-DE" dirty="0"/>
+          </a:p>
+        </p:txBody>
+      </p:sp>
+      <p:sp>
+        <p:nvSpPr>
+          <p:cNvPr id="4" name="Foliennummernplatzhalter 3"/>
+          <p:cNvSpPr>
+            <a:spLocks noGrp="1"/>
+          </p:cNvSpPr>
+          <p:nvPr>
+            <p:ph type="sldNum" sz="quarter" idx="5"/>
+          </p:nvPr>
+        </p:nvSpPr>
+        <p:spPr/>
+        <p:txBody>
+          <a:bodyPr/>
+          <a:lstStyle/>
+          <a:p>
+            <a:fld id="{18182567-388C-4D33-8B7B-A651F195F118}" type="slidenum">
+              <a:rPr lang="de-DE" altLang="de-DE" smtClean="0"/>
+              <a:pPr/>
+              <a:t>34</a:t>
+            </a:fld>
+            <a:endParaRPr lang="de-DE" altLang="de-DE"/>
+          </a:p>
+        </p:txBody>
+      </p:sp>
+    </p:spTree>
+    <p:extLst>
+      <p:ext uri="{BB962C8B-B14F-4D97-AF65-F5344CB8AC3E}">
+        <p14:creationId xmlns:p14="http://schemas.microsoft.com/office/powerpoint/2010/main" val="3444108237"/>
       </p:ext>
     </p:extLst>
   </p:cSld>
@@ -1839,20 +3007,8 @@
           <a:lstStyle/>
           <a:p>
             <a:r>
-              <a:rPr lang="de-DE" dirty="0" err="1"/>
-              <a:t>Daemon</a:t>
-            </a:r>
-            <a:r>
-              <a:rPr lang="de-DE" dirty="0"/>
-              <a:t> </a:t>
-            </a:r>
-            <a:r>
-              <a:rPr lang="de-DE" dirty="0" err="1"/>
-              <a:t>is</a:t>
-            </a:r>
-            <a:r>
-              <a:rPr lang="de-DE" dirty="0"/>
-              <a:t> ein Hintergrund Prozess der meist nicht direkt mit dem User interagiert. Oft endet der Name mit D</a:t>
+              <a:rPr lang="de-DE" dirty="0"/>
+              <a:t>Grundaufbau der Software, wird näher darauf eingegangen</a:t>
             </a:r>
           </a:p>
         </p:txBody>
@@ -1875,7 +3031,7 @@
             <a:fld id="{18182567-388C-4D33-8B7B-A651F195F118}" type="slidenum">
               <a:rPr lang="de-DE" altLang="de-DE" smtClean="0"/>
               <a:pPr/>
-              <a:t>5</a:t>
+              <a:t>4</a:t>
             </a:fld>
             <a:endParaRPr lang="de-DE" altLang="de-DE"/>
           </a:p>
@@ -1884,7 +3040,7 @@
     </p:spTree>
     <p:extLst>
       <p:ext uri="{BB962C8B-B14F-4D97-AF65-F5344CB8AC3E}">
-        <p14:creationId xmlns:p14="http://schemas.microsoft.com/office/powerpoint/2010/main" val="3458115759"/>
+        <p14:creationId xmlns:p14="http://schemas.microsoft.com/office/powerpoint/2010/main" val="1460172336"/>
       </p:ext>
     </p:extLst>
   </p:cSld>
@@ -1939,22 +3095,30 @@
           <a:lstStyle/>
           <a:p>
             <a:r>
-              <a:rPr lang="de-DE" dirty="0"/>
-              <a:t>Images, Container und </a:t>
-            </a:r>
-            <a:r>
               <a:rPr lang="de-DE" dirty="0" err="1"/>
-              <a:t>Registries</a:t>
-            </a:r>
-            <a:r>
-              <a:rPr lang="de-DE" dirty="0"/>
-              <a:t> sind die Wichtigsten Komponenten</a:t>
-            </a:r>
-          </a:p>
-          <a:p>
-            <a:r>
-              <a:rPr lang="de-DE" dirty="0"/>
-              <a:t>Sie werden auf den nächsten Folien beschrieben</a:t>
+              <a:t>Daemon</a:t>
+            </a:r>
+            <a:r>
+              <a:rPr lang="de-DE" dirty="0"/>
+              <a:t> </a:t>
+            </a:r>
+            <a:r>
+              <a:rPr lang="de-DE" dirty="0" err="1"/>
+              <a:t>is</a:t>
+            </a:r>
+            <a:r>
+              <a:rPr lang="de-DE" dirty="0"/>
+              <a:t> ein Hintergrund Prozess der meist nicht direkt mit dem User interagiert. Oft endet der Name mit D</a:t>
+            </a:r>
+            <a:br>
+              <a:rPr lang="de-DE" dirty="0"/>
+            </a:br>
+            <a:br>
+              <a:rPr lang="de-DE" dirty="0"/>
+            </a:br>
+            <a:r>
+              <a:rPr lang="de-DE" dirty="0"/>
+              <a:t>Docker Host kann auf der gleichen Maschine laufen wie der Client, muss aber nicht.</a:t>
             </a:r>
           </a:p>
         </p:txBody>
@@ -1977,7 +3141,7 @@
             <a:fld id="{18182567-388C-4D33-8B7B-A651F195F118}" type="slidenum">
               <a:rPr lang="de-DE" altLang="de-DE" smtClean="0"/>
               <a:pPr/>
-              <a:t>8</a:t>
+              <a:t>5</a:t>
             </a:fld>
             <a:endParaRPr lang="de-DE" altLang="de-DE"/>
           </a:p>
@@ -1986,7 +3150,7 @@
     </p:spTree>
     <p:extLst>
       <p:ext uri="{BB962C8B-B14F-4D97-AF65-F5344CB8AC3E}">
-        <p14:creationId xmlns:p14="http://schemas.microsoft.com/office/powerpoint/2010/main" val="2307410376"/>
+        <p14:creationId xmlns:p14="http://schemas.microsoft.com/office/powerpoint/2010/main" val="3458115759"/>
       </p:ext>
     </p:extLst>
   </p:cSld>
@@ -2040,26 +3204,35 @@
           <a:bodyPr/>
           <a:lstStyle/>
           <a:p>
-            <a:pPr marL="0" marR="0" lvl="0" indent="0" algn="l" defTabSz="762000" rtl="0" eaLnBrk="0" fontAlgn="base" latinLnBrk="0" hangingPunct="0">
-              <a:lnSpc>
-                <a:spcPct val="100000"/>
-              </a:lnSpc>
-              <a:spcBef>
-                <a:spcPct val="30000"/>
-              </a:spcBef>
-              <a:spcAft>
-                <a:spcPct val="0"/>
-              </a:spcAft>
-              <a:buClrTx/>
-              <a:buSzTx/>
-              <a:buFontTx/>
-              <a:buNone/>
-              <a:tabLst/>
-              <a:defRPr/>
-            </a:pPr>
-            <a:r>
-              <a:rPr lang="de-DE" dirty="0"/>
-              <a:t>Bild ist Urheberrechtsfrei von unsplash.com</a:t>
+            <a:r>
+              <a:rPr lang="de-DE" dirty="0"/>
+              <a:t>Auf Docker </a:t>
+            </a:r>
+            <a:r>
+              <a:rPr lang="de-DE" dirty="0" err="1"/>
+              <a:t>Compose</a:t>
+            </a:r>
+            <a:r>
+              <a:rPr lang="de-DE" dirty="0"/>
+              <a:t> wird später näher eingegangen</a:t>
+            </a:r>
+          </a:p>
+          <a:p>
+            <a:r>
+              <a:rPr lang="de-DE" dirty="0" err="1"/>
+              <a:t>Kommunizierung</a:t>
+            </a:r>
+            <a:r>
+              <a:rPr lang="de-DE" dirty="0"/>
+              <a:t> mittels REST, UNIX </a:t>
+            </a:r>
+            <a:r>
+              <a:rPr lang="de-DE" dirty="0" err="1"/>
+              <a:t>sockets</a:t>
+            </a:r>
+            <a:r>
+              <a:rPr lang="de-DE" dirty="0"/>
+              <a:t> oder ein Netzwerkinterface</a:t>
             </a:r>
           </a:p>
           <a:p>
@@ -2085,7 +3258,7 @@
             <a:fld id="{18182567-388C-4D33-8B7B-A651F195F118}" type="slidenum">
               <a:rPr lang="de-DE" altLang="de-DE" smtClean="0"/>
               <a:pPr/>
-              <a:t>9</a:t>
+              <a:t>6</a:t>
             </a:fld>
             <a:endParaRPr lang="de-DE" altLang="de-DE"/>
           </a:p>
@@ -2094,7 +3267,7 @@
     </p:spTree>
     <p:extLst>
       <p:ext uri="{BB962C8B-B14F-4D97-AF65-F5344CB8AC3E}">
-        <p14:creationId xmlns:p14="http://schemas.microsoft.com/office/powerpoint/2010/main" val="617615319"/>
+        <p14:creationId xmlns:p14="http://schemas.microsoft.com/office/powerpoint/2010/main" val="3867474915"/>
       </p:ext>
     </p:extLst>
   </p:cSld>
@@ -2150,7 +3323,18 @@
           <a:p>
             <a:r>
               <a:rPr lang="de-DE" dirty="0"/>
-              <a:t>Bild ist Urheberrechtsfrei von unsplash.com</a:t>
+              <a:t>Nützlich zum Debuggen, Testen und Visualisieren. Gleiche Funktionalität wie die </a:t>
+            </a:r>
+            <a:r>
+              <a:rPr lang="de-DE" dirty="0" err="1"/>
+              <a:t>Consolensoftware</a:t>
+            </a:r>
+            <a:endParaRPr lang="de-DE" dirty="0"/>
+          </a:p>
+          <a:p>
+            <a:r>
+              <a:rPr lang="de-DE" dirty="0"/>
+              <a:t>Enthält alles, was für die lokale Entwicklung nötig ist</a:t>
             </a:r>
           </a:p>
         </p:txBody>
@@ -2173,7 +3357,7 @@
             <a:fld id="{18182567-388C-4D33-8B7B-A651F195F118}" type="slidenum">
               <a:rPr lang="de-DE" altLang="de-DE" smtClean="0"/>
               <a:pPr/>
-              <a:t>10</a:t>
+              <a:t>7</a:t>
             </a:fld>
             <a:endParaRPr lang="de-DE" altLang="de-DE"/>
           </a:p>
@@ -2182,7 +3366,7 @@
     </p:spTree>
     <p:extLst>
       <p:ext uri="{BB962C8B-B14F-4D97-AF65-F5344CB8AC3E}">
-        <p14:creationId xmlns:p14="http://schemas.microsoft.com/office/powerpoint/2010/main" val="4275414675"/>
+        <p14:creationId xmlns:p14="http://schemas.microsoft.com/office/powerpoint/2010/main" val="2782956507"/>
       </p:ext>
     </p:extLst>
   </p:cSld>
@@ -2238,7 +3422,21 @@
           <a:p>
             <a:r>
               <a:rPr lang="de-DE" dirty="0"/>
-              <a:t>Bild generiert mit deepai.org</a:t>
+              <a:t>Images, Container und </a:t>
+            </a:r>
+            <a:r>
+              <a:rPr lang="de-DE" dirty="0" err="1"/>
+              <a:t>Registries</a:t>
+            </a:r>
+            <a:r>
+              <a:rPr lang="de-DE" dirty="0"/>
+              <a:t> sind die Wichtigsten Komponenten</a:t>
+            </a:r>
+          </a:p>
+          <a:p>
+            <a:r>
+              <a:rPr lang="de-DE" dirty="0"/>
+              <a:t>Sie werden auf den nächsten Folien beschrieben</a:t>
             </a:r>
           </a:p>
         </p:txBody>
@@ -2261,7 +3459,7 @@
             <a:fld id="{18182567-388C-4D33-8B7B-A651F195F118}" type="slidenum">
               <a:rPr lang="de-DE" altLang="de-DE" smtClean="0"/>
               <a:pPr/>
-              <a:t>12</a:t>
+              <a:t>8</a:t>
             </a:fld>
             <a:endParaRPr lang="de-DE" altLang="de-DE"/>
           </a:p>
@@ -2270,7 +3468,7 @@
     </p:spTree>
     <p:extLst>
       <p:ext uri="{BB962C8B-B14F-4D97-AF65-F5344CB8AC3E}">
-        <p14:creationId xmlns:p14="http://schemas.microsoft.com/office/powerpoint/2010/main" val="2645555206"/>
+        <p14:creationId xmlns:p14="http://schemas.microsoft.com/office/powerpoint/2010/main" val="2307410376"/>
       </p:ext>
     </p:extLst>
   </p:cSld>
@@ -2324,10 +3522,76 @@
           <a:bodyPr/>
           <a:lstStyle/>
           <a:p>
-            <a:r>
-              <a:rPr lang="de-DE" dirty="0"/>
-              <a:t>Für das Demo Projekt nicht notwendig, aber wird oft gebraucht.</a:t>
-            </a:r>
+            <a:pPr marL="0" marR="0" lvl="0" indent="0" algn="l" defTabSz="762000" rtl="0" eaLnBrk="0" fontAlgn="base" latinLnBrk="0" hangingPunct="0">
+              <a:lnSpc>
+                <a:spcPct val="100000"/>
+              </a:lnSpc>
+              <a:spcBef>
+                <a:spcPct val="30000"/>
+              </a:spcBef>
+              <a:spcAft>
+                <a:spcPct val="0"/>
+              </a:spcAft>
+              <a:buClrTx/>
+              <a:buSzTx/>
+              <a:buFontTx/>
+              <a:buNone/>
+              <a:tabLst/>
+              <a:defRPr/>
+            </a:pPr>
+            <a:r>
+              <a:rPr lang="de-DE" dirty="0"/>
+              <a:t>Bild ist Urheberrechtsfrei von unsplash.com</a:t>
+            </a:r>
+          </a:p>
+          <a:p>
+            <a:endParaRPr lang="de-DE" dirty="0"/>
+          </a:p>
+          <a:p>
+            <a:r>
+              <a:rPr lang="de-DE" dirty="0"/>
+              <a:t>Daten innerhalb eines Containers werden mit dem Container gelöscht</a:t>
+            </a:r>
+            <a:br>
+              <a:rPr lang="de-DE" dirty="0"/>
+            </a:br>
+            <a:r>
+              <a:rPr lang="de-DE" dirty="0"/>
+              <a:t>Container mehrere 100MB</a:t>
+            </a:r>
+            <a:br>
+              <a:rPr lang="de-DE" dirty="0"/>
+            </a:br>
+            <a:r>
+              <a:rPr lang="de-DE" dirty="0"/>
+              <a:t>Starten meistens innerhalb einiger Sekunden</a:t>
+            </a:r>
+            <a:br>
+              <a:rPr lang="de-DE" dirty="0"/>
+            </a:br>
+            <a:r>
+              <a:rPr lang="de-DE" dirty="0"/>
+              <a:t>Gut um schnell mehr Kapazität zu starten wenn man  schnell skalieren muss</a:t>
+            </a:r>
+            <a:br>
+              <a:rPr lang="de-DE" dirty="0"/>
+            </a:br>
+            <a:r>
+              <a:rPr lang="de-DE" dirty="0"/>
+              <a:t>Container können in einem Netzwerk deutlich einfacher miteinander kommunizieren als VMs</a:t>
+            </a:r>
+            <a:br>
+              <a:rPr lang="de-DE" dirty="0"/>
+            </a:br>
+            <a:r>
+              <a:rPr lang="de-DE" dirty="0"/>
+              <a:t>Brauchen etwas weniger </a:t>
+            </a:r>
+            <a:r>
+              <a:rPr lang="de-DE" dirty="0" err="1"/>
+              <a:t>resourcen</a:t>
+            </a:r>
+            <a:endParaRPr lang="de-DE" dirty="0"/>
           </a:p>
         </p:txBody>
       </p:sp>
@@ -2349,7 +3613,7 @@
             <a:fld id="{18182567-388C-4D33-8B7B-A651F195F118}" type="slidenum">
               <a:rPr lang="de-DE" altLang="de-DE" smtClean="0"/>
               <a:pPr/>
-              <a:t>20</a:t>
+              <a:t>9</a:t>
             </a:fld>
             <a:endParaRPr lang="de-DE" altLang="de-DE"/>
           </a:p>
@@ -2358,7 +3622,7 @@
     </p:spTree>
     <p:extLst>
       <p:ext uri="{BB962C8B-B14F-4D97-AF65-F5344CB8AC3E}">
-        <p14:creationId xmlns:p14="http://schemas.microsoft.com/office/powerpoint/2010/main" val="3033990164"/>
+        <p14:creationId xmlns:p14="http://schemas.microsoft.com/office/powerpoint/2010/main" val="617615319"/>
       </p:ext>
     </p:extLst>
   </p:cSld>
@@ -2412,6 +3676,23 @@
           <a:bodyPr/>
           <a:lstStyle/>
           <a:p>
+            <a:r>
+              <a:rPr lang="de-DE" dirty="0"/>
+              <a:t>Bild ist Urheberrechtsfrei von unsplash.com</a:t>
+            </a:r>
+            <a:br>
+              <a:rPr lang="de-DE" dirty="0"/>
+            </a:br>
+            <a:br>
+              <a:rPr lang="de-DE" dirty="0"/>
+            </a:br>
+            <a:r>
+              <a:rPr lang="de-DE" dirty="0"/>
+              <a:t>Ähnlich zu einem VM-Image aber deutlich kleiner. Meist sehr minimalistisch, es ist wirklich nur das installiert was gebraucht wird.</a:t>
+            </a:r>
+            <a:br>
+              <a:rPr lang="de-DE" dirty="0"/>
+            </a:br>
             <a:endParaRPr lang="de-DE" dirty="0"/>
           </a:p>
         </p:txBody>
@@ -2434,7 +3715,7 @@
             <a:fld id="{18182567-388C-4D33-8B7B-A651F195F118}" type="slidenum">
               <a:rPr lang="de-DE" altLang="de-DE" smtClean="0"/>
               <a:pPr/>
-              <a:t>21</a:t>
+              <a:t>10</a:t>
             </a:fld>
             <a:endParaRPr lang="de-DE" altLang="de-DE"/>
           </a:p>
@@ -2443,7 +3724,7 @@
     </p:spTree>
     <p:extLst>
       <p:ext uri="{BB962C8B-B14F-4D97-AF65-F5344CB8AC3E}">
-        <p14:creationId xmlns:p14="http://schemas.microsoft.com/office/powerpoint/2010/main" val="3907952042"/>
+        <p14:creationId xmlns:p14="http://schemas.microsoft.com/office/powerpoint/2010/main" val="4275414675"/>
       </p:ext>
     </p:extLst>
   </p:cSld>
@@ -5267,13 +6548,13 @@
           <p:nvPr/>
         </p:nvPicPr>
         <p:blipFill>
-          <a:blip r:embed="rId2">
+          <a:blip r:embed="rId3">
             <a:extLst>
               <a:ext uri="{28A0092B-C50C-407E-A947-70E740481C1C}">
                 <a14:useLocalDpi xmlns:a14="http://schemas.microsoft.com/office/drawing/2010/main" val="0"/>
               </a:ext>
               <a:ext uri="{96DAC541-7B7A-43D3-8B79-37D633B846F1}">
-                <asvg:svgBlip xmlns:asvg="http://schemas.microsoft.com/office/drawing/2016/SVG/main" r:embed="rId3"/>
+                <asvg:svgBlip xmlns:asvg="http://schemas.microsoft.com/office/drawing/2016/SVG/main" r:embed="rId4"/>
               </a:ext>
             </a:extLst>
           </a:blip>
@@ -5306,13 +6587,13 @@
           <p:nvPr/>
         </p:nvPicPr>
         <p:blipFill>
-          <a:blip r:embed="rId2">
+          <a:blip r:embed="rId3">
             <a:extLst>
               <a:ext uri="{28A0092B-C50C-407E-A947-70E740481C1C}">
                 <a14:useLocalDpi xmlns:a14="http://schemas.microsoft.com/office/drawing/2010/main" val="0"/>
               </a:ext>
               <a:ext uri="{96DAC541-7B7A-43D3-8B79-37D633B846F1}">
-                <asvg:svgBlip xmlns:asvg="http://schemas.microsoft.com/office/drawing/2016/SVG/main" r:embed="rId3"/>
+                <asvg:svgBlip xmlns:asvg="http://schemas.microsoft.com/office/drawing/2016/SVG/main" r:embed="rId4"/>
               </a:ext>
             </a:extLst>
           </a:blip>
@@ -5345,13 +6626,13 @@
           <p:nvPr/>
         </p:nvPicPr>
         <p:blipFill>
-          <a:blip r:embed="rId2">
+          <a:blip r:embed="rId3">
             <a:extLst>
               <a:ext uri="{28A0092B-C50C-407E-A947-70E740481C1C}">
                 <a14:useLocalDpi xmlns:a14="http://schemas.microsoft.com/office/drawing/2010/main" val="0"/>
               </a:ext>
               <a:ext uri="{96DAC541-7B7A-43D3-8B79-37D633B846F1}">
-                <asvg:svgBlip xmlns:asvg="http://schemas.microsoft.com/office/drawing/2016/SVG/main" r:embed="rId3"/>
+                <asvg:svgBlip xmlns:asvg="http://schemas.microsoft.com/office/drawing/2016/SVG/main" r:embed="rId4"/>
               </a:ext>
             </a:extLst>
           </a:blip>
@@ -6027,18 +7308,12 @@
             </a:pPr>
             <a:r>
               <a:rPr lang="de-DE" dirty="0"/>
-              <a:t>Schichten werden </a:t>
+              <a:t>Ähnlich wie ein </a:t>
             </a:r>
             <a:r>
               <a:rPr lang="de-DE" dirty="0" err="1"/>
-              <a:t>gecached</a:t>
-            </a:r>
-            <a:endParaRPr lang="de-DE" dirty="0"/>
-          </a:p>
-          <a:p>
-            <a:pPr marL="0" indent="0">
-              <a:buNone/>
-            </a:pPr>
+              <a:t>Script</a:t>
+            </a:r>
             <a:endParaRPr lang="de-DE" dirty="0"/>
           </a:p>
           <a:p>
@@ -6065,7 +7340,7 @@
           <p:nvPr/>
         </p:nvPicPr>
         <p:blipFill>
-          <a:blip r:embed="rId2">
+          <a:blip r:embed="rId3">
             <a:extLst>
               <a:ext uri="{28A0092B-C50C-407E-A947-70E740481C1C}">
                 <a14:useLocalDpi xmlns:a14="http://schemas.microsoft.com/office/drawing/2010/main" val="0"/>
@@ -8082,15 +9357,7 @@
             </a:r>
             <a:r>
               <a:rPr lang="de-DE" dirty="0"/>
-              <a:t> heißen </a:t>
-            </a:r>
-            <a:r>
-              <a:rPr lang="de-DE" dirty="0" err="1"/>
-              <a:t>standertmäßig</a:t>
-            </a:r>
-            <a:r>
-              <a:rPr lang="de-DE" dirty="0"/>
-              <a:t> „</a:t>
+              <a:t> heißen standartmäßig „</a:t>
             </a:r>
             <a:r>
               <a:rPr lang="de-DE" dirty="0" err="1"/>
@@ -8130,6 +9397,21 @@
               <a:rPr lang="de-DE" dirty="0"/>
               <a:t>Gibt weitere Anweisungen</a:t>
             </a:r>
+          </a:p>
+          <a:p>
+            <a:pPr>
+              <a:buFont typeface="Arial" panose="020B0604020202020204" pitchFamily="34" charset="0"/>
+              <a:buChar char="•"/>
+            </a:pPr>
+            <a:r>
+              <a:rPr lang="de-DE" dirty="0"/>
+              <a:t>Einzelne Schichten werden </a:t>
+            </a:r>
+            <a:r>
+              <a:rPr lang="de-DE" dirty="0" err="1"/>
+              <a:t>gecached</a:t>
+            </a:r>
+            <a:endParaRPr lang="de-DE" dirty="0"/>
           </a:p>
           <a:p>
             <a:pPr>
@@ -10590,7 +11872,7 @@
             </a:pPr>
             <a:r>
               <a:rPr lang="de-DE" dirty="0">
-                <a:hlinkClick r:id="rId2"/>
+                <a:hlinkClick r:id="rId3"/>
               </a:rPr>
               <a:t>https://docs.docker.com/storage/volumes/</a:t>
             </a:r>
@@ -11689,7 +12971,7 @@
             </a:pPr>
             <a:r>
               <a:rPr lang="de-DE" dirty="0">
-                <a:hlinkClick r:id="rId2"/>
+                <a:hlinkClick r:id="rId3"/>
               </a:rPr>
               <a:t>https://docs.docker.com/compose/</a:t>
             </a:r>
@@ -12063,8 +13345,13 @@
             </a:pPr>
             <a:r>
               <a:rPr lang="de-DE" dirty="0"/>
-              <a:t>Ein Container pro Stage</a:t>
-            </a:r>
+              <a:t>Ein Container pro </a:t>
+            </a:r>
+            <a:r>
+              <a:rPr lang="de-DE" dirty="0" err="1"/>
+              <a:t>Step</a:t>
+            </a:r>
+            <a:endParaRPr lang="de-DE" dirty="0"/>
           </a:p>
           <a:p>
             <a:pPr>
@@ -12103,7 +13390,7 @@
           <p:nvPr/>
         </p:nvPicPr>
         <p:blipFill>
-          <a:blip r:embed="rId2">
+          <a:blip r:embed="rId3">
             <a:extLst>
               <a:ext uri="{28A0092B-C50C-407E-A947-70E740481C1C}">
                 <a14:useLocalDpi xmlns:a14="http://schemas.microsoft.com/office/drawing/2010/main" val="0"/>
@@ -12253,6 +13540,33 @@
               <a:t>Übernimmt Umgebungskonfiguration</a:t>
             </a:r>
           </a:p>
+          <a:p>
+            <a:pPr>
+              <a:buFont typeface="Arial" panose="020B0604020202020204" pitchFamily="34" charset="0"/>
+              <a:buChar char="•"/>
+            </a:pPr>
+            <a:r>
+              <a:rPr lang="de-DE" dirty="0"/>
+              <a:t>Flexibel</a:t>
+            </a:r>
+          </a:p>
+          <a:p>
+            <a:pPr>
+              <a:buFont typeface="Arial" panose="020B0604020202020204" pitchFamily="34" charset="0"/>
+              <a:buChar char="•"/>
+            </a:pPr>
+            <a:r>
+              <a:rPr lang="de-DE" dirty="0"/>
+              <a:t>Überall hosten</a:t>
+            </a:r>
+          </a:p>
+          <a:p>
+            <a:pPr>
+              <a:buFont typeface="Arial" panose="020B0604020202020204" pitchFamily="34" charset="0"/>
+              <a:buChar char="•"/>
+            </a:pPr>
+            <a:endParaRPr lang="de-DE" dirty="0"/>
+          </a:p>
         </p:txBody>
       </p:sp>
     </p:spTree>
@@ -12331,7 +13645,7 @@
           </p:nvPr>
         </p:nvPicPr>
         <p:blipFill>
-          <a:blip r:embed="rId2">
+          <a:blip r:embed="rId3">
             <a:extLst>
               <a:ext uri="{28A0092B-C50C-407E-A947-70E740481C1C}">
                 <a14:useLocalDpi xmlns:a14="http://schemas.microsoft.com/office/drawing/2010/main" val="0"/>
@@ -13155,7 +14469,7 @@
         </p:nvSpPr>
         <p:spPr bwMode="auto">
           <a:xfrm>
-            <a:off x="827584" y="5049979"/>
+            <a:off x="755576" y="5049979"/>
             <a:ext cx="1872207" cy="369332"/>
           </a:xfrm>
           <a:prstGeom prst="rect">
@@ -13180,7 +14494,7 @@
               <a:rPr lang="de-DE" sz="1800" dirty="0">
                 <a:latin typeface="Arial" charset="0"/>
               </a:rPr>
-              <a:t>REST API</a:t>
+              <a:t>Docker API</a:t>
             </a:r>
           </a:p>
         </p:txBody>
@@ -13200,7 +14514,7 @@
           <p:nvPr/>
         </p:nvPicPr>
         <p:blipFill>
-          <a:blip r:embed="rId2">
+          <a:blip r:embed="rId3">
             <a:extLst>
               <a:ext uri="{28A0092B-C50C-407E-A947-70E740481C1C}">
                 <a14:useLocalDpi xmlns:a14="http://schemas.microsoft.com/office/drawing/2010/main" val="0"/>
@@ -13523,7 +14837,7 @@
           <p:nvPr/>
         </p:nvPicPr>
         <p:blipFill>
-          <a:blip r:embed="rId2">
+          <a:blip r:embed="rId3">
             <a:extLst>
               <a:ext uri="{28A0092B-C50C-407E-A947-70E740481C1C}">
                 <a14:useLocalDpi xmlns:a14="http://schemas.microsoft.com/office/drawing/2010/main" val="0"/>

</xml_diff>

<commit_message>
HCO Logo 3-2 3-5
</commit_message>
<xml_diff>
--- a/slides/Tag-3_2-Docker.pptx
+++ b/slides/Tag-3_2-Docker.pptx
@@ -4608,7 +4608,7 @@
               <a:pPr algn="ctr">
                 <a:defRPr/>
               </a:pPr>
-              <a:t>10.06.2024</a:t>
+              <a:t>11.06.2024</a:t>
             </a:fld>
             <a:endParaRPr lang="de-DE" sz="1000">
               <a:solidFill>
@@ -6166,6 +6166,42 @@
           </a:p>
         </p:txBody>
       </p:sp>
+      <p:pic>
+        <p:nvPicPr>
+          <p:cNvPr id="3" name="Grafik 2" descr="Ein Bild, das Schrift, Logo, Grafiken, Text enthält.&#10;&#10;Automatisch generierte Beschreibung">
+            <a:extLst>
+              <a:ext uri="{FF2B5EF4-FFF2-40B4-BE49-F238E27FC236}">
+                <a16:creationId xmlns:a16="http://schemas.microsoft.com/office/drawing/2014/main" id="{3E1A4F38-7D96-1A1B-40CA-2F7D8A20BA54}"/>
+              </a:ext>
+            </a:extLst>
+          </p:cNvPr>
+          <p:cNvPicPr>
+            <a:picLocks noChangeAspect="1"/>
+          </p:cNvPicPr>
+          <p:nvPr userDrawn="1"/>
+        </p:nvPicPr>
+        <p:blipFill>
+          <a:blip r:embed="rId5">
+            <a:extLst>
+              <a:ext uri="{28A0092B-C50C-407E-A947-70E740481C1C}">
+                <a14:useLocalDpi xmlns:a14="http://schemas.microsoft.com/office/drawing/2010/main" val="0"/>
+              </a:ext>
+            </a:extLst>
+          </a:blip>
+          <a:stretch>
+            <a:fillRect/>
+          </a:stretch>
+        </p:blipFill>
+        <p:spPr>
+          <a:xfrm>
+            <a:off x="3462932" y="4519613"/>
+            <a:ext cx="2218136" cy="2218136"/>
+          </a:xfrm>
+          <a:prstGeom prst="rect">
+            <a:avLst/>
+          </a:prstGeom>
+        </p:spPr>
+      </p:pic>
     </p:spTree>
   </p:cSld>
   <p:clrMap bg1="lt1" tx1="dk1" bg2="lt2" tx2="dk2" accent1="accent1" accent2="accent2" accent3="accent3" accent4="accent4" accent5="accent5" accent6="accent6" hlink="hlink" folHlink="folHlink"/>

</xml_diff>

<commit_message>
HCO Logo 3-2 3-5 Inhalt Variablen und Secrets
</commit_message>
<xml_diff>
--- a/slides/Tag-3_2-Docker.pptx
+++ b/slides/Tag-3_2-Docker.pptx
@@ -3940,7 +3940,7 @@
             </a:pPr>
             <a:r>
               <a:rPr lang="de-DE" dirty="0"/>
-              <a:t>Bild ist Urheberrechtsfrei von unsplash.com</a:t>
+              <a:t>Bild von unsplash.com</a:t>
             </a:r>
           </a:p>
           <a:p>
@@ -4077,7 +4077,7 @@
           <a:p>
             <a:r>
               <a:rPr lang="de-DE" dirty="0"/>
-              <a:t>Bild ist Urheberrechtsfrei von unsplash.com</a:t>
+              <a:t>Bild von unsplash.com</a:t>
             </a:r>
             <a:br>
               <a:rPr lang="de-DE" dirty="0"/>
@@ -5457,6 +5457,42 @@
           </a:p>
         </p:txBody>
       </p:sp>
+      <p:pic>
+        <p:nvPicPr>
+          <p:cNvPr id="3" name="Grafik 2">
+            <a:extLst>
+              <a:ext uri="{FF2B5EF4-FFF2-40B4-BE49-F238E27FC236}">
+                <a16:creationId xmlns:a16="http://schemas.microsoft.com/office/drawing/2014/main" id="{83F220F2-02A0-A253-0192-3E31C9B4E9AC}"/>
+              </a:ext>
+            </a:extLst>
+          </p:cNvPr>
+          <p:cNvPicPr>
+            <a:picLocks noChangeAspect="1"/>
+          </p:cNvPicPr>
+          <p:nvPr userDrawn="1"/>
+        </p:nvPicPr>
+        <p:blipFill>
+          <a:blip r:embed="rId7">
+            <a:extLst>
+              <a:ext uri="{28A0092B-C50C-407E-A947-70E740481C1C}">
+                <a14:useLocalDpi xmlns:a14="http://schemas.microsoft.com/office/drawing/2010/main" val="0"/>
+              </a:ext>
+            </a:extLst>
+          </a:blip>
+          <a:stretch>
+            <a:fillRect/>
+          </a:stretch>
+        </p:blipFill>
+        <p:spPr>
+          <a:xfrm>
+            <a:off x="8486775" y="-15729"/>
+            <a:ext cx="636272" cy="636272"/>
+          </a:xfrm>
+          <a:prstGeom prst="rect">
+            <a:avLst/>
+          </a:prstGeom>
+        </p:spPr>
+      </p:pic>
     </p:spTree>
   </p:cSld>
   <p:clrMap bg1="lt1" tx1="dk1" bg2="lt2" tx2="dk2" accent1="accent1" accent2="accent2" accent3="accent3" accent4="accent4" accent5="accent5" accent6="accent6" hlink="hlink" folHlink="folHlink"/>
@@ -6168,10 +6204,10 @@
       </p:sp>
       <p:pic>
         <p:nvPicPr>
-          <p:cNvPr id="3" name="Grafik 2" descr="Ein Bild, das Schrift, Logo, Grafiken, Text enthält.&#10;&#10;Automatisch generierte Beschreibung">
+          <p:cNvPr id="2" name="Grafik 1">
             <a:extLst>
               <a:ext uri="{FF2B5EF4-FFF2-40B4-BE49-F238E27FC236}">
-                <a16:creationId xmlns:a16="http://schemas.microsoft.com/office/drawing/2014/main" id="{3E1A4F38-7D96-1A1B-40CA-2F7D8A20BA54}"/>
+                <a16:creationId xmlns:a16="http://schemas.microsoft.com/office/drawing/2014/main" id="{4FA4EE3F-0D26-A947-D739-7CBA83262B2B}"/>
               </a:ext>
             </a:extLst>
           </p:cNvPr>
@@ -6194,8 +6230,8 @@
         </p:blipFill>
         <p:spPr>
           <a:xfrm>
-            <a:off x="3462932" y="4519613"/>
-            <a:ext cx="2218136" cy="2218136"/>
+            <a:off x="3383868" y="4481736"/>
+            <a:ext cx="2376264" cy="2376264"/>
           </a:xfrm>
           <a:prstGeom prst="rect">
             <a:avLst/>

</xml_diff>

<commit_message>
Fine tuning for slides 3-2, 3-5
</commit_message>
<xml_diff>
--- a/slides/Tag-3_2-Docker.pptx
+++ b/slides/Tag-3_2-Docker.pptx
@@ -3722,13 +3722,8 @@
           <a:p>
             <a:r>
               <a:rPr lang="de-DE" dirty="0"/>
-              <a:t>Nützlich zum Debuggen, Testen und Visualisieren. Gleiche Funktionalität wie die </a:t>
-            </a:r>
-            <a:r>
-              <a:rPr lang="de-DE" dirty="0" err="1"/>
-              <a:t>Consolensoftware</a:t>
-            </a:r>
-            <a:endParaRPr lang="de-DE" dirty="0"/>
+              <a:t>Nützlich zum Debuggen, Testen und Visualisieren. Gleiche Funktionalität wie die Konsolensoftware</a:t>
+            </a:r>
           </a:p>
           <a:p>
             <a:r>
@@ -4608,7 +4603,7 @@
               <a:pPr algn="ctr">
                 <a:defRPr/>
               </a:pPr>
-              <a:t>11.06.2024</a:t>
+              <a:t>12.06.2024</a:t>
             </a:fld>
             <a:endParaRPr lang="de-DE" sz="1000">
               <a:solidFill>
@@ -7447,7 +7442,7 @@
               <a:rPr lang="de-DE" sz="2000" dirty="0">
                 <a:latin typeface="Arial" charset="0"/>
               </a:rPr>
-              <a:t>Klein und Lightweight</a:t>
+              <a:t>Klein und leichtgewichtig</a:t>
             </a:r>
           </a:p>
           <a:p>
@@ -7937,7 +7932,7 @@
             </a:pPr>
             <a:r>
               <a:rPr lang="de-DE" dirty="0"/>
-              <a:t>Können mit tags gepusht und gepullt werden</a:t>
+              <a:t>Können mit Tags gepusht und gepullt werden</a:t>
             </a:r>
           </a:p>
           <a:p>
@@ -7947,7 +7942,7 @@
             </a:pPr>
             <a:r>
               <a:rPr lang="de-DE" dirty="0"/>
-              <a:t>Gibt öffentliche </a:t>
+              <a:t>Öffentliche </a:t>
             </a:r>
             <a:r>
               <a:rPr lang="de-DE" dirty="0" err="1"/>
@@ -7955,7 +7950,7 @@
             </a:r>
             <a:r>
               <a:rPr lang="de-DE" dirty="0"/>
-              <a:t> (</a:t>
+              <a:t> (z.B. </a:t>
             </a:r>
             <a:r>
               <a:rPr lang="de-DE" dirty="0" err="1"/>
@@ -8813,13 +8808,13 @@
             </a:pPr>
             <a:r>
               <a:rPr lang="de-DE" dirty="0"/>
-              <a:t>Erstellung mittels </a:t>
-            </a:r>
-            <a:r>
-              <a:rPr lang="de-DE" dirty="0" err="1"/>
+              <a:t>Definition mittels </a:t>
+            </a:r>
+            <a:r>
+              <a:rPr lang="de-DE" i="1" dirty="0" err="1"/>
               <a:t>Dockerfile</a:t>
             </a:r>
-            <a:endParaRPr lang="de-DE" dirty="0"/>
+            <a:endParaRPr lang="de-DE" i="1" dirty="0"/>
           </a:p>
           <a:p>
             <a:pPr>
@@ -9000,15 +8995,7 @@
             </a:pPr>
             <a:r>
               <a:rPr lang="de-DE" dirty="0"/>
-              <a:t>Kann lokal oder in </a:t>
-            </a:r>
-            <a:r>
-              <a:rPr lang="de-DE" dirty="0" err="1"/>
-              <a:t>Registries</a:t>
-            </a:r>
-            <a:r>
-              <a:rPr lang="de-DE" dirty="0"/>
-              <a:t> sein</a:t>
+              <a:t>Kann lokal oder in Registry sein</a:t>
             </a:r>
           </a:p>
           <a:p>
@@ -9281,7 +9268,7 @@
             </a:pPr>
             <a:r>
               <a:rPr lang="de-DE" dirty="0"/>
-              <a:t>Alle Befehle werden hier ausgeführt wird</a:t>
+              <a:t>Alle Befehle werden hier ausgeführt</a:t>
             </a:r>
           </a:p>
         </p:txBody>
@@ -10372,7 +10359,7 @@
             </a:pPr>
             <a:r>
               <a:rPr lang="de-DE" dirty="0"/>
-              <a:t>Wird einmal beim Bauen des Images ausgeführt</a:t>
+              <a:t>Wird einmalig beim Bauen des Images ausgeführt</a:t>
             </a:r>
           </a:p>
           <a:p>
@@ -10613,7 +10600,7 @@
             </a:pPr>
             <a:r>
               <a:rPr lang="de-DE" dirty="0"/>
-              <a:t>Gibt den Standartstartbefehl an</a:t>
+              <a:t>Gibt den Standardstartbefehl an</a:t>
             </a:r>
           </a:p>
           <a:p>
@@ -10623,7 +10610,7 @@
             </a:pPr>
             <a:r>
               <a:rPr lang="de-DE" dirty="0"/>
-              <a:t>Wird standartmäßig beim Containerstart ausgeführt</a:t>
+              <a:t>Wird standardmäßig beim Containerstart ausgeführt</a:t>
             </a:r>
           </a:p>
           <a:p>
@@ -10633,7 +10620,15 @@
             </a:pPr>
             <a:r>
               <a:rPr lang="de-DE" dirty="0"/>
-              <a:t>Nur ein CMD pro Image</a:t>
+              <a:t>Nur </a:t>
+            </a:r>
+            <a:r>
+              <a:rPr lang="de-DE" b="1" dirty="0"/>
+              <a:t>ein</a:t>
+            </a:r>
+            <a:r>
+              <a:rPr lang="de-DE" dirty="0"/>
+              <a:t> CMD pro Image!</a:t>
             </a:r>
           </a:p>
           <a:p>
@@ -11106,7 +11101,7 @@
             </a:r>
             <a:r>
               <a:rPr lang="de-DE" dirty="0"/>
-              <a:t> heißen standartmäßig „</a:t>
+              <a:t> heißen standardmäßig „</a:t>
             </a:r>
             <a:r>
               <a:rPr lang="de-DE" dirty="0" err="1"/>
@@ -11144,7 +11139,7 @@
             </a:pPr>
             <a:r>
               <a:rPr lang="de-DE" dirty="0"/>
-              <a:t>Gibt weitere Anweisungen</a:t>
+              <a:t>Zusätzliche Funktionalität: siehe Dokumentation</a:t>
             </a:r>
           </a:p>
           <a:p>
@@ -11433,7 +11428,7 @@
             </a:r>
             <a:r>
               <a:rPr lang="de-DE" dirty="0"/>
-              <a:t>: Befehl für Bauen von Images</a:t>
+              <a:t>: Befehl zum Bauen von Images</a:t>
             </a:r>
           </a:p>
           <a:p>
@@ -11443,7 +11438,15 @@
             </a:pPr>
             <a:r>
               <a:rPr lang="de-DE" dirty="0"/>
-              <a:t>-t &lt;tag&gt;: Gibt dem erstellten Image einen Tag</a:t>
+              <a:t>-t &lt;</a:t>
+            </a:r>
+            <a:r>
+              <a:rPr lang="de-DE" dirty="0" err="1"/>
+              <a:t>tagname</a:t>
+            </a:r>
+            <a:r>
+              <a:rPr lang="de-DE" dirty="0"/>
+              <a:t>&gt;: Gibt erstelltem Image einen Tag</a:t>
             </a:r>
           </a:p>
           <a:p>
@@ -11453,8 +11456,21 @@
             </a:pPr>
             <a:r>
               <a:rPr lang="de-DE" dirty="0"/>
-              <a:t>Verzeichnis aus dem das Image erstellt wird</a:t>
-            </a:r>
+              <a:t>&lt;</a:t>
+            </a:r>
+            <a:r>
+              <a:rPr lang="de-DE" dirty="0" err="1"/>
+              <a:t>directory</a:t>
+            </a:r>
+            <a:r>
+              <a:rPr lang="de-DE" dirty="0"/>
+              <a:t>&gt;: Verzeichnis des </a:t>
+            </a:r>
+            <a:r>
+              <a:rPr lang="de-DE" dirty="0" err="1"/>
+              <a:t>Dockerfiles</a:t>
+            </a:r>
+            <a:endParaRPr lang="de-DE" dirty="0"/>
           </a:p>
           <a:p>
             <a:pPr>
@@ -11467,15 +11483,7 @@
             </a:r>
             <a:r>
               <a:rPr lang="de-DE" dirty="0"/>
-              <a:t> </a:t>
-            </a:r>
-            <a:r>
-              <a:rPr lang="de-DE" dirty="0" err="1"/>
-              <a:t>names</a:t>
-            </a:r>
-            <a:r>
-              <a:rPr lang="de-DE" dirty="0"/>
-              <a:t> „</a:t>
+              <a:t> namens „</a:t>
             </a:r>
             <a:r>
               <a:rPr lang="de-DE" dirty="0" err="1"/>
@@ -11723,7 +11731,7 @@
             </a:pPr>
             <a:r>
               <a:rPr lang="de-DE" dirty="0"/>
-              <a:t>mit --name können Container benannt werden</a:t>
+              <a:t>Container haben Namen und ID zur Identifikation</a:t>
             </a:r>
           </a:p>
           <a:p>
@@ -11733,7 +11741,7 @@
             </a:pPr>
             <a:r>
               <a:rPr lang="de-DE" dirty="0"/>
-              <a:t>Viele weitere Optionen je nach Image und Applikation</a:t>
+              <a:t>mit --name können Container explizit benannt werden</a:t>
             </a:r>
           </a:p>
           <a:p>
@@ -11743,7 +11751,7 @@
             </a:pPr>
             <a:r>
               <a:rPr lang="de-DE" dirty="0"/>
-              <a:t>Container haben Namen und ID zur Identifikation</a:t>
+              <a:t>Viele weitere Optionen je nach Image und Applikation</a:t>
             </a:r>
           </a:p>
         </p:txBody>
@@ -11812,19 +11820,7 @@
               <a:rPr lang="de-DE" dirty="0">
                 <a:latin typeface="Arial" charset="0"/>
               </a:rPr>
-              <a:t> &lt;</a:t>
-            </a:r>
-            <a:r>
-              <a:rPr lang="de-DE" dirty="0" err="1">
-                <a:latin typeface="Arial" charset="0"/>
-              </a:rPr>
-              <a:t>identifier</a:t>
-            </a:r>
-            <a:r>
-              <a:rPr lang="de-DE" dirty="0">
-                <a:latin typeface="Arial" charset="0"/>
-              </a:rPr>
-              <a:t>&gt;</a:t>
+              <a:t> &lt;Image&gt; [--name &lt;Name&gt;]</a:t>
             </a:r>
           </a:p>
           <a:p>
@@ -11851,19 +11847,7 @@
               <a:rPr lang="de-DE" dirty="0">
                 <a:latin typeface="Arial" charset="0"/>
               </a:rPr>
-              <a:t> &lt;</a:t>
-            </a:r>
-            <a:r>
-              <a:rPr lang="de-DE" dirty="0" err="1">
-                <a:latin typeface="Arial" charset="0"/>
-              </a:rPr>
-              <a:t>identifier</a:t>
-            </a:r>
-            <a:r>
-              <a:rPr lang="de-DE" dirty="0">
-                <a:latin typeface="Arial" charset="0"/>
-              </a:rPr>
-              <a:t>&gt;</a:t>
+              <a:t> &lt;Image&gt; [--name &lt;Name&gt;]</a:t>
             </a:r>
           </a:p>
           <a:p>
@@ -11891,6 +11875,18 @@
                 <a:latin typeface="Arial" charset="0"/>
               </a:rPr>
               <a:t> </a:t>
+            </a:r>
+            <a:r>
+              <a:rPr lang="de-DE" dirty="0" err="1">
+                <a:latin typeface="Arial" charset="0"/>
+              </a:rPr>
+              <a:t>myimage:latest</a:t>
+            </a:r>
+            <a:r>
+              <a:rPr lang="de-DE" dirty="0">
+                <a:latin typeface="Arial" charset="0"/>
+              </a:rPr>
+              <a:t> --name </a:t>
             </a:r>
             <a:r>
               <a:rPr lang="de-DE" dirty="0" err="1">
@@ -12025,8 +12021,8 @@
         </p:nvSpPr>
         <p:spPr bwMode="auto">
           <a:xfrm>
-            <a:off x="297818" y="3018959"/>
-            <a:ext cx="8516937" cy="914097"/>
+            <a:off x="297818" y="3060509"/>
+            <a:ext cx="8516937" cy="830997"/>
           </a:xfrm>
           <a:prstGeom prst="rect">
             <a:avLst/>
@@ -12075,19 +12071,7 @@
               <a:rPr lang="de-DE" dirty="0">
                 <a:latin typeface="Arial" charset="0"/>
               </a:rPr>
-              <a:t> &lt;</a:t>
-            </a:r>
-            <a:r>
-              <a:rPr lang="de-DE" dirty="0" err="1">
-                <a:latin typeface="Arial" charset="0"/>
-              </a:rPr>
-              <a:t>identifier</a:t>
-            </a:r>
-            <a:r>
-              <a:rPr lang="de-DE" dirty="0">
-                <a:latin typeface="Arial" charset="0"/>
-              </a:rPr>
-              <a:t>&gt;</a:t>
+              <a:t> &lt;Identifier | Name&gt;</a:t>
             </a:r>
           </a:p>
           <a:p>
@@ -12245,7 +12229,7 @@
             </a:r>
             <a:r>
               <a:rPr lang="de-DE" dirty="0"/>
-              <a:t> wird mit SIGTERM beendet</a:t>
+              <a:t> resultiert in SIGTERM</a:t>
             </a:r>
           </a:p>
           <a:p>
@@ -12255,7 +12239,7 @@
             </a:pPr>
             <a:r>
               <a:rPr lang="de-DE" dirty="0"/>
-              <a:t>Kill wird mit SIGKILL beendet</a:t>
+              <a:t>Kill resultiert in SIGKILL</a:t>
             </a:r>
           </a:p>
           <a:p>
@@ -12342,19 +12326,7 @@
               <a:rPr lang="de-DE" dirty="0">
                 <a:latin typeface="Arial" charset="0"/>
               </a:rPr>
-              <a:t> &lt;</a:t>
-            </a:r>
-            <a:r>
-              <a:rPr lang="de-DE" dirty="0" err="1">
-                <a:latin typeface="Arial" charset="0"/>
-              </a:rPr>
-              <a:t>identifier</a:t>
-            </a:r>
-            <a:r>
-              <a:rPr lang="de-DE" dirty="0">
-                <a:latin typeface="Arial" charset="0"/>
-              </a:rPr>
-              <a:t>&gt;</a:t>
+              <a:t> &lt;Identifier | Name&gt;</a:t>
             </a:r>
           </a:p>
           <a:p>
@@ -12369,19 +12341,7 @@
               <a:rPr lang="de-DE" dirty="0">
                 <a:latin typeface="Arial" charset="0"/>
               </a:rPr>
-              <a:t> kill &lt;</a:t>
-            </a:r>
-            <a:r>
-              <a:rPr lang="de-DE" dirty="0" err="1">
-                <a:latin typeface="Arial" charset="0"/>
-              </a:rPr>
-              <a:t>identifier</a:t>
-            </a:r>
-            <a:r>
-              <a:rPr lang="de-DE" dirty="0">
-                <a:latin typeface="Arial" charset="0"/>
-              </a:rPr>
-              <a:t>&gt;</a:t>
+              <a:t> kill &lt;Identifier | Name&gt;</a:t>
             </a:r>
           </a:p>
           <a:p>
@@ -12614,19 +12574,7 @@
               <a:rPr lang="de-DE" dirty="0">
                 <a:latin typeface="Arial" charset="0"/>
               </a:rPr>
-              <a:t> &lt;</a:t>
-            </a:r>
-            <a:r>
-              <a:rPr lang="de-DE" dirty="0" err="1">
-                <a:latin typeface="Arial" charset="0"/>
-              </a:rPr>
-              <a:t>identifier</a:t>
-            </a:r>
-            <a:r>
-              <a:rPr lang="de-DE" dirty="0">
-                <a:latin typeface="Arial" charset="0"/>
-              </a:rPr>
-              <a:t>&gt;</a:t>
+              <a:t> &lt;Identifier | Name&gt;</a:t>
             </a:r>
           </a:p>
           <a:p>
@@ -13187,7 +13135,7 @@
             </a:pPr>
             <a:r>
               <a:rPr lang="de-DE" dirty="0"/>
-              <a:t>Erstellt eine Liste von Containern </a:t>
+              <a:t>Zeigt aktuell verfügbare Container </a:t>
             </a:r>
           </a:p>
           <a:p>
@@ -13415,7 +13363,7 @@
             </a:pPr>
             <a:r>
               <a:rPr lang="de-DE" dirty="0"/>
-              <a:t>Wie kommt man an die Logs</a:t>
+              <a:t>Wie kommt man an die Logs?</a:t>
             </a:r>
           </a:p>
           <a:p>
@@ -14167,7 +14115,7 @@
             </a:pPr>
             <a:r>
               <a:rPr lang="de-DE" dirty="0"/>
-              <a:t>Führen Sie den Container aus und untersuchen sie logs und das Dateisystem</a:t>
+              <a:t>Führen Sie den Container aus und untersuchen sie Logs und Dateisystem</a:t>
             </a:r>
           </a:p>
           <a:p>
@@ -14185,7 +14133,7 @@
             </a:r>
             <a:r>
               <a:rPr lang="de-DE" dirty="0"/>
-              <a:t> an um bei der Installation zusätzlich „cleanup.sh“ auszuführen.</a:t>
+              <a:t> an, um bei der Installation zusätzlich „cleanup.sh“ auszuführen</a:t>
             </a:r>
           </a:p>
           <a:p>
@@ -14310,7 +14258,11 @@
             </a:pPr>
             <a:r>
               <a:rPr lang="de-DE" dirty="0"/>
-              <a:t>Daten werden mit einem Container gelöscht</a:t>
+              <a:t>Daten werden gemeinsam mit Container </a:t>
+            </a:r>
+            <a:r>
+              <a:rPr lang="de-DE" b="1" dirty="0"/>
+              <a:t>gelöscht</a:t>
             </a:r>
           </a:p>
           <a:p>
@@ -14320,7 +14272,7 @@
             </a:pPr>
             <a:r>
               <a:rPr lang="de-DE" dirty="0"/>
-              <a:t>Persistente Daten können in </a:t>
+              <a:t>Persistente Daten sollten in </a:t>
             </a:r>
             <a:r>
               <a:rPr lang="de-DE" dirty="0" err="1"/>
@@ -15421,7 +15373,7 @@
             </a:pPr>
             <a:r>
               <a:rPr lang="de-DE" dirty="0"/>
-              <a:t>Mehrere Container in einem Netzwerk</a:t>
+              <a:t>Mehrere Container in gemeinsamem Netzwerk</a:t>
             </a:r>
           </a:p>
           <a:p>
@@ -15442,6 +15394,16 @@
             <a:r>
               <a:rPr lang="de-DE" dirty="0"/>
               <a:t>Können zusammen gestartet und gestoppt werden</a:t>
+            </a:r>
+          </a:p>
+          <a:p>
+            <a:pPr>
+              <a:buFont typeface="Arial" panose="020B0604020202020204" pitchFamily="34" charset="0"/>
+              <a:buChar char="•"/>
+            </a:pPr>
+            <a:r>
+              <a:rPr lang="de-DE" dirty="0"/>
+              <a:t>Konkretes Setup (Container + Konfiguration)</a:t>
             </a:r>
           </a:p>
           <a:p>
@@ -15791,10 +15753,16 @@
               <a:t>GitLab</a:t>
             </a:r>
             <a:r>
+              <a:rPr lang="de-DE" b="1" dirty="0">
+                <a:latin typeface="+mj-lt"/>
+              </a:rPr>
+              <a:t> </a:t>
+            </a:r>
+            <a:r>
               <a:rPr lang="de-DE" sz="2400" b="1" dirty="0">
                 <a:latin typeface="+mj-lt"/>
               </a:rPr>
-              <a:t>-CI</a:t>
+              <a:t>CI</a:t>
             </a:r>
             <a:endParaRPr lang="de-DE" b="1" dirty="0"/>
           </a:p>
@@ -15805,7 +15773,7 @@
             </a:pPr>
             <a:r>
               <a:rPr lang="de-DE" dirty="0"/>
-              <a:t>Schritte einer Pipeline in Containern ausführen</a:t>
+              <a:t>Jobs einer Pipeline in Containern ausführen</a:t>
             </a:r>
           </a:p>
           <a:p>
@@ -15947,7 +15915,7 @@
           <a:p>
             <a:r>
               <a:rPr lang="de-DE" altLang="de-DE" sz="4000" kern="0" dirty="0"/>
-              <a:t>mit Docker</a:t>
+              <a:t>Docker</a:t>
             </a:r>
             <a:endParaRPr lang="de-DE" dirty="0"/>
           </a:p>
@@ -15976,7 +15944,7 @@
           <a:p>
             <a:r>
               <a:rPr lang="de-DE" altLang="de-DE" sz="2000" kern="0" dirty="0"/>
-              <a:t>Lokale Entwicklung</a:t>
+              <a:t>Lokale Entwicklung mit</a:t>
             </a:r>
           </a:p>
         </p:txBody>
@@ -16084,7 +16052,7 @@
             </a:pPr>
             <a:r>
               <a:rPr lang="de-DE" dirty="0"/>
-              <a:t>Ausführung von Software in gebauten Containern</a:t>
+              <a:t>Auslieferung von Software als vorkonfigurierte Images</a:t>
             </a:r>
           </a:p>
           <a:p>
@@ -16094,8 +16062,13 @@
             </a:pPr>
             <a:r>
               <a:rPr lang="de-DE" dirty="0"/>
-              <a:t>Plattformunabhängig</a:t>
-            </a:r>
+              <a:t>Definition mittels </a:t>
+            </a:r>
+            <a:r>
+              <a:rPr lang="de-DE" dirty="0" err="1"/>
+              <a:t>Dockerfile</a:t>
+            </a:r>
+            <a:endParaRPr lang="de-DE" dirty="0"/>
           </a:p>
           <a:p>
             <a:pPr>
@@ -16104,7 +16077,7 @@
             </a:pPr>
             <a:r>
               <a:rPr lang="de-DE" dirty="0"/>
-              <a:t>Übernimmt Umgebungskonfiguration</a:t>
+              <a:t>Ausführung als isolierte Container</a:t>
             </a:r>
           </a:p>
           <a:p>
@@ -16114,7 +16087,7 @@
             </a:pPr>
             <a:r>
               <a:rPr lang="de-DE" dirty="0"/>
-              <a:t>Flexibel</a:t>
+              <a:t>Reproduzierbare Umgebung</a:t>
             </a:r>
           </a:p>
           <a:p>
@@ -16124,7 +16097,27 @@
             </a:pPr>
             <a:r>
               <a:rPr lang="de-DE" dirty="0"/>
-              <a:t>Überall hosten</a:t>
+              <a:t>Plattformunabhängig</a:t>
+            </a:r>
+          </a:p>
+          <a:p>
+            <a:pPr>
+              <a:buFont typeface="Arial" panose="020B0604020202020204" pitchFamily="34" charset="0"/>
+              <a:buChar char="•"/>
+            </a:pPr>
+            <a:r>
+              <a:rPr lang="de-DE" dirty="0"/>
+              <a:t>Flexibel</a:t>
+            </a:r>
+          </a:p>
+          <a:p>
+            <a:pPr>
+              <a:buFont typeface="Arial" panose="020B0604020202020204" pitchFamily="34" charset="0"/>
+              <a:buChar char="•"/>
+            </a:pPr>
+            <a:r>
+              <a:rPr lang="de-DE" dirty="0"/>
+              <a:t>Vielfältiges Hosting möglich</a:t>
             </a:r>
           </a:p>
           <a:p>
@@ -16292,7 +16285,7 @@
         <p:spPr bwMode="auto">
           <a:xfrm>
             <a:off x="323528" y="2420888"/>
-            <a:ext cx="8534722" cy="1015663"/>
+            <a:ext cx="8534722" cy="1938992"/>
           </a:xfrm>
           <a:prstGeom prst="rect">
             <a:avLst/>
@@ -16319,6 +16312,51 @@
               <a:rPr lang="en-US" sz="2000" dirty="0" err="1">
                 <a:latin typeface="Arial" charset="0"/>
               </a:rPr>
+              <a:t>Containerisierung</a:t>
+            </a:r>
+            <a:r>
+              <a:rPr lang="en-US" sz="2000" dirty="0">
+                <a:latin typeface="Arial" charset="0"/>
+              </a:rPr>
+              <a:t> von Software</a:t>
+            </a:r>
+          </a:p>
+          <a:p>
+            <a:pPr marL="285750" indent="-285750" eaLnBrk="1" hangingPunct="1">
+              <a:buFont typeface="Arial" panose="020B0604020202020204" pitchFamily="34" charset="0"/>
+              <a:buChar char="•"/>
+            </a:pPr>
+            <a:r>
+              <a:rPr lang="de-DE" sz="2000" dirty="0">
+                <a:latin typeface="Arial" charset="0"/>
+              </a:rPr>
+              <a:t>Isolierte Laufzeitumgebung</a:t>
+            </a:r>
+          </a:p>
+          <a:p>
+            <a:pPr marL="285750" indent="-285750" eaLnBrk="1" hangingPunct="1">
+              <a:buFont typeface="Arial" panose="020B0604020202020204" pitchFamily="34" charset="0"/>
+              <a:buChar char="•"/>
+            </a:pPr>
+            <a:r>
+              <a:rPr lang="de-DE" sz="2000" dirty="0">
+                <a:latin typeface="Arial" charset="0"/>
+              </a:rPr>
+              <a:t>Eigenes Netzwerk</a:t>
+            </a:r>
+            <a:endParaRPr lang="en-US" sz="2000" dirty="0">
+              <a:latin typeface="Arial" charset="0"/>
+            </a:endParaRPr>
+          </a:p>
+          <a:p>
+            <a:pPr marL="285750" indent="-285750" eaLnBrk="1" hangingPunct="1">
+              <a:buFont typeface="Arial" panose="020B0604020202020204" pitchFamily="34" charset="0"/>
+              <a:buChar char="•"/>
+            </a:pPr>
+            <a:r>
+              <a:rPr lang="en-US" sz="2000" dirty="0" err="1">
+                <a:latin typeface="Arial" charset="0"/>
+              </a:rPr>
               <a:t>Hilft</a:t>
             </a:r>
             <a:r>
@@ -16369,12 +16407,9 @@
               </a:rPr>
               <a:t>Ausführen</a:t>
             </a:r>
-            <a:r>
-              <a:rPr lang="en-US" sz="2000" dirty="0">
-                <a:latin typeface="Arial" charset="0"/>
-              </a:rPr>
-              <a:t> von Software </a:t>
-            </a:r>
+            <a:endParaRPr lang="en-US" sz="2000" dirty="0">
+              <a:latin typeface="Arial" charset="0"/>
+            </a:endParaRPr>
           </a:p>
           <a:p>
             <a:pPr marL="285750" indent="-285750" eaLnBrk="1" hangingPunct="1">
@@ -16382,12 +16417,18 @@
               <a:buChar char="•"/>
             </a:pPr>
             <a:r>
-              <a:rPr lang="en-US" sz="2000" dirty="0" err="1">
+              <a:rPr lang="de-DE" sz="2000" dirty="0">
                 <a:latin typeface="Arial" charset="0"/>
               </a:rPr>
-              <a:t>Containerisierung</a:t>
-            </a:r>
-            <a:endParaRPr lang="en-US" sz="2000" dirty="0">
+              <a:t>Verringert die Arbeit für Umgebungsmanagement und –</a:t>
+            </a:r>
+            <a:r>
+              <a:rPr lang="de-DE" sz="2000" dirty="0" err="1">
+                <a:latin typeface="Arial" charset="0"/>
+              </a:rPr>
+              <a:t>konfiguration</a:t>
+            </a:r>
+            <a:endParaRPr lang="de-DE" sz="2000" dirty="0">
               <a:latin typeface="Arial" charset="0"/>
             </a:endParaRPr>
           </a:p>
@@ -16400,7 +16441,31 @@
               <a:rPr lang="de-DE" sz="2000" dirty="0">
                 <a:latin typeface="Arial" charset="0"/>
               </a:rPr>
-              <a:t>Verringert die Arbeit für Umgebungsmanagement und -konfiguration</a:t>
+              <a:t>Nutzt Linux-</a:t>
+            </a:r>
+            <a:r>
+              <a:rPr lang="de-DE" sz="2000" dirty="0" err="1">
+                <a:latin typeface="Arial" charset="0"/>
+              </a:rPr>
+              <a:t>Boardmittel</a:t>
+            </a:r>
+            <a:r>
+              <a:rPr lang="de-DE" sz="2000" dirty="0">
+                <a:latin typeface="Arial" charset="0"/>
+              </a:rPr>
+              <a:t> (u.a. </a:t>
+            </a:r>
+            <a:r>
+              <a:rPr lang="de-DE" sz="2000" dirty="0" err="1">
+                <a:latin typeface="Arial" charset="0"/>
+              </a:rPr>
+              <a:t>cgroups</a:t>
+            </a:r>
+            <a:r>
+              <a:rPr lang="de-DE" sz="2000" dirty="0">
+                <a:latin typeface="Arial" charset="0"/>
+              </a:rPr>
+              <a:t>)</a:t>
             </a:r>
           </a:p>
         </p:txBody>
@@ -16693,16 +16758,9 @@
               <a:rPr lang="de-DE" dirty="0" err="1"/>
               <a:t>Daemon</a:t>
             </a:r>
-            <a:endParaRPr lang="de-DE" dirty="0"/>
-          </a:p>
-          <a:p>
-            <a:pPr lvl="1">
-              <a:buFont typeface="Arial" panose="020B0604020202020204" pitchFamily="34" charset="0"/>
-              <a:buChar char="•"/>
-            </a:pPr>
-            <a:r>
-              <a:rPr lang="de-DE" dirty="0"/>
-              <a:t>Aufruf mit „</a:t>
+            <a:r>
+              <a:rPr lang="de-DE" dirty="0"/>
+              <a:t> (Aufruf: </a:t>
             </a:r>
             <a:r>
               <a:rPr lang="de-DE" dirty="0" err="1"/>
@@ -16710,7 +16768,7 @@
             </a:r>
             <a:r>
               <a:rPr lang="de-DE" dirty="0"/>
-              <a:t>“</a:t>
+              <a:t>)</a:t>
             </a:r>
           </a:p>
           <a:p>
@@ -16730,7 +16788,7 @@
             </a:pPr>
             <a:r>
               <a:rPr lang="de-DE" dirty="0"/>
-              <a:t>Hört auch Docker API Anfragen</a:t>
+              <a:t>Hört auf Docker API Anfragen</a:t>
             </a:r>
           </a:p>
           <a:p>
@@ -16986,17 +17044,7 @@
             </a:pPr>
             <a:r>
               <a:rPr lang="de-DE" dirty="0"/>
-              <a:t>Primärer Ansprechpunkt für Docker</a:t>
-            </a:r>
-          </a:p>
-          <a:p>
-            <a:pPr lvl="1">
-              <a:buFont typeface="Arial" panose="020B0604020202020204" pitchFamily="34" charset="0"/>
-              <a:buChar char="•"/>
-            </a:pPr>
-            <a:r>
-              <a:rPr lang="de-DE" dirty="0"/>
-              <a:t>Aufruf mit „</a:t>
+              <a:t>Primärer Ansprechpunkt für Docker (Aufruf: </a:t>
             </a:r>
             <a:r>
               <a:rPr lang="de-DE" dirty="0" err="1"/>
@@ -17004,7 +17052,7 @@
             </a:r>
             <a:r>
               <a:rPr lang="de-DE" dirty="0"/>
-              <a:t>“</a:t>
+              <a:t>)</a:t>
             </a:r>
           </a:p>
           <a:p>
@@ -17034,13 +17082,17 @@
             </a:pPr>
             <a:r>
               <a:rPr lang="de-DE" dirty="0"/>
-              <a:t>Separater Client für Docker </a:t>
-            </a:r>
-            <a:r>
-              <a:rPr lang="de-DE" dirty="0" err="1"/>
+              <a:t>Separater Client für </a:t>
+            </a:r>
+            <a:r>
+              <a:rPr lang="de-DE" i="1" dirty="0"/>
+              <a:t>Docker </a:t>
+            </a:r>
+            <a:r>
+              <a:rPr lang="de-DE" i="1" dirty="0" err="1"/>
               <a:t>Compose</a:t>
             </a:r>
-            <a:endParaRPr lang="de-DE" dirty="0"/>
+            <a:endParaRPr lang="de-DE" i="1" dirty="0"/>
           </a:p>
         </p:txBody>
       </p:sp>
@@ -17572,6 +17624,21 @@
             </a:pPr>
             <a:r>
               <a:rPr lang="de-DE" dirty="0"/>
+              <a:t>Freeware, aber nicht </a:t>
+            </a:r>
+            <a:r>
+              <a:rPr lang="de-DE" dirty="0" err="1"/>
+              <a:t>OpenSource</a:t>
+            </a:r>
+            <a:endParaRPr lang="de-DE" dirty="0"/>
+          </a:p>
+          <a:p>
+            <a:pPr>
+              <a:buFont typeface="Arial" panose="020B0604020202020204" pitchFamily="34" charset="0"/>
+              <a:buChar char="•"/>
+            </a:pPr>
+            <a:r>
+              <a:rPr lang="de-DE" dirty="0"/>
               <a:t>Beinhaltet</a:t>
             </a:r>
           </a:p>
@@ -17630,6 +17697,10 @@
               <a:buFont typeface="Arial" panose="020B0604020202020204" pitchFamily="34" charset="0"/>
               <a:buChar char="•"/>
             </a:pPr>
+            <a:r>
+              <a:rPr lang="de-DE" dirty="0"/>
+              <a:t>Anbindung an </a:t>
+            </a:r>
             <a:r>
               <a:rPr lang="de-DE" dirty="0" err="1"/>
               <a:t>Kubernetes</a:t>

</xml_diff>

<commit_message>
Korrektur 3-2 Folien 26,30 Anpassung des bash scripts für exec demo
</commit_message>
<xml_diff>
--- a/slides/Tag-3_2-Docker.pptx
+++ b/slides/Tag-3_2-Docker.pptx
@@ -1804,6 +1804,24 @@
           </a:p>
           <a:p>
             <a:r>
+              <a:rPr lang="de-DE" dirty="0" err="1"/>
+              <a:t>Flag</a:t>
+            </a:r>
+            <a:r>
+              <a:rPr lang="de-DE" dirty="0"/>
+              <a:t> -d (</a:t>
+            </a:r>
+            <a:r>
+              <a:rPr lang="de-DE" dirty="0" err="1"/>
+              <a:t>detached</a:t>
+            </a:r>
+            <a:r>
+              <a:rPr lang="de-DE" dirty="0"/>
+              <a:t>) benutzen, um Container im Hintergrund zu starten</a:t>
+            </a:r>
+          </a:p>
+          <a:p>
+            <a:r>
               <a:rPr lang="de-DE" dirty="0"/>
               <a:t>Images und Container können in der Docker Desktop GUI sehr einfach verwaltet werden. Für Debugging sehr angenehm</a:t>
             </a:r>
@@ -4603,7 +4621,7 @@
               <a:pPr algn="ctr">
                 <a:defRPr/>
               </a:pPr>
-              <a:t>12.06.2024</a:t>
+              <a:t>13.06.2024</a:t>
             </a:fld>
             <a:endParaRPr lang="de-DE" sz="1000">
               <a:solidFill>
@@ -11754,6 +11772,16 @@
               <a:t>Viele weitere Optionen je nach Image und Applikation</a:t>
             </a:r>
           </a:p>
+          <a:p>
+            <a:pPr>
+              <a:buFont typeface="Arial" panose="020B0604020202020204" pitchFamily="34" charset="0"/>
+              <a:buChar char="•"/>
+            </a:pPr>
+            <a:r>
+              <a:rPr lang="de-DE" dirty="0"/>
+              <a:t>mit -d können Container im Hintergrund gestartet werden</a:t>
+            </a:r>
+          </a:p>
         </p:txBody>
       </p:sp>
       <p:sp>
@@ -11817,10 +11845,16 @@
               <a:t>run</a:t>
             </a:r>
             <a:r>
+              <a:rPr lang="de-DE">
+                <a:latin typeface="Arial" charset="0"/>
+              </a:rPr>
+              <a:t> &lt;</a:t>
+            </a:r>
+            <a:r>
               <a:rPr lang="de-DE" dirty="0">
                 <a:latin typeface="Arial" charset="0"/>
               </a:rPr>
-              <a:t> &lt;Image&gt; [--name &lt;Name&gt;]</a:t>
+              <a:t>Image&gt; [--name &lt;Name&gt;]</a:t>
             </a:r>
           </a:p>
           <a:p>
@@ -13174,8 +13208,8 @@
         </p:nvSpPr>
         <p:spPr bwMode="auto">
           <a:xfrm>
-            <a:off x="297818" y="3380799"/>
-            <a:ext cx="8516937" cy="1200329"/>
+            <a:off x="297818" y="3565465"/>
+            <a:ext cx="8516937" cy="830997"/>
           </a:xfrm>
           <a:prstGeom prst="rect">
             <a:avLst/>
@@ -13212,17 +13246,8 @@
               <a:rPr lang="de-DE" dirty="0">
                 <a:latin typeface="Arial" charset="0"/>
               </a:rPr>
-              <a:t> </a:t>
-            </a:r>
-            <a:r>
-              <a:rPr lang="de-DE" dirty="0" err="1">
-                <a:latin typeface="Arial" charset="0"/>
-              </a:rPr>
-              <a:t>ls</a:t>
-            </a:r>
-            <a:endParaRPr lang="de-DE" dirty="0">
-              <a:latin typeface="Arial" charset="0"/>
-            </a:endParaRPr>
+              <a:t> ps</a:t>
+            </a:r>
           </a:p>
           <a:p>
             <a:pPr algn="ctr" eaLnBrk="1" hangingPunct="1"/>
@@ -13236,34 +13261,7 @@
               <a:rPr lang="de-DE" dirty="0">
                 <a:latin typeface="Arial" charset="0"/>
               </a:rPr>
-              <a:t> </a:t>
-            </a:r>
-            <a:r>
-              <a:rPr lang="de-DE" dirty="0" err="1">
-                <a:latin typeface="Arial" charset="0"/>
-              </a:rPr>
-              <a:t>ls</a:t>
-            </a:r>
-            <a:r>
-              <a:rPr lang="de-DE" dirty="0">
-                <a:latin typeface="Arial" charset="0"/>
-              </a:rPr>
-              <a:t> -a</a:t>
-            </a:r>
-          </a:p>
-          <a:p>
-            <a:pPr algn="ctr" eaLnBrk="1" hangingPunct="1"/>
-            <a:r>
-              <a:rPr lang="de-DE" dirty="0" err="1">
-                <a:latin typeface="Arial" charset="0"/>
-              </a:rPr>
-              <a:t>docker</a:t>
-            </a:r>
-            <a:r>
-              <a:rPr lang="de-DE" dirty="0">
-                <a:latin typeface="Arial" charset="0"/>
-              </a:rPr>
-              <a:t> ps</a:t>
+              <a:t> ps -a</a:t>
             </a:r>
           </a:p>
         </p:txBody>

</xml_diff>